<commit_message>
module 3 : exercise addition
</commit_message>
<xml_diff>
--- a/module3/Module3.pptx
+++ b/module3/Module3.pptx
@@ -338,7 +338,7 @@
           <a:p>
             <a:fld id="{9D3D7800-DB7A-4180-B244-216606443E4F}" type="datetimeFigureOut">
               <a:rPr lang="en-IN" smtClean="0"/>
-              <a:t>24-12-2021</a:t>
+              <a:t>27-12-2021</a:t>
             </a:fld>
             <a:endParaRPr lang="en-IN"/>
           </a:p>
@@ -525,7 +525,7 @@
           <a:p>
             <a:fld id="{9D3D7800-DB7A-4180-B244-216606443E4F}" type="datetimeFigureOut">
               <a:rPr lang="en-IN" smtClean="0"/>
-              <a:t>24-12-2021</a:t>
+              <a:t>27-12-2021</a:t>
             </a:fld>
             <a:endParaRPr lang="en-IN"/>
           </a:p>
@@ -700,7 +700,7 @@
           <a:p>
             <a:fld id="{9D3D7800-DB7A-4180-B244-216606443E4F}" type="datetimeFigureOut">
               <a:rPr lang="en-IN" smtClean="0"/>
-              <a:t>24-12-2021</a:t>
+              <a:t>27-12-2021</a:t>
             </a:fld>
             <a:endParaRPr lang="en-IN"/>
           </a:p>
@@ -880,7 +880,7 @@
           <a:p>
             <a:fld id="{9D3D7800-DB7A-4180-B244-216606443E4F}" type="datetimeFigureOut">
               <a:rPr lang="en-IN" smtClean="0"/>
-              <a:t>24-12-2021</a:t>
+              <a:t>27-12-2021</a:t>
             </a:fld>
             <a:endParaRPr lang="en-IN"/>
           </a:p>
@@ -1127,7 +1127,7 @@
           <a:p>
             <a:fld id="{9D3D7800-DB7A-4180-B244-216606443E4F}" type="datetimeFigureOut">
               <a:rPr lang="en-IN" smtClean="0"/>
-              <a:t>24-12-2021</a:t>
+              <a:t>27-12-2021</a:t>
             </a:fld>
             <a:endParaRPr lang="en-IN"/>
           </a:p>
@@ -1601,7 +1601,7 @@
           <a:p>
             <a:fld id="{9D3D7800-DB7A-4180-B244-216606443E4F}" type="datetimeFigureOut">
               <a:rPr lang="en-IN" smtClean="0"/>
-              <a:t>24-12-2021</a:t>
+              <a:t>27-12-2021</a:t>
             </a:fld>
             <a:endParaRPr lang="en-IN"/>
           </a:p>
@@ -2016,7 +2016,7 @@
           <a:p>
             <a:fld id="{9D3D7800-DB7A-4180-B244-216606443E4F}" type="datetimeFigureOut">
               <a:rPr lang="en-IN" smtClean="0"/>
-              <a:t>24-12-2021</a:t>
+              <a:t>27-12-2021</a:t>
             </a:fld>
             <a:endParaRPr lang="en-IN"/>
           </a:p>
@@ -2147,7 +2147,7 @@
           <a:p>
             <a:fld id="{9D3D7800-DB7A-4180-B244-216606443E4F}" type="datetimeFigureOut">
               <a:rPr lang="en-IN" smtClean="0"/>
-              <a:t>24-12-2021</a:t>
+              <a:t>27-12-2021</a:t>
             </a:fld>
             <a:endParaRPr lang="en-IN"/>
           </a:p>
@@ -2242,7 +2242,7 @@
           <a:p>
             <a:fld id="{9D3D7800-DB7A-4180-B244-216606443E4F}" type="datetimeFigureOut">
               <a:rPr lang="en-IN" smtClean="0"/>
-              <a:t>24-12-2021</a:t>
+              <a:t>27-12-2021</a:t>
             </a:fld>
             <a:endParaRPr lang="en-IN"/>
           </a:p>
@@ -2520,7 +2520,7 @@
           <a:p>
             <a:fld id="{9D3D7800-DB7A-4180-B244-216606443E4F}" type="datetimeFigureOut">
               <a:rPr lang="en-IN" smtClean="0"/>
-              <a:t>24-12-2021</a:t>
+              <a:t>27-12-2021</a:t>
             </a:fld>
             <a:endParaRPr lang="en-IN"/>
           </a:p>
@@ -2772,7 +2772,7 @@
           <a:p>
             <a:fld id="{9D3D7800-DB7A-4180-B244-216606443E4F}" type="datetimeFigureOut">
               <a:rPr lang="en-IN" smtClean="0"/>
-              <a:t>24-12-2021</a:t>
+              <a:t>27-12-2021</a:t>
             </a:fld>
             <a:endParaRPr lang="en-IN"/>
           </a:p>
@@ -3144,7 +3144,7 @@
           <a:p>
             <a:fld id="{9D3D7800-DB7A-4180-B244-216606443E4F}" type="datetimeFigureOut">
               <a:rPr lang="en-IN" smtClean="0"/>
-              <a:t>24-12-2021</a:t>
+              <a:t>27-12-2021</a:t>
             </a:fld>
             <a:endParaRPr lang="en-IN"/>
           </a:p>
@@ -3936,11 +3936,6 @@
               </a:rPr>
               <a:t>))</a:t>
             </a:r>
-            <a:endParaRPr lang="en-US" sz="1800" b="1" dirty="0" smtClean="0">
-              <a:solidFill>
-                <a:srgbClr val="00B0F0"/>
-              </a:solidFill>
-            </a:endParaRPr>
           </a:p>
           <a:p>
             <a:r>
@@ -3974,11 +3969,6 @@
               </a:rPr>
               <a:t> = tuple((1,2,3))</a:t>
             </a:r>
-            <a:endParaRPr lang="en-US" sz="1800" b="1" dirty="0" smtClean="0">
-              <a:solidFill>
-                <a:srgbClr val="00B0F0"/>
-              </a:solidFill>
-            </a:endParaRPr>
           </a:p>
         </p:txBody>
       </p:sp>
@@ -4044,11 +4034,7 @@
             <a:pPr algn="ctr"/>
             <a:r>
               <a:rPr lang="en-US" dirty="0" smtClean="0"/>
-              <a:t>Tuple(access </a:t>
-            </a:r>
-            <a:r>
-              <a:rPr lang="en-US" dirty="0" smtClean="0"/>
-              <a:t>items)</a:t>
+              <a:t>Tuple(access items)</a:t>
             </a:r>
             <a:endParaRPr lang="en-IN" dirty="0"/>
           </a:p>
@@ -4103,15 +4089,7 @@
                   <a:srgbClr val="00B0F0"/>
                 </a:solidFill>
               </a:rPr>
-              <a:t>[1</a:t>
-            </a:r>
-            <a:r>
-              <a:rPr lang="en-IN" sz="1600" b="1" dirty="0" smtClean="0">
-                <a:solidFill>
-                  <a:srgbClr val="00B0F0"/>
-                </a:solidFill>
-              </a:rPr>
-              <a:t>]</a:t>
+              <a:t>[1]</a:t>
             </a:r>
             <a:endParaRPr lang="en-US" sz="1600" b="1" dirty="0" smtClean="0">
               <a:solidFill>
@@ -4258,7 +4236,6 @@
               <a:rPr lang="en-US" sz="1600" dirty="0" smtClean="0"/>
               <a:t>tuple</a:t>
             </a:r>
-            <a:endParaRPr lang="en-US" sz="1600" dirty="0" smtClean="0"/>
           </a:p>
           <a:p>
             <a:pPr lvl="1"/>
@@ -4306,53 +4283,41 @@
             </a:r>
             <a:r>
               <a:rPr lang="en-US" sz="1600" dirty="0"/>
-              <a:t>negative indexes if you want to start the search from the end of the </a:t>
-            </a:r>
+              <a:t>negative indexes if you want to start the search from the end of the tuple</a:t>
+            </a:r>
+            <a:endParaRPr lang="en-US" sz="1600" dirty="0" smtClean="0"/>
+          </a:p>
+          <a:p>
+            <a:pPr lvl="1"/>
+            <a:r>
+              <a:rPr lang="en-IN" sz="1600" b="1" dirty="0" err="1">
+                <a:solidFill>
+                  <a:srgbClr val="00B0F0"/>
+                </a:solidFill>
+              </a:rPr>
+              <a:t>mytuple</a:t>
+            </a:r>
+            <a:r>
+              <a:rPr lang="en-US" sz="1600" b="1" dirty="0" smtClean="0">
+                <a:solidFill>
+                  <a:srgbClr val="00B0F0"/>
+                </a:solidFill>
+              </a:rPr>
+              <a:t>[-</a:t>
+            </a:r>
+            <a:r>
+              <a:rPr lang="en-US" sz="1600" b="1" dirty="0">
+                <a:solidFill>
+                  <a:srgbClr val="00B0F0"/>
+                </a:solidFill>
+              </a:rPr>
+              <a:t>4:-1]</a:t>
+            </a:r>
+          </a:p>
+          <a:p>
             <a:r>
               <a:rPr lang="en-US" sz="1600" dirty="0"/>
-              <a:t>tuple</a:t>
-            </a:r>
-            <a:endParaRPr lang="en-US" sz="1600" dirty="0" smtClean="0"/>
-          </a:p>
-          <a:p>
-            <a:pPr lvl="1"/>
-            <a:r>
-              <a:rPr lang="en-IN" sz="1600" b="1" dirty="0" err="1">
-                <a:solidFill>
-                  <a:srgbClr val="00B0F0"/>
-                </a:solidFill>
-              </a:rPr>
-              <a:t>mytuple</a:t>
-            </a:r>
-            <a:r>
-              <a:rPr lang="en-US" sz="1600" b="1" dirty="0" smtClean="0">
-                <a:solidFill>
-                  <a:srgbClr val="00B0F0"/>
-                </a:solidFill>
-              </a:rPr>
-              <a:t>[-</a:t>
-            </a:r>
-            <a:r>
-              <a:rPr lang="en-US" sz="1600" b="1" dirty="0">
-                <a:solidFill>
-                  <a:srgbClr val="00B0F0"/>
-                </a:solidFill>
-              </a:rPr>
-              <a:t>4:-1]</a:t>
-            </a:r>
-          </a:p>
-          <a:p>
-            <a:r>
-              <a:rPr lang="en-US" sz="1600" dirty="0"/>
-              <a:t>To determine if a specified item is present in a </a:t>
-            </a:r>
-            <a:r>
-              <a:rPr lang="en-US" sz="1600" dirty="0"/>
-              <a:t>tuple use </a:t>
-            </a:r>
-            <a:r>
-              <a:rPr lang="en-US" sz="1600" dirty="0"/>
-              <a:t>the in keyword</a:t>
+              <a:t>To determine if a specified item is present in a tuple use the in keyword</a:t>
             </a:r>
             <a:endParaRPr lang="en-US" sz="1600" dirty="0" smtClean="0"/>
           </a:p>
@@ -4484,11 +4449,7 @@
           <a:p>
             <a:r>
               <a:rPr lang="en-US" sz="1600" dirty="0" smtClean="0"/>
-              <a:t>Tuples are immutable </a:t>
-            </a:r>
-            <a:r>
-              <a:rPr lang="en-US" sz="1600" dirty="0" smtClean="0"/>
-              <a:t>or unchangeable, so its not possible to change anything directly, but there is work around where we have to convert tuple into list, perform actions and again change that list to tuple </a:t>
+              <a:t>Tuples are immutable or unchangeable, so its not possible to change anything directly, but there is work around where we have to convert tuple into list, perform actions and again change that list to tuple </a:t>
             </a:r>
           </a:p>
           <a:p>
@@ -4540,14 +4501,6 @@
                 </a:solidFill>
               </a:rPr>
               <a:t>")</a:t>
-            </a:r>
-            <a:r>
-              <a:rPr lang="es-ES" sz="1600" b="1" dirty="0">
-                <a:solidFill>
-                  <a:srgbClr val="00B0F0"/>
-                </a:solidFill>
-              </a:rPr>
-              <a:t/>
             </a:r>
             <a:br>
               <a:rPr lang="es-ES" sz="1600" b="1" dirty="0">
@@ -4634,14 +4587,6 @@
                 </a:solidFill>
               </a:rPr>
               <a:t>] = "kiwi"</a:t>
-            </a:r>
-            <a:r>
-              <a:rPr lang="es-ES" sz="1600" b="1" dirty="0">
-                <a:solidFill>
-                  <a:srgbClr val="00B0F0"/>
-                </a:solidFill>
-              </a:rPr>
-              <a:t/>
             </a:r>
             <a:br>
               <a:rPr lang="es-ES" sz="1600" b="1" dirty="0">
@@ -4772,14 +4717,6 @@
               </a:rPr>
               <a:t>("apple", "banana", "cherry")</a:t>
             </a:r>
-            <a:r>
-              <a:rPr lang="en-US" sz="1600" b="1" dirty="0">
-                <a:solidFill>
-                  <a:srgbClr val="00B0F0"/>
-                </a:solidFill>
-              </a:rPr>
-              <a:t/>
-            </a:r>
             <a:br>
               <a:rPr lang="en-US" sz="1600" b="1" dirty="0">
                 <a:solidFill>
@@ -4802,14 +4739,6 @@
                 </a:solidFill>
               </a:rPr>
               <a:t>= ("orange",)</a:t>
-            </a:r>
-            <a:r>
-              <a:rPr lang="en-US" sz="1600" b="1" dirty="0">
-                <a:solidFill>
-                  <a:srgbClr val="00B0F0"/>
-                </a:solidFill>
-              </a:rPr>
-              <a:t/>
             </a:r>
             <a:br>
               <a:rPr lang="en-US" sz="1600" b="1" dirty="0">
@@ -4914,7 +4843,6 @@
               <a:rPr lang="en-IN" sz="1600" b="1" dirty="0" smtClean="0"/>
               <a:t>Join tuples</a:t>
             </a:r>
-            <a:endParaRPr lang="en-IN" sz="1600" b="1" dirty="0" smtClean="0"/>
           </a:p>
           <a:p>
             <a:pPr lvl="1"/>
@@ -4951,15 +4879,7 @@
                   <a:srgbClr val="00B0F0"/>
                 </a:solidFill>
               </a:rPr>
-              <a:t>m</a:t>
-            </a:r>
-            <a:r>
-              <a:rPr lang="en-US" sz="1600" b="1" dirty="0" err="1" smtClean="0">
-                <a:solidFill>
-                  <a:srgbClr val="00B0F0"/>
-                </a:solidFill>
-              </a:rPr>
-              <a:t>ytuple</a:t>
+              <a:t>mytuple</a:t>
             </a:r>
             <a:r>
               <a:rPr lang="en-US" sz="1600" b="1" dirty="0" smtClean="0">
@@ -4969,11 +4889,6 @@
               </a:rPr>
               <a:t> = tuple*2 </a:t>
             </a:r>
-            <a:endParaRPr lang="en-US" sz="1600" b="1" dirty="0" smtClean="0">
-              <a:solidFill>
-                <a:srgbClr val="00B0F0"/>
-              </a:solidFill>
-            </a:endParaRPr>
           </a:p>
           <a:p>
             <a:pPr lvl="1"/>
@@ -5077,11 +4992,7 @@
           <a:p>
             <a:r>
               <a:rPr lang="en-US" sz="1600" dirty="0" smtClean="0"/>
-              <a:t>In </a:t>
-            </a:r>
-            <a:r>
-              <a:rPr lang="en-US" sz="1600" dirty="0" smtClean="0"/>
-              <a:t>Python</a:t>
+              <a:t>In Python</a:t>
             </a:r>
             <a:r>
               <a:rPr lang="en-US" sz="1600" dirty="0"/>
@@ -6287,8 +6198,21 @@
                   <a:srgbClr val="00B0F0"/>
                 </a:solidFill>
               </a:rPr>
-              <a:t>“HONDA"]</a:t>
-            </a:r>
+              <a:t>“</a:t>
+            </a:r>
+            <a:r>
+              <a:rPr lang="en-IN" sz="1800" b="1" dirty="0" smtClean="0">
+                <a:solidFill>
+                  <a:srgbClr val="00B0F0"/>
+                </a:solidFill>
+              </a:rPr>
+              <a:t>HONDA“]</a:t>
+            </a:r>
+            <a:endParaRPr lang="en-IN" sz="1800" b="1" dirty="0" smtClean="0">
+              <a:solidFill>
+                <a:srgbClr val="00B0F0"/>
+              </a:solidFill>
+            </a:endParaRPr>
           </a:p>
           <a:p>
             <a:pPr lvl="1"/>
@@ -7243,12 +7167,20 @@
               <a:t>= </a:t>
             </a:r>
             <a:r>
+              <a:rPr lang="en-US" sz="1800" b="1" dirty="0" smtClean="0">
+                <a:solidFill>
+                  <a:srgbClr val="00B0F0"/>
+                </a:solidFill>
+              </a:rPr>
+              <a:t>[ ]</a:t>
+            </a:r>
+            <a:r>
               <a:rPr lang="en-US" sz="1800" b="1" dirty="0">
                 <a:solidFill>
                   <a:srgbClr val="00B0F0"/>
                 </a:solidFill>
               </a:rPr>
-              <a:t>[]</a:t>
+              <a:t/>
             </a:r>
             <a:br>
               <a:rPr lang="en-US" sz="1800" b="1" dirty="0">
@@ -7425,12 +7357,84 @@
               <a:t>= </a:t>
             </a:r>
             <a:r>
+              <a:rPr lang="en-US" sz="1800" b="1" dirty="0" smtClean="0">
+                <a:solidFill>
+                  <a:srgbClr val="00B0F0"/>
+                </a:solidFill>
+              </a:rPr>
+              <a:t>[car</a:t>
+            </a:r>
+            <a:r>
               <a:rPr lang="en-US" sz="1800" b="1" dirty="0">
                 <a:solidFill>
                   <a:srgbClr val="00B0F0"/>
                 </a:solidFill>
               </a:rPr>
-              <a:t>[x for x in fruits if "a" in x]</a:t>
+              <a:t> for </a:t>
+            </a:r>
+            <a:r>
+              <a:rPr lang="en-US" sz="1800" b="1" dirty="0" smtClean="0">
+                <a:solidFill>
+                  <a:srgbClr val="00B0F0"/>
+                </a:solidFill>
+              </a:rPr>
+              <a:t>car</a:t>
+            </a:r>
+            <a:r>
+              <a:rPr lang="en-US" sz="1800" b="1" dirty="0">
+                <a:solidFill>
+                  <a:srgbClr val="00B0F0"/>
+                </a:solidFill>
+              </a:rPr>
+              <a:t> in </a:t>
+            </a:r>
+            <a:r>
+              <a:rPr lang="en-US" sz="1800" b="1" dirty="0" smtClean="0">
+                <a:solidFill>
+                  <a:srgbClr val="00B0F0"/>
+                </a:solidFill>
+              </a:rPr>
+              <a:t>cars</a:t>
+            </a:r>
+            <a:r>
+              <a:rPr lang="en-US" sz="1800" b="1" dirty="0">
+                <a:solidFill>
+                  <a:srgbClr val="00B0F0"/>
+                </a:solidFill>
+              </a:rPr>
+              <a:t> if </a:t>
+            </a:r>
+            <a:r>
+              <a:rPr lang="en-US" sz="1800" b="1" dirty="0" smtClean="0">
+                <a:solidFill>
+                  <a:srgbClr val="00B0F0"/>
+                </a:solidFill>
+              </a:rPr>
+              <a:t>“A"</a:t>
+            </a:r>
+            <a:r>
+              <a:rPr lang="en-US" sz="1800" b="1" dirty="0">
+                <a:solidFill>
+                  <a:srgbClr val="00B0F0"/>
+                </a:solidFill>
+              </a:rPr>
+              <a:t> in </a:t>
+            </a:r>
+            <a:r>
+              <a:rPr lang="en-US" sz="1800" b="1" dirty="0" smtClean="0">
+                <a:solidFill>
+                  <a:srgbClr val="00B0F0"/>
+                </a:solidFill>
+              </a:rPr>
+              <a:t>car] = [“HONDA”,”TESLA”]</a:t>
+            </a:r>
+            <a:r>
+              <a:rPr lang="en-US" sz="1800" b="1" dirty="0">
+                <a:solidFill>
+                  <a:srgbClr val="00B0F0"/>
+                </a:solidFill>
+              </a:rPr>
+              <a:t/>
             </a:r>
             <a:br>
               <a:rPr lang="en-US" sz="1800" b="1" dirty="0">
@@ -8236,11 +8240,7 @@
             <a:pPr algn="ctr"/>
             <a:r>
               <a:rPr lang="en-US" dirty="0" smtClean="0"/>
-              <a:t>Lists </a:t>
-            </a:r>
-            <a:r>
-              <a:rPr lang="en-US" dirty="0" smtClean="0"/>
-              <a:t>(</a:t>
+              <a:t>Lists (</a:t>
             </a:r>
             <a:r>
               <a:rPr lang="en-IN" dirty="0" smtClean="0">
@@ -8282,7 +8282,6 @@
               <a:rPr lang="en-US" sz="1800" dirty="0" smtClean="0"/>
               <a:t>2D</a:t>
             </a:r>
-            <a:endParaRPr lang="en-US" sz="1800" dirty="0" smtClean="0"/>
           </a:p>
           <a:p>
             <a:pPr lvl="1"/>
@@ -8316,18 +8315,12 @@
               </a:rPr>
               <a:t>List[2][2]</a:t>
             </a:r>
-            <a:endParaRPr lang="en-US" sz="1800" b="1" dirty="0" smtClean="0">
-              <a:solidFill>
-                <a:srgbClr val="00B0F0"/>
-              </a:solidFill>
-            </a:endParaRPr>
           </a:p>
           <a:p>
             <a:r>
               <a:rPr lang="en-US" sz="1800" dirty="0" smtClean="0"/>
               <a:t>3D</a:t>
             </a:r>
-            <a:endParaRPr lang="en-US" sz="1800" dirty="0" smtClean="0"/>
           </a:p>
           <a:p>
             <a:pPr lvl="1"/>

</xml_diff>

<commit_message>
module 3 : PPT update
</commit_message>
<xml_diff>
--- a/module3/Module3.pptx
+++ b/module3/Module3.pptx
@@ -18,6 +18,15 @@
     <p:sldId id="267" r:id="rId12"/>
     <p:sldId id="268" r:id="rId13"/>
     <p:sldId id="269" r:id="rId14"/>
+    <p:sldId id="270" r:id="rId15"/>
+    <p:sldId id="271" r:id="rId16"/>
+    <p:sldId id="272" r:id="rId17"/>
+    <p:sldId id="273" r:id="rId18"/>
+    <p:sldId id="274" r:id="rId19"/>
+    <p:sldId id="275" r:id="rId20"/>
+    <p:sldId id="276" r:id="rId21"/>
+    <p:sldId id="277" r:id="rId22"/>
+    <p:sldId id="278" r:id="rId23"/>
   </p:sldIdLst>
   <p:sldSz cx="9144000" cy="6858000" type="screen4x3"/>
   <p:notesSz cx="6858000" cy="9144000"/>
@@ -338,7 +347,7 @@
           <a:p>
             <a:fld id="{9D3D7800-DB7A-4180-B244-216606443E4F}" type="datetimeFigureOut">
               <a:rPr lang="en-IN" smtClean="0"/>
-              <a:t>27-12-2021</a:t>
+              <a:t>29-12-2021</a:t>
             </a:fld>
             <a:endParaRPr lang="en-IN"/>
           </a:p>
@@ -525,7 +534,7 @@
           <a:p>
             <a:fld id="{9D3D7800-DB7A-4180-B244-216606443E4F}" type="datetimeFigureOut">
               <a:rPr lang="en-IN" smtClean="0"/>
-              <a:t>27-12-2021</a:t>
+              <a:t>29-12-2021</a:t>
             </a:fld>
             <a:endParaRPr lang="en-IN"/>
           </a:p>
@@ -700,7 +709,7 @@
           <a:p>
             <a:fld id="{9D3D7800-DB7A-4180-B244-216606443E4F}" type="datetimeFigureOut">
               <a:rPr lang="en-IN" smtClean="0"/>
-              <a:t>27-12-2021</a:t>
+              <a:t>29-12-2021</a:t>
             </a:fld>
             <a:endParaRPr lang="en-IN"/>
           </a:p>
@@ -880,7 +889,7 @@
           <a:p>
             <a:fld id="{9D3D7800-DB7A-4180-B244-216606443E4F}" type="datetimeFigureOut">
               <a:rPr lang="en-IN" smtClean="0"/>
-              <a:t>27-12-2021</a:t>
+              <a:t>29-12-2021</a:t>
             </a:fld>
             <a:endParaRPr lang="en-IN"/>
           </a:p>
@@ -1127,7 +1136,7 @@
           <a:p>
             <a:fld id="{9D3D7800-DB7A-4180-B244-216606443E4F}" type="datetimeFigureOut">
               <a:rPr lang="en-IN" smtClean="0"/>
-              <a:t>27-12-2021</a:t>
+              <a:t>29-12-2021</a:t>
             </a:fld>
             <a:endParaRPr lang="en-IN"/>
           </a:p>
@@ -1601,7 +1610,7 @@
           <a:p>
             <a:fld id="{9D3D7800-DB7A-4180-B244-216606443E4F}" type="datetimeFigureOut">
               <a:rPr lang="en-IN" smtClean="0"/>
-              <a:t>27-12-2021</a:t>
+              <a:t>29-12-2021</a:t>
             </a:fld>
             <a:endParaRPr lang="en-IN"/>
           </a:p>
@@ -2016,7 +2025,7 @@
           <a:p>
             <a:fld id="{9D3D7800-DB7A-4180-B244-216606443E4F}" type="datetimeFigureOut">
               <a:rPr lang="en-IN" smtClean="0"/>
-              <a:t>27-12-2021</a:t>
+              <a:t>29-12-2021</a:t>
             </a:fld>
             <a:endParaRPr lang="en-IN"/>
           </a:p>
@@ -2147,7 +2156,7 @@
           <a:p>
             <a:fld id="{9D3D7800-DB7A-4180-B244-216606443E4F}" type="datetimeFigureOut">
               <a:rPr lang="en-IN" smtClean="0"/>
-              <a:t>27-12-2021</a:t>
+              <a:t>29-12-2021</a:t>
             </a:fld>
             <a:endParaRPr lang="en-IN"/>
           </a:p>
@@ -2242,7 +2251,7 @@
           <a:p>
             <a:fld id="{9D3D7800-DB7A-4180-B244-216606443E4F}" type="datetimeFigureOut">
               <a:rPr lang="en-IN" smtClean="0"/>
-              <a:t>27-12-2021</a:t>
+              <a:t>29-12-2021</a:t>
             </a:fld>
             <a:endParaRPr lang="en-IN"/>
           </a:p>
@@ -2520,7 +2529,7 @@
           <a:p>
             <a:fld id="{9D3D7800-DB7A-4180-B244-216606443E4F}" type="datetimeFigureOut">
               <a:rPr lang="en-IN" smtClean="0"/>
-              <a:t>27-12-2021</a:t>
+              <a:t>29-12-2021</a:t>
             </a:fld>
             <a:endParaRPr lang="en-IN"/>
           </a:p>
@@ -2772,7 +2781,7 @@
           <a:p>
             <a:fld id="{9D3D7800-DB7A-4180-B244-216606443E4F}" type="datetimeFigureOut">
               <a:rPr lang="en-IN" smtClean="0"/>
-              <a:t>27-12-2021</a:t>
+              <a:t>29-12-2021</a:t>
             </a:fld>
             <a:endParaRPr lang="en-IN"/>
           </a:p>
@@ -3144,7 +3153,7 @@
           <a:p>
             <a:fld id="{9D3D7800-DB7A-4180-B244-216606443E4F}" type="datetimeFigureOut">
               <a:rPr lang="en-IN" smtClean="0"/>
-              <a:t>27-12-2021</a:t>
+              <a:t>29-12-2021</a:t>
             </a:fld>
             <a:endParaRPr lang="en-IN"/>
           </a:p>
@@ -3746,19 +3755,11 @@
               <a:t>: </a:t>
             </a:r>
             <a:r>
-              <a:rPr lang="en-US" sz="1800" b="1" dirty="0" err="1" smtClean="0">
-                <a:solidFill>
-                  <a:srgbClr val="00B0F0"/>
-                </a:solidFill>
-              </a:rPr>
+              <a:rPr lang="en-US" sz="1800" b="1" dirty="0" err="1" smtClean="0"/>
               <a:t>mytuple</a:t>
             </a:r>
             <a:r>
-              <a:rPr lang="en-US" sz="1800" b="1" dirty="0" smtClean="0">
-                <a:solidFill>
-                  <a:srgbClr val="00B0F0"/>
-                </a:solidFill>
-              </a:rPr>
+              <a:rPr lang="en-US" sz="1800" b="1" dirty="0" smtClean="0"/>
               <a:t>= (1,2,3)</a:t>
             </a:r>
           </a:p>
@@ -3788,35 +3789,19 @@
               <a:t>Length : </a:t>
             </a:r>
             <a:r>
-              <a:rPr lang="en-US" sz="1800" dirty="0" err="1" smtClean="0">
-                <a:solidFill>
-                  <a:srgbClr val="00B0F0"/>
-                </a:solidFill>
-              </a:rPr>
+              <a:rPr lang="en-US" sz="1800" dirty="0" err="1" smtClean="0"/>
               <a:t>len</a:t>
             </a:r>
             <a:r>
-              <a:rPr lang="en-US" sz="1800" dirty="0" smtClean="0">
-                <a:solidFill>
-                  <a:srgbClr val="00B0F0"/>
-                </a:solidFill>
-              </a:rPr>
+              <a:rPr lang="en-US" sz="1800" dirty="0" smtClean="0"/>
               <a:t>(</a:t>
             </a:r>
             <a:r>
-              <a:rPr lang="en-US" sz="1800" b="1" dirty="0" err="1" smtClean="0">
-                <a:solidFill>
-                  <a:srgbClr val="00B0F0"/>
-                </a:solidFill>
-              </a:rPr>
+              <a:rPr lang="en-US" sz="1800" b="1" dirty="0" err="1" smtClean="0"/>
               <a:t>mytuple</a:t>
             </a:r>
             <a:r>
-              <a:rPr lang="en-US" sz="1800" dirty="0" smtClean="0">
-                <a:solidFill>
-                  <a:srgbClr val="00B0F0"/>
-                </a:solidFill>
-              </a:rPr>
+              <a:rPr lang="en-US" sz="1800" dirty="0" smtClean="0"/>
               <a:t>)</a:t>
             </a:r>
           </a:p>
@@ -3837,46 +3822,26 @@
           <a:p>
             <a:pPr lvl="1"/>
             <a:r>
-              <a:rPr lang="en-US" sz="1800" b="1" dirty="0" err="1">
-                <a:solidFill>
-                  <a:srgbClr val="00B0F0"/>
-                </a:solidFill>
-              </a:rPr>
+              <a:rPr lang="en-US" sz="1800" b="1" dirty="0" err="1"/>
               <a:t>thistuple</a:t>
             </a:r>
             <a:r>
-              <a:rPr lang="en-US" sz="1800" b="1" dirty="0">
-                <a:solidFill>
-                  <a:srgbClr val="00B0F0"/>
-                </a:solidFill>
-              </a:rPr>
+              <a:rPr lang="en-US" sz="1800" b="1" dirty="0"/>
               <a:t> = ("apple",)</a:t>
             </a:r>
           </a:p>
           <a:p>
             <a:pPr lvl="1"/>
             <a:r>
-              <a:rPr lang="en-US" sz="1800" b="1" dirty="0">
-                <a:solidFill>
-                  <a:srgbClr val="00B0F0"/>
-                </a:solidFill>
-              </a:rPr>
+              <a:rPr lang="en-US" sz="1800" b="1" dirty="0"/>
               <a:t>print(type(</a:t>
             </a:r>
             <a:r>
-              <a:rPr lang="en-US" sz="1800" b="1" dirty="0" err="1">
-                <a:solidFill>
-                  <a:srgbClr val="00B0F0"/>
-                </a:solidFill>
-              </a:rPr>
+              <a:rPr lang="en-US" sz="1800" b="1" dirty="0" err="1"/>
               <a:t>thistuple</a:t>
             </a:r>
             <a:r>
-              <a:rPr lang="en-US" sz="1800" b="1" dirty="0">
-                <a:solidFill>
-                  <a:srgbClr val="00B0F0"/>
-                </a:solidFill>
-              </a:rPr>
+              <a:rPr lang="en-US" sz="1800" b="1" dirty="0"/>
               <a:t>))</a:t>
             </a:r>
           </a:p>
@@ -3894,46 +3859,26 @@
           <a:p>
             <a:pPr lvl="1"/>
             <a:r>
-              <a:rPr lang="en-US" sz="1800" b="1" dirty="0" err="1">
-                <a:solidFill>
-                  <a:srgbClr val="00B0F0"/>
-                </a:solidFill>
-              </a:rPr>
+              <a:rPr lang="en-US" sz="1800" b="1" dirty="0" err="1"/>
               <a:t>thistuple</a:t>
             </a:r>
             <a:r>
-              <a:rPr lang="en-US" sz="1800" b="1" dirty="0">
-                <a:solidFill>
-                  <a:srgbClr val="00B0F0"/>
-                </a:solidFill>
-              </a:rPr>
+              <a:rPr lang="en-US" sz="1800" b="1" dirty="0"/>
               <a:t> = ("apple")</a:t>
             </a:r>
           </a:p>
           <a:p>
             <a:pPr lvl="1"/>
             <a:r>
-              <a:rPr lang="en-US" sz="1800" b="1" dirty="0">
-                <a:solidFill>
-                  <a:srgbClr val="00B0F0"/>
-                </a:solidFill>
-              </a:rPr>
+              <a:rPr lang="en-US" sz="1800" b="1" dirty="0"/>
               <a:t>print(type(</a:t>
             </a:r>
             <a:r>
-              <a:rPr lang="en-US" sz="1800" b="1" dirty="0" err="1">
-                <a:solidFill>
-                  <a:srgbClr val="00B0F0"/>
-                </a:solidFill>
-              </a:rPr>
+              <a:rPr lang="en-US" sz="1800" b="1" dirty="0" err="1"/>
               <a:t>thistuple</a:t>
             </a:r>
             <a:r>
-              <a:rPr lang="en-US" sz="1800" b="1" dirty="0" smtClean="0">
-                <a:solidFill>
-                  <a:srgbClr val="00B0F0"/>
-                </a:solidFill>
-              </a:rPr>
+              <a:rPr lang="en-US" sz="1800" b="1" dirty="0" smtClean="0"/>
               <a:t>))</a:t>
             </a:r>
           </a:p>
@@ -3946,27 +3891,15 @@
           <a:p>
             <a:pPr lvl="1"/>
             <a:r>
-              <a:rPr lang="en-US" sz="1800" b="1" dirty="0" err="1">
-                <a:solidFill>
-                  <a:srgbClr val="00B0F0"/>
-                </a:solidFill>
-              </a:rPr>
+              <a:rPr lang="en-US" sz="1800" b="1" dirty="0" err="1"/>
               <a:t>m</a:t>
             </a:r>
             <a:r>
-              <a:rPr lang="en-US" sz="1800" b="1" dirty="0" err="1" smtClean="0">
-                <a:solidFill>
-                  <a:srgbClr val="00B0F0"/>
-                </a:solidFill>
-              </a:rPr>
+              <a:rPr lang="en-US" sz="1800" b="1" dirty="0" err="1" smtClean="0"/>
               <a:t>ytuple</a:t>
             </a:r>
             <a:r>
-              <a:rPr lang="en-US" sz="1800" b="1" dirty="0" smtClean="0">
-                <a:solidFill>
-                  <a:srgbClr val="00B0F0"/>
-                </a:solidFill>
-              </a:rPr>
+              <a:rPr lang="en-US" sz="1800" b="1" dirty="0" smtClean="0"/>
               <a:t> = tuple((1,2,3))</a:t>
             </a:r>
           </a:p>
@@ -4076,26 +4009,14 @@
           <a:p>
             <a:pPr lvl="1"/>
             <a:r>
-              <a:rPr lang="en-IN" sz="1600" b="1" dirty="0" err="1" smtClean="0">
-                <a:solidFill>
-                  <a:srgbClr val="00B0F0"/>
-                </a:solidFill>
-              </a:rPr>
+              <a:rPr lang="en-IN" sz="1600" b="1" dirty="0" err="1" smtClean="0"/>
               <a:t>mytuple</a:t>
             </a:r>
             <a:r>
-              <a:rPr lang="en-IN" sz="1600" b="1" dirty="0" smtClean="0">
-                <a:solidFill>
-                  <a:srgbClr val="00B0F0"/>
-                </a:solidFill>
-              </a:rPr>
+              <a:rPr lang="en-IN" sz="1600" b="1" dirty="0" smtClean="0"/>
               <a:t>[1]</a:t>
             </a:r>
-            <a:endParaRPr lang="en-US" sz="1600" b="1" dirty="0" smtClean="0">
-              <a:solidFill>
-                <a:srgbClr val="00B0F0"/>
-              </a:solidFill>
-            </a:endParaRPr>
+            <a:endParaRPr lang="en-US" sz="1600" b="1" dirty="0" smtClean="0"/>
           </a:p>
           <a:p>
             <a:r>
@@ -4110,34 +4031,18 @@
           <a:p>
             <a:pPr lvl="1"/>
             <a:r>
-              <a:rPr lang="en-IN" sz="1600" b="1" dirty="0" err="1">
-                <a:solidFill>
-                  <a:srgbClr val="00B0F0"/>
-                </a:solidFill>
-              </a:rPr>
+              <a:rPr lang="en-IN" sz="1600" b="1" dirty="0" err="1"/>
               <a:t>mytuple</a:t>
             </a:r>
             <a:r>
-              <a:rPr lang="en-IN" sz="1600" b="1" dirty="0">
-                <a:solidFill>
-                  <a:srgbClr val="00B0F0"/>
-                </a:solidFill>
-              </a:rPr>
+              <a:rPr lang="en-IN" sz="1600" b="1" dirty="0"/>
               <a:t>[-</a:t>
             </a:r>
             <a:r>
-              <a:rPr lang="en-IN" sz="1600" b="1" dirty="0" smtClean="0">
-                <a:solidFill>
-                  <a:srgbClr val="00B0F0"/>
-                </a:solidFill>
-              </a:rPr>
+              <a:rPr lang="en-IN" sz="1600" b="1" dirty="0" smtClean="0"/>
               <a:t>1]</a:t>
             </a:r>
-            <a:endParaRPr lang="en-US" sz="1600" b="1" dirty="0" smtClean="0">
-              <a:solidFill>
-                <a:srgbClr val="00B0F0"/>
-              </a:solidFill>
-            </a:endParaRPr>
+            <a:endParaRPr lang="en-US" sz="1600" b="1" dirty="0" smtClean="0"/>
           </a:p>
           <a:p>
             <a:r>
@@ -4152,34 +4057,18 @@
           <a:p>
             <a:pPr lvl="1"/>
             <a:r>
-              <a:rPr lang="en-IN" sz="1600" b="1" dirty="0" err="1">
-                <a:solidFill>
-                  <a:srgbClr val="00B0F0"/>
-                </a:solidFill>
-              </a:rPr>
+              <a:rPr lang="en-IN" sz="1600" b="1" dirty="0" err="1"/>
               <a:t>mytuple</a:t>
             </a:r>
             <a:r>
-              <a:rPr lang="en-IN" sz="1600" b="1" dirty="0">
-                <a:solidFill>
-                  <a:srgbClr val="00B0F0"/>
-                </a:solidFill>
-              </a:rPr>
+              <a:rPr lang="en-IN" sz="1600" b="1" dirty="0"/>
               <a:t>[1:5</a:t>
             </a:r>
             <a:r>
-              <a:rPr lang="en-IN" sz="1600" b="1" dirty="0" smtClean="0">
-                <a:solidFill>
-                  <a:srgbClr val="00B0F0"/>
-                </a:solidFill>
-              </a:rPr>
+              <a:rPr lang="en-IN" sz="1600" b="1" dirty="0" smtClean="0"/>
               <a:t>]</a:t>
             </a:r>
-            <a:endParaRPr lang="en-US" sz="1600" b="1" dirty="0">
-              <a:solidFill>
-                <a:srgbClr val="00B0F0"/>
-              </a:solidFill>
-            </a:endParaRPr>
+            <a:endParaRPr lang="en-US" sz="1600" b="1" dirty="0"/>
           </a:p>
           <a:p>
             <a:r>
@@ -4194,34 +4083,18 @@
           <a:p>
             <a:pPr lvl="1"/>
             <a:r>
-              <a:rPr lang="en-IN" sz="1600" b="1" dirty="0" err="1">
-                <a:solidFill>
-                  <a:srgbClr val="00B0F0"/>
-                </a:solidFill>
-              </a:rPr>
+              <a:rPr lang="en-IN" sz="1600" b="1" dirty="0" err="1"/>
               <a:t>mytuple</a:t>
             </a:r>
             <a:r>
-              <a:rPr lang="en-IN" sz="1600" b="1" dirty="0">
-                <a:solidFill>
-                  <a:srgbClr val="00B0F0"/>
-                </a:solidFill>
-              </a:rPr>
+              <a:rPr lang="en-IN" sz="1600" b="1" dirty="0"/>
               <a:t>[:</a:t>
             </a:r>
             <a:r>
-              <a:rPr lang="en-IN" sz="1600" b="1" dirty="0" smtClean="0">
-                <a:solidFill>
-                  <a:srgbClr val="00B0F0"/>
-                </a:solidFill>
-              </a:rPr>
+              <a:rPr lang="en-IN" sz="1600" b="1" dirty="0" smtClean="0"/>
               <a:t>5]</a:t>
             </a:r>
-            <a:endParaRPr lang="en-US" sz="1600" b="1" dirty="0">
-              <a:solidFill>
-                <a:srgbClr val="00B0F0"/>
-              </a:solidFill>
-            </a:endParaRPr>
+            <a:endParaRPr lang="en-US" sz="1600" b="1" dirty="0"/>
           </a:p>
           <a:p>
             <a:r>
@@ -4244,35 +4117,19 @@
               <a:t>	</a:t>
             </a:r>
             <a:r>
-              <a:rPr lang="en-IN" sz="1600" b="1" dirty="0" err="1">
-                <a:solidFill>
-                  <a:srgbClr val="00B0F0"/>
-                </a:solidFill>
-              </a:rPr>
+              <a:rPr lang="en-IN" sz="1600" b="1" dirty="0" err="1"/>
               <a:t>mytuple</a:t>
             </a:r>
             <a:r>
-              <a:rPr lang="en-IN" sz="1600" b="1" dirty="0">
-                <a:solidFill>
-                  <a:srgbClr val="00B0F0"/>
-                </a:solidFill>
-              </a:rPr>
+              <a:rPr lang="en-IN" sz="1600" b="1" dirty="0"/>
               <a:t> </a:t>
             </a:r>
             <a:r>
-              <a:rPr lang="en-US" sz="1600" b="1" dirty="0" smtClean="0">
-                <a:solidFill>
-                  <a:srgbClr val="00B0F0"/>
-                </a:solidFill>
-              </a:rPr>
+              <a:rPr lang="en-US" sz="1600" b="1" dirty="0" smtClean="0"/>
               <a:t>[</a:t>
             </a:r>
             <a:r>
-              <a:rPr lang="en-US" sz="1600" b="1" dirty="0">
-                <a:solidFill>
-                  <a:srgbClr val="00B0F0"/>
-                </a:solidFill>
-              </a:rPr>
+              <a:rPr lang="en-US" sz="1600" b="1" dirty="0"/>
               <a:t>1:]</a:t>
             </a:r>
           </a:p>
@@ -4290,27 +4147,15 @@
           <a:p>
             <a:pPr lvl="1"/>
             <a:r>
-              <a:rPr lang="en-IN" sz="1600" b="1" dirty="0" err="1">
-                <a:solidFill>
-                  <a:srgbClr val="00B0F0"/>
-                </a:solidFill>
-              </a:rPr>
+              <a:rPr lang="en-IN" sz="1600" b="1" dirty="0" err="1"/>
               <a:t>mytuple</a:t>
             </a:r>
             <a:r>
-              <a:rPr lang="en-US" sz="1600" b="1" dirty="0" smtClean="0">
-                <a:solidFill>
-                  <a:srgbClr val="00B0F0"/>
-                </a:solidFill>
-              </a:rPr>
+              <a:rPr lang="en-US" sz="1600" b="1" dirty="0" smtClean="0"/>
               <a:t>[-</a:t>
             </a:r>
             <a:r>
-              <a:rPr lang="en-US" sz="1600" b="1" dirty="0">
-                <a:solidFill>
-                  <a:srgbClr val="00B0F0"/>
-                </a:solidFill>
-              </a:rPr>
+              <a:rPr lang="en-US" sz="1600" b="1" dirty="0"/>
               <a:t>4:-1]</a:t>
             </a:r>
           </a:p>
@@ -4324,26 +4169,14 @@
           <a:p>
             <a:pPr lvl="1"/>
             <a:r>
-              <a:rPr lang="en-US" sz="1600" b="1" dirty="0" smtClean="0">
-                <a:solidFill>
-                  <a:srgbClr val="00B0F0"/>
-                </a:solidFill>
-              </a:rPr>
+              <a:rPr lang="en-US" sz="1600" b="1" dirty="0" smtClean="0"/>
               <a:t>Item in </a:t>
             </a:r>
             <a:r>
-              <a:rPr lang="en-IN" sz="1600" b="1" dirty="0" err="1">
-                <a:solidFill>
-                  <a:srgbClr val="00B0F0"/>
-                </a:solidFill>
-              </a:rPr>
+              <a:rPr lang="en-IN" sz="1600" b="1" dirty="0" err="1"/>
               <a:t>mytuple</a:t>
             </a:r>
-            <a:endParaRPr lang="en-US" sz="1600" b="1" dirty="0" smtClean="0">
-              <a:solidFill>
-                <a:srgbClr val="00B0F0"/>
-              </a:solidFill>
-            </a:endParaRPr>
+            <a:endParaRPr lang="en-US" sz="1600" b="1" dirty="0" smtClean="0"/>
           </a:p>
           <a:p>
             <a:pPr lvl="1"/>
@@ -4455,230 +4288,114 @@
           <a:p>
             <a:pPr lvl="1"/>
             <a:r>
-              <a:rPr lang="es-ES" sz="1600" b="1" dirty="0" smtClean="0">
-                <a:solidFill>
-                  <a:srgbClr val="00B0F0"/>
-                </a:solidFill>
-              </a:rPr>
+              <a:rPr lang="es-ES" sz="1600" b="1" dirty="0" smtClean="0"/>
               <a:t>mytuple </a:t>
             </a:r>
             <a:r>
-              <a:rPr lang="es-ES" sz="1600" b="1" dirty="0">
-                <a:solidFill>
-                  <a:srgbClr val="00B0F0"/>
-                </a:solidFill>
-              </a:rPr>
+              <a:rPr lang="es-ES" sz="1600" b="1" dirty="0"/>
               <a:t>= ("</a:t>
             </a:r>
             <a:r>
-              <a:rPr lang="es-ES" sz="1600" b="1" dirty="0" err="1">
-                <a:solidFill>
-                  <a:srgbClr val="00B0F0"/>
-                </a:solidFill>
-              </a:rPr>
+              <a:rPr lang="es-ES" sz="1600" b="1" dirty="0" err="1"/>
               <a:t>apple</a:t>
             </a:r>
             <a:r>
-              <a:rPr lang="es-ES" sz="1600" b="1" dirty="0">
-                <a:solidFill>
-                  <a:srgbClr val="00B0F0"/>
-                </a:solidFill>
-              </a:rPr>
+              <a:rPr lang="es-ES" sz="1600" b="1" dirty="0"/>
               <a:t>", "banana", "</a:t>
             </a:r>
             <a:r>
-              <a:rPr lang="es-ES" sz="1600" b="1" dirty="0" err="1">
-                <a:solidFill>
-                  <a:srgbClr val="00B0F0"/>
-                </a:solidFill>
-              </a:rPr>
+              <a:rPr lang="es-ES" sz="1600" b="1" dirty="0" err="1"/>
               <a:t>cherry</a:t>
             </a:r>
             <a:r>
-              <a:rPr lang="es-ES" sz="1600" b="1" dirty="0">
-                <a:solidFill>
-                  <a:srgbClr val="00B0F0"/>
-                </a:solidFill>
-              </a:rPr>
+              <a:rPr lang="es-ES" sz="1600" b="1" dirty="0"/>
               <a:t>")</a:t>
             </a:r>
             <a:br>
-              <a:rPr lang="es-ES" sz="1600" b="1" dirty="0">
-                <a:solidFill>
-                  <a:srgbClr val="00B0F0"/>
-                </a:solidFill>
-              </a:rPr>
+              <a:rPr lang="es-ES" sz="1600" b="1" dirty="0"/>
             </a:br>
             <a:r>
-              <a:rPr lang="es-ES" sz="1600" b="1" dirty="0" err="1" smtClean="0">
-                <a:solidFill>
-                  <a:srgbClr val="00B0F0"/>
-                </a:solidFill>
-              </a:rPr>
+              <a:rPr lang="es-ES" sz="1600" b="1" dirty="0" err="1" smtClean="0"/>
               <a:t>mylist</a:t>
             </a:r>
             <a:r>
-              <a:rPr lang="es-ES" sz="1600" b="1" dirty="0" smtClean="0">
-                <a:solidFill>
-                  <a:srgbClr val="00B0F0"/>
-                </a:solidFill>
-              </a:rPr>
+              <a:rPr lang="es-ES" sz="1600" b="1" dirty="0" smtClean="0"/>
               <a:t> </a:t>
             </a:r>
             <a:r>
-              <a:rPr lang="es-ES" sz="1600" b="1" dirty="0">
-                <a:solidFill>
-                  <a:srgbClr val="00B0F0"/>
-                </a:solidFill>
-              </a:rPr>
+              <a:rPr lang="es-ES" sz="1600" b="1" dirty="0"/>
               <a:t>= </a:t>
             </a:r>
             <a:r>
-              <a:rPr lang="es-ES" sz="1600" b="1" dirty="0" err="1" smtClean="0">
-                <a:solidFill>
-                  <a:srgbClr val="00B0F0"/>
-                </a:solidFill>
-              </a:rPr>
+              <a:rPr lang="es-ES" sz="1600" b="1" dirty="0" err="1" smtClean="0"/>
               <a:t>list</a:t>
             </a:r>
             <a:r>
-              <a:rPr lang="es-ES" sz="1600" b="1" dirty="0" smtClean="0">
-                <a:solidFill>
-                  <a:srgbClr val="00B0F0"/>
-                </a:solidFill>
-              </a:rPr>
+              <a:rPr lang="es-ES" sz="1600" b="1" dirty="0" smtClean="0"/>
               <a:t>(mytuple)</a:t>
             </a:r>
             <a:r>
-              <a:rPr lang="es-ES" sz="1600" b="1" dirty="0">
-                <a:solidFill>
-                  <a:srgbClr val="00B0F0"/>
-                </a:solidFill>
-              </a:rPr>
+              <a:rPr lang="es-ES" sz="1600" b="1" dirty="0"/>
               <a:t/>
             </a:r>
             <a:br>
-              <a:rPr lang="es-ES" sz="1600" b="1" dirty="0">
-                <a:solidFill>
-                  <a:srgbClr val="00B0F0"/>
-                </a:solidFill>
-              </a:rPr>
+              <a:rPr lang="es-ES" sz="1600" b="1" dirty="0"/>
             </a:br>
             <a:r>
-              <a:rPr lang="es-ES" sz="1600" b="1" dirty="0" err="1">
-                <a:solidFill>
-                  <a:srgbClr val="00B0F0"/>
-                </a:solidFill>
-              </a:rPr>
+              <a:rPr lang="es-ES" sz="1600" b="1" dirty="0" err="1"/>
               <a:t>mylist</a:t>
             </a:r>
             <a:r>
-              <a:rPr lang="es-ES" sz="1600" b="1" dirty="0" smtClean="0">
-                <a:solidFill>
-                  <a:srgbClr val="00B0F0"/>
-                </a:solidFill>
-              </a:rPr>
+              <a:rPr lang="es-ES" sz="1600" b="1" dirty="0" smtClean="0"/>
               <a:t>[1</a:t>
             </a:r>
             <a:r>
-              <a:rPr lang="es-ES" sz="1600" b="1" dirty="0">
-                <a:solidFill>
-                  <a:srgbClr val="00B0F0"/>
-                </a:solidFill>
-              </a:rPr>
+              <a:rPr lang="es-ES" sz="1600" b="1" dirty="0"/>
               <a:t>] = "kiwi"</a:t>
             </a:r>
             <a:br>
-              <a:rPr lang="es-ES" sz="1600" b="1" dirty="0">
-                <a:solidFill>
-                  <a:srgbClr val="00B0F0"/>
-                </a:solidFill>
-              </a:rPr>
+              <a:rPr lang="es-ES" sz="1600" b="1" dirty="0"/>
             </a:br>
             <a:r>
-              <a:rPr lang="es-ES" sz="1600" b="1" dirty="0" smtClean="0">
-                <a:solidFill>
-                  <a:srgbClr val="00B0F0"/>
-                </a:solidFill>
-              </a:rPr>
+              <a:rPr lang="es-ES" sz="1600" b="1" dirty="0" smtClean="0"/>
               <a:t>mytuple </a:t>
             </a:r>
             <a:r>
-              <a:rPr lang="es-ES" sz="1600" b="1" dirty="0">
-                <a:solidFill>
-                  <a:srgbClr val="00B0F0"/>
-                </a:solidFill>
-              </a:rPr>
+              <a:rPr lang="es-ES" sz="1600" b="1" dirty="0"/>
               <a:t>= </a:t>
             </a:r>
             <a:r>
-              <a:rPr lang="es-ES" sz="1600" b="1" dirty="0" err="1" smtClean="0">
-                <a:solidFill>
-                  <a:srgbClr val="00B0F0"/>
-                </a:solidFill>
-              </a:rPr>
+              <a:rPr lang="es-ES" sz="1600" b="1" dirty="0" err="1" smtClean="0"/>
               <a:t>tuple</a:t>
             </a:r>
             <a:r>
-              <a:rPr lang="es-ES" sz="1600" b="1" dirty="0" smtClean="0">
-                <a:solidFill>
-                  <a:srgbClr val="00B0F0"/>
-                </a:solidFill>
-              </a:rPr>
+              <a:rPr lang="es-ES" sz="1600" b="1" dirty="0" smtClean="0"/>
               <a:t>(</a:t>
             </a:r>
             <a:r>
-              <a:rPr lang="es-ES" sz="1600" b="1" dirty="0" err="1" smtClean="0">
-                <a:solidFill>
-                  <a:srgbClr val="00B0F0"/>
-                </a:solidFill>
-              </a:rPr>
+              <a:rPr lang="es-ES" sz="1600" b="1" dirty="0" err="1" smtClean="0"/>
               <a:t>mylist</a:t>
             </a:r>
             <a:r>
-              <a:rPr lang="es-ES" sz="1600" b="1" dirty="0" smtClean="0">
-                <a:solidFill>
-                  <a:srgbClr val="00B0F0"/>
-                </a:solidFill>
-              </a:rPr>
+              <a:rPr lang="es-ES" sz="1600" b="1" dirty="0" smtClean="0"/>
               <a:t>)</a:t>
             </a:r>
             <a:r>
-              <a:rPr lang="es-ES" sz="1600" b="1" dirty="0">
-                <a:solidFill>
-                  <a:srgbClr val="00B0F0"/>
-                </a:solidFill>
-              </a:rPr>
+              <a:rPr lang="es-ES" sz="1600" b="1" dirty="0"/>
               <a:t/>
             </a:r>
             <a:br>
-              <a:rPr lang="es-ES" sz="1600" b="1" dirty="0">
-                <a:solidFill>
-                  <a:srgbClr val="00B0F0"/>
-                </a:solidFill>
-              </a:rPr>
+              <a:rPr lang="es-ES" sz="1600" b="1" dirty="0"/>
             </a:br>
             <a:r>
-              <a:rPr lang="es-ES" sz="1600" b="1" dirty="0" err="1" smtClean="0">
-                <a:solidFill>
-                  <a:srgbClr val="00B0F0"/>
-                </a:solidFill>
-              </a:rPr>
+              <a:rPr lang="es-ES" sz="1600" b="1" dirty="0" err="1" smtClean="0"/>
               <a:t>print</a:t>
             </a:r>
             <a:r>
-              <a:rPr lang="es-ES" sz="1600" b="1" dirty="0" smtClean="0">
-                <a:solidFill>
-                  <a:srgbClr val="00B0F0"/>
-                </a:solidFill>
-              </a:rPr>
+              <a:rPr lang="es-ES" sz="1600" b="1" dirty="0" smtClean="0"/>
               <a:t>(mytuple)</a:t>
             </a:r>
-            <a:endParaRPr lang="en-IN" sz="1600" b="1" dirty="0" smtClean="0">
-              <a:solidFill>
-                <a:srgbClr val="00B0F0"/>
-              </a:solidFill>
-            </a:endParaRPr>
+            <a:endParaRPr lang="en-IN" sz="1600" b="1" dirty="0" smtClean="0"/>
           </a:p>
           <a:p>
             <a:pPr lvl="1"/>
@@ -4694,119 +4411,59 @@
           <a:p>
             <a:pPr lvl="1"/>
             <a:r>
-              <a:rPr lang="es-ES" sz="1600" b="1" dirty="0">
-                <a:solidFill>
-                  <a:srgbClr val="00B0F0"/>
-                </a:solidFill>
-              </a:rPr>
+              <a:rPr lang="es-ES" sz="1600" b="1" dirty="0"/>
               <a:t>mytuple </a:t>
             </a:r>
             <a:r>
-              <a:rPr lang="en-US" sz="1600" b="1" dirty="0" smtClean="0">
-                <a:solidFill>
-                  <a:srgbClr val="00B0F0"/>
-                </a:solidFill>
-              </a:rPr>
+              <a:rPr lang="en-US" sz="1600" b="1" dirty="0" smtClean="0"/>
               <a:t>= </a:t>
             </a:r>
             <a:r>
-              <a:rPr lang="en-US" sz="1600" b="1" dirty="0">
-                <a:solidFill>
-                  <a:srgbClr val="00B0F0"/>
-                </a:solidFill>
-              </a:rPr>
+              <a:rPr lang="en-US" sz="1600" b="1" dirty="0"/>
               <a:t>("apple", "banana", "cherry")</a:t>
             </a:r>
             <a:br>
-              <a:rPr lang="en-US" sz="1600" b="1" dirty="0">
-                <a:solidFill>
-                  <a:srgbClr val="00B0F0"/>
-                </a:solidFill>
-              </a:rPr>
+              <a:rPr lang="en-US" sz="1600" b="1" dirty="0"/>
             </a:br>
             <a:r>
-              <a:rPr lang="en-US" sz="1600" b="1" dirty="0" smtClean="0">
-                <a:solidFill>
-                  <a:srgbClr val="00B0F0"/>
-                </a:solidFill>
-              </a:rPr>
+              <a:rPr lang="en-US" sz="1600" b="1" dirty="0" smtClean="0"/>
               <a:t>item </a:t>
             </a:r>
             <a:r>
-              <a:rPr lang="en-US" sz="1600" b="1" dirty="0">
-                <a:solidFill>
-                  <a:srgbClr val="00B0F0"/>
-                </a:solidFill>
-              </a:rPr>
+              <a:rPr lang="en-US" sz="1600" b="1" dirty="0"/>
               <a:t>= ("orange",)</a:t>
             </a:r>
             <a:br>
-              <a:rPr lang="en-US" sz="1600" b="1" dirty="0">
-                <a:solidFill>
-                  <a:srgbClr val="00B0F0"/>
-                </a:solidFill>
-              </a:rPr>
+              <a:rPr lang="en-US" sz="1600" b="1" dirty="0"/>
             </a:br>
             <a:r>
-              <a:rPr lang="es-ES" sz="1600" b="1" dirty="0">
-                <a:solidFill>
-                  <a:srgbClr val="00B0F0"/>
-                </a:solidFill>
-              </a:rPr>
+              <a:rPr lang="es-ES" sz="1600" b="1" dirty="0"/>
               <a:t>mytuple </a:t>
             </a:r>
             <a:r>
-              <a:rPr lang="en-US" sz="1600" b="1" dirty="0" smtClean="0">
-                <a:solidFill>
-                  <a:srgbClr val="00B0F0"/>
-                </a:solidFill>
-              </a:rPr>
+              <a:rPr lang="en-US" sz="1600" b="1" dirty="0" smtClean="0"/>
               <a:t>+= item</a:t>
             </a:r>
             <a:r>
-              <a:rPr lang="en-US" sz="1600" b="1" dirty="0">
-                <a:solidFill>
-                  <a:srgbClr val="00B0F0"/>
-                </a:solidFill>
-              </a:rPr>
+              <a:rPr lang="en-US" sz="1600" b="1" dirty="0"/>
               <a:t/>
             </a:r>
             <a:br>
-              <a:rPr lang="en-US" sz="1600" b="1" dirty="0">
-                <a:solidFill>
-                  <a:srgbClr val="00B0F0"/>
-                </a:solidFill>
-              </a:rPr>
+              <a:rPr lang="en-US" sz="1600" b="1" dirty="0"/>
             </a:br>
             <a:r>
-              <a:rPr lang="en-US" sz="1600" b="1" dirty="0" smtClean="0">
-                <a:solidFill>
-                  <a:srgbClr val="00B0F0"/>
-                </a:solidFill>
-              </a:rPr>
+              <a:rPr lang="en-US" sz="1600" b="1" dirty="0" smtClean="0"/>
               <a:t>print(</a:t>
             </a:r>
             <a:r>
-              <a:rPr lang="es-ES" sz="1600" b="1" dirty="0" err="1" smtClean="0">
-                <a:solidFill>
-                  <a:srgbClr val="00B0F0"/>
-                </a:solidFill>
-              </a:rPr>
+              <a:rPr lang="es-ES" sz="1600" b="1" dirty="0" err="1" smtClean="0"/>
               <a:t>mytuple</a:t>
             </a:r>
             <a:r>
-              <a:rPr lang="en-US" sz="1600" b="1" dirty="0" smtClean="0">
-                <a:solidFill>
-                  <a:srgbClr val="00B0F0"/>
-                </a:solidFill>
-              </a:rPr>
+              <a:rPr lang="en-US" sz="1600" b="1" dirty="0" smtClean="0"/>
               <a:t>)</a:t>
             </a:r>
-            <a:endParaRPr lang="en-US" sz="1600" b="1" dirty="0">
-              <a:solidFill>
-                <a:srgbClr val="00B0F0"/>
-              </a:solidFill>
-            </a:endParaRPr>
+            <a:endParaRPr lang="en-US" sz="1600" b="1" dirty="0"/>
           </a:p>
           <a:p>
             <a:r>
@@ -4817,26 +4474,14 @@
           <a:p>
             <a:pPr lvl="1"/>
             <a:r>
-              <a:rPr lang="en-IN" sz="1600" b="1" dirty="0" smtClean="0">
-                <a:solidFill>
-                  <a:srgbClr val="00B0F0"/>
-                </a:solidFill>
-              </a:rPr>
+              <a:rPr lang="en-IN" sz="1600" b="1" dirty="0" smtClean="0"/>
               <a:t>del </a:t>
             </a:r>
             <a:r>
-              <a:rPr lang="en-IN" sz="1600" b="1" dirty="0" err="1" smtClean="0">
-                <a:solidFill>
-                  <a:srgbClr val="00B0F0"/>
-                </a:solidFill>
-              </a:rPr>
+              <a:rPr lang="en-IN" sz="1600" b="1" dirty="0" err="1" smtClean="0"/>
               <a:t>mytuple</a:t>
             </a:r>
-            <a:endParaRPr lang="en-IN" sz="1600" b="1" dirty="0" smtClean="0">
-              <a:solidFill>
-                <a:srgbClr val="00B0F0"/>
-              </a:solidFill>
-            </a:endParaRPr>
+            <a:endParaRPr lang="en-IN" sz="1600" b="1" dirty="0" smtClean="0"/>
           </a:p>
           <a:p>
             <a:r>
@@ -4847,46 +4492,26 @@
           <a:p>
             <a:pPr lvl="1"/>
             <a:r>
-              <a:rPr lang="en-IN" sz="1600" b="1" dirty="0" err="1">
-                <a:solidFill>
-                  <a:srgbClr val="00B0F0"/>
-                </a:solidFill>
-              </a:rPr>
+              <a:rPr lang="en-IN" sz="1600" b="1" dirty="0" err="1"/>
               <a:t>m</a:t>
             </a:r>
             <a:r>
-              <a:rPr lang="en-IN" sz="1600" b="1" dirty="0" err="1" smtClean="0">
-                <a:solidFill>
-                  <a:srgbClr val="00B0F0"/>
-                </a:solidFill>
-              </a:rPr>
+              <a:rPr lang="en-IN" sz="1600" b="1" dirty="0" err="1" smtClean="0"/>
               <a:t>ytuple</a:t>
             </a:r>
             <a:r>
-              <a:rPr lang="en-IN" sz="1600" b="1" dirty="0" smtClean="0">
-                <a:solidFill>
-                  <a:srgbClr val="00B0F0"/>
-                </a:solidFill>
-              </a:rPr>
+              <a:rPr lang="en-IN" sz="1600" b="1" dirty="0" smtClean="0"/>
               <a:t> = tuple1+tuple2</a:t>
             </a:r>
           </a:p>
           <a:p>
             <a:pPr lvl="1"/>
             <a:r>
-              <a:rPr lang="en-US" sz="1600" b="1" dirty="0" err="1" smtClean="0">
-                <a:solidFill>
-                  <a:srgbClr val="00B0F0"/>
-                </a:solidFill>
-              </a:rPr>
+              <a:rPr lang="en-US" sz="1600" b="1" dirty="0" err="1" smtClean="0"/>
               <a:t>mytuple</a:t>
             </a:r>
             <a:r>
-              <a:rPr lang="en-US" sz="1600" b="1" dirty="0" smtClean="0">
-                <a:solidFill>
-                  <a:srgbClr val="00B0F0"/>
-                </a:solidFill>
-              </a:rPr>
+              <a:rPr lang="en-US" sz="1600" b="1" dirty="0" smtClean="0"/>
               <a:t> = tuple*2 </a:t>
             </a:r>
           </a:p>
@@ -5003,154 +4628,78 @@
           <a:p>
             <a:pPr lvl="1"/>
             <a:r>
-              <a:rPr lang="en-US" sz="1600" b="1" dirty="0" err="1" smtClean="0">
-                <a:solidFill>
-                  <a:srgbClr val="00B0F0"/>
-                </a:solidFill>
-              </a:rPr>
+              <a:rPr lang="en-US" sz="1600" b="1" dirty="0" err="1" smtClean="0"/>
               <a:t>mytuple</a:t>
             </a:r>
             <a:r>
-              <a:rPr lang="en-US" sz="1600" b="1" dirty="0" smtClean="0">
-                <a:solidFill>
-                  <a:srgbClr val="00B0F0"/>
-                </a:solidFill>
-              </a:rPr>
+              <a:rPr lang="en-US" sz="1600" b="1" dirty="0" smtClean="0"/>
               <a:t>= (“</a:t>
             </a:r>
             <a:r>
-              <a:rPr lang="en-US" sz="1600" b="1" dirty="0" err="1" smtClean="0">
-                <a:solidFill>
-                  <a:srgbClr val="00B0F0"/>
-                </a:solidFill>
-              </a:rPr>
+              <a:rPr lang="en-US" sz="1600" b="1" dirty="0" err="1" smtClean="0"/>
               <a:t>bmw</a:t>
             </a:r>
             <a:r>
-              <a:rPr lang="en-US" sz="1600" b="1" dirty="0" smtClean="0">
-                <a:solidFill>
-                  <a:srgbClr val="00B0F0"/>
-                </a:solidFill>
-              </a:rPr>
+              <a:rPr lang="en-US" sz="1600" b="1" dirty="0" smtClean="0"/>
               <a:t>",</a:t>
             </a:r>
             <a:r>
-              <a:rPr lang="en-US" sz="1600" b="1" dirty="0">
-                <a:solidFill>
-                  <a:srgbClr val="00B0F0"/>
-                </a:solidFill>
-              </a:rPr>
+              <a:rPr lang="en-US" sz="1600" b="1" dirty="0"/>
               <a:t> </a:t>
             </a:r>
             <a:r>
-              <a:rPr lang="en-US" sz="1600" b="1" dirty="0" smtClean="0">
-                <a:solidFill>
-                  <a:srgbClr val="00B0F0"/>
-                </a:solidFill>
-              </a:rPr>
+              <a:rPr lang="en-US" sz="1600" b="1" dirty="0" smtClean="0"/>
               <a:t>“</a:t>
             </a:r>
             <a:r>
-              <a:rPr lang="en-US" sz="1600" b="1" dirty="0" err="1" smtClean="0">
-                <a:solidFill>
-                  <a:srgbClr val="00B0F0"/>
-                </a:solidFill>
-              </a:rPr>
+              <a:rPr lang="en-US" sz="1600" b="1" dirty="0" err="1" smtClean="0"/>
               <a:t>honda</a:t>
             </a:r>
             <a:r>
-              <a:rPr lang="en-US" sz="1600" b="1" dirty="0" smtClean="0">
-                <a:solidFill>
-                  <a:srgbClr val="00B0F0"/>
-                </a:solidFill>
-              </a:rPr>
+              <a:rPr lang="en-US" sz="1600" b="1" dirty="0" smtClean="0"/>
               <a:t>",</a:t>
             </a:r>
             <a:r>
-              <a:rPr lang="en-US" sz="1600" b="1" dirty="0">
-                <a:solidFill>
-                  <a:srgbClr val="00B0F0"/>
-                </a:solidFill>
-              </a:rPr>
+              <a:rPr lang="en-US" sz="1600" b="1" dirty="0"/>
               <a:t> </a:t>
             </a:r>
             <a:r>
-              <a:rPr lang="en-US" sz="1600" b="1" dirty="0" smtClean="0">
-                <a:solidFill>
-                  <a:srgbClr val="00B0F0"/>
-                </a:solidFill>
-              </a:rPr>
+              <a:rPr lang="en-US" sz="1600" b="1" dirty="0" smtClean="0"/>
               <a:t>“</a:t>
             </a:r>
             <a:r>
-              <a:rPr lang="en-US" sz="1600" b="1" dirty="0" err="1" smtClean="0">
-                <a:solidFill>
-                  <a:srgbClr val="00B0F0"/>
-                </a:solidFill>
-              </a:rPr>
+              <a:rPr lang="en-US" sz="1600" b="1" dirty="0" err="1" smtClean="0"/>
               <a:t>tata</a:t>
             </a:r>
             <a:r>
-              <a:rPr lang="en-US" sz="1600" b="1" dirty="0" smtClean="0">
-                <a:solidFill>
-                  <a:srgbClr val="00B0F0"/>
-                </a:solidFill>
-              </a:rPr>
+              <a:rPr lang="en-US" sz="1600" b="1" dirty="0" smtClean="0"/>
               <a:t>")</a:t>
             </a:r>
             <a:r>
-              <a:rPr lang="en-US" sz="1600" b="1" dirty="0">
-                <a:solidFill>
-                  <a:srgbClr val="00B0F0"/>
-                </a:solidFill>
-              </a:rPr>
+              <a:rPr lang="en-US" sz="1600" b="1" dirty="0"/>
               <a:t/>
             </a:r>
             <a:br>
-              <a:rPr lang="en-US" sz="1600" b="1" dirty="0">
-                <a:solidFill>
-                  <a:srgbClr val="00B0F0"/>
-                </a:solidFill>
-              </a:rPr>
+              <a:rPr lang="en-US" sz="1600" b="1" dirty="0"/>
             </a:br>
             <a:r>
-              <a:rPr lang="en-US" sz="1600" b="1" dirty="0" smtClean="0">
-                <a:solidFill>
-                  <a:srgbClr val="00B0F0"/>
-                </a:solidFill>
-              </a:rPr>
+              <a:rPr lang="en-US" sz="1600" b="1" dirty="0" smtClean="0"/>
               <a:t>(car1, car2, car3) </a:t>
             </a:r>
             <a:r>
-              <a:rPr lang="en-US" sz="1600" b="1" dirty="0">
-                <a:solidFill>
-                  <a:srgbClr val="00B0F0"/>
-                </a:solidFill>
-              </a:rPr>
+              <a:rPr lang="en-US" sz="1600" b="1" dirty="0"/>
               <a:t>= </a:t>
             </a:r>
             <a:r>
-              <a:rPr lang="en-US" sz="1600" b="1" dirty="0" err="1" smtClean="0">
-                <a:solidFill>
-                  <a:srgbClr val="00B0F0"/>
-                </a:solidFill>
-              </a:rPr>
+              <a:rPr lang="en-US" sz="1600" b="1" dirty="0" err="1" smtClean="0"/>
               <a:t>mytuple</a:t>
             </a:r>
             <a:r>
-              <a:rPr lang="es-ES" sz="1600" dirty="0">
-                <a:solidFill>
-                  <a:srgbClr val="00B0F0"/>
-                </a:solidFill>
-              </a:rPr>
+              <a:rPr lang="es-ES" sz="1600" dirty="0"/>
               <a:t/>
             </a:r>
             <a:br>
-              <a:rPr lang="es-ES" sz="1600" dirty="0">
-                <a:solidFill>
-                  <a:srgbClr val="00B0F0"/>
-                </a:solidFill>
-              </a:rPr>
+              <a:rPr lang="es-ES" sz="1600" dirty="0"/>
             </a:br>
             <a:endParaRPr lang="en-US" sz="1600" b="1" dirty="0" smtClean="0"/>
           </a:p>
@@ -5178,97 +4727,61 @@
           <a:p>
             <a:pPr lvl="2"/>
             <a:r>
-              <a:rPr lang="en-US" sz="1600" b="1" dirty="0" err="1">
-                <a:solidFill>
-                  <a:srgbClr val="00B0F0"/>
-                </a:solidFill>
-              </a:rPr>
+              <a:rPr lang="en-US" sz="1600" b="1" dirty="0" err="1"/>
               <a:t>mytuple</a:t>
             </a:r>
             <a:r>
-              <a:rPr lang="en-US" sz="1600" b="1" dirty="0">
-                <a:solidFill>
-                  <a:srgbClr val="00B0F0"/>
-                </a:solidFill>
-              </a:rPr>
+              <a:rPr lang="en-US" sz="1600" b="1" dirty="0"/>
               <a:t>= (“</a:t>
             </a:r>
             <a:r>
-              <a:rPr lang="en-US" sz="1600" b="1" dirty="0" err="1">
-                <a:solidFill>
-                  <a:srgbClr val="00B0F0"/>
-                </a:solidFill>
-              </a:rPr>
+              <a:rPr lang="en-US" sz="1600" b="1" dirty="0" err="1"/>
               <a:t>bmw</a:t>
             </a:r>
             <a:r>
-              <a:rPr lang="en-US" sz="1600" b="1" dirty="0">
-                <a:solidFill>
-                  <a:srgbClr val="00B0F0"/>
-                </a:solidFill>
-              </a:rPr>
+              <a:rPr lang="en-US" sz="1600" b="1" dirty="0"/>
               <a:t>", “</a:t>
             </a:r>
             <a:r>
-              <a:rPr lang="en-US" sz="1600" b="1" dirty="0" err="1">
-                <a:solidFill>
-                  <a:srgbClr val="00B0F0"/>
-                </a:solidFill>
-              </a:rPr>
+              <a:rPr lang="en-US" sz="1600" b="1" dirty="0" err="1"/>
               <a:t>honda</a:t>
             </a:r>
             <a:r>
-              <a:rPr lang="en-US" sz="1600" b="1" dirty="0">
-                <a:solidFill>
-                  <a:srgbClr val="00B0F0"/>
-                </a:solidFill>
-              </a:rPr>
+              <a:rPr lang="en-US" sz="1600" b="1" dirty="0"/>
               <a:t>", “</a:t>
             </a:r>
             <a:r>
-              <a:rPr lang="en-US" sz="1600" b="1" dirty="0" err="1">
-                <a:solidFill>
-                  <a:srgbClr val="00B0F0"/>
-                </a:solidFill>
-              </a:rPr>
+              <a:rPr lang="en-US" sz="1600" b="1" dirty="0" err="1" smtClean="0"/>
               <a:t>tata</a:t>
             </a:r>
             <a:r>
-              <a:rPr lang="en-US" sz="1600" b="1" dirty="0">
-                <a:solidFill>
-                  <a:srgbClr val="00B0F0"/>
-                </a:solidFill>
-              </a:rPr>
-              <a:t>")</a:t>
+              <a:rPr lang="en-US" sz="1600" b="1" dirty="0" smtClean="0"/>
+              <a:t>“,”tesla”)</a:t>
+            </a:r>
+            <a:r>
+              <a:rPr lang="en-US" sz="1600" b="1" dirty="0"/>
+              <a:t/>
             </a:r>
             <a:br>
-              <a:rPr lang="en-US" sz="1600" b="1" dirty="0">
-                <a:solidFill>
-                  <a:srgbClr val="00B0F0"/>
-                </a:solidFill>
-              </a:rPr>
+              <a:rPr lang="en-US" sz="1600" b="1" dirty="0"/>
             </a:br>
             <a:r>
-              <a:rPr lang="en-US" sz="1600" b="1" dirty="0">
-                <a:solidFill>
-                  <a:srgbClr val="00B0F0"/>
-                </a:solidFill>
-              </a:rPr>
-              <a:t>(car1, cars*) = </a:t>
-            </a:r>
-            <a:r>
-              <a:rPr lang="en-US" sz="1600" b="1" dirty="0" err="1">
-                <a:solidFill>
-                  <a:srgbClr val="00B0F0"/>
-                </a:solidFill>
-              </a:rPr>
+              <a:rPr lang="en-US" sz="1600" b="1" dirty="0"/>
+              <a:t>(car1, cars</a:t>
+            </a:r>
+            <a:r>
+              <a:rPr lang="en-US" sz="1600" b="1" dirty="0" smtClean="0"/>
+              <a:t>*,car2) </a:t>
+            </a:r>
+            <a:r>
+              <a:rPr lang="en-US" sz="1600" b="1" dirty="0"/>
+              <a:t>= </a:t>
+            </a:r>
+            <a:r>
+              <a:rPr lang="en-US" sz="1600" b="1" dirty="0" err="1"/>
               <a:t>mytuple</a:t>
             </a:r>
-            <a:endParaRPr lang="en-US" sz="1600" b="1" dirty="0">
-              <a:solidFill>
-                <a:srgbClr val="00B0F0"/>
-              </a:solidFill>
-            </a:endParaRPr>
+            <a:endParaRPr lang="en-US" sz="1600" b="1" dirty="0"/>
           </a:p>
           <a:p>
             <a:endParaRPr lang="en-US" sz="1600" b="1" dirty="0" smtClean="0"/>
@@ -5287,113 +4800,57 @@
           <a:p>
             <a:pPr lvl="2"/>
             <a:r>
-              <a:rPr lang="en-US" sz="1600" b="1" dirty="0" err="1" smtClean="0">
-                <a:solidFill>
-                  <a:srgbClr val="00B0F0"/>
-                </a:solidFill>
-              </a:rPr>
+              <a:rPr lang="en-US" sz="1600" b="1" dirty="0" err="1" smtClean="0"/>
               <a:t>mytuple</a:t>
             </a:r>
             <a:r>
-              <a:rPr lang="en-US" sz="1600" b="1" dirty="0">
-                <a:solidFill>
-                  <a:srgbClr val="00B0F0"/>
-                </a:solidFill>
-              </a:rPr>
+              <a:rPr lang="en-US" sz="1600" b="1" dirty="0"/>
               <a:t>= (“</a:t>
             </a:r>
             <a:r>
-              <a:rPr lang="en-US" sz="1600" b="1" dirty="0" err="1">
-                <a:solidFill>
-                  <a:srgbClr val="00B0F0"/>
-                </a:solidFill>
-              </a:rPr>
+              <a:rPr lang="en-US" sz="1600" b="1" dirty="0" err="1"/>
               <a:t>bmw</a:t>
             </a:r>
             <a:r>
-              <a:rPr lang="en-US" sz="1600" b="1" dirty="0">
-                <a:solidFill>
-                  <a:srgbClr val="00B0F0"/>
-                </a:solidFill>
-              </a:rPr>
+              <a:rPr lang="en-US" sz="1600" b="1" dirty="0"/>
               <a:t>", “</a:t>
             </a:r>
             <a:r>
-              <a:rPr lang="en-US" sz="1600" b="1" dirty="0" err="1">
-                <a:solidFill>
-                  <a:srgbClr val="00B0F0"/>
-                </a:solidFill>
-              </a:rPr>
+              <a:rPr lang="en-US" sz="1600" b="1" dirty="0" err="1"/>
               <a:t>honda</a:t>
             </a:r>
             <a:r>
-              <a:rPr lang="en-US" sz="1600" b="1" dirty="0">
-                <a:solidFill>
-                  <a:srgbClr val="00B0F0"/>
-                </a:solidFill>
-              </a:rPr>
+              <a:rPr lang="en-US" sz="1600" b="1" dirty="0"/>
               <a:t>", “</a:t>
             </a:r>
             <a:r>
-              <a:rPr lang="en-US" sz="1600" b="1" dirty="0" err="1">
-                <a:solidFill>
-                  <a:srgbClr val="00B0F0"/>
-                </a:solidFill>
-              </a:rPr>
+              <a:rPr lang="en-US" sz="1600" b="1" dirty="0" err="1"/>
               <a:t>tata</a:t>
             </a:r>
             <a:r>
-              <a:rPr lang="en-US" sz="1600" b="1" dirty="0">
-                <a:solidFill>
-                  <a:srgbClr val="00B0F0"/>
-                </a:solidFill>
-              </a:rPr>
+              <a:rPr lang="en-US" sz="1600" b="1" dirty="0"/>
               <a:t>")</a:t>
             </a:r>
             <a:br>
-              <a:rPr lang="en-US" sz="1600" b="1" dirty="0">
-                <a:solidFill>
-                  <a:srgbClr val="00B0F0"/>
-                </a:solidFill>
-              </a:rPr>
+              <a:rPr lang="en-US" sz="1600" b="1" dirty="0"/>
             </a:br>
             <a:r>
-              <a:rPr lang="en-US" sz="1600" b="1" dirty="0">
-                <a:solidFill>
-                  <a:srgbClr val="00B0F0"/>
-                </a:solidFill>
-              </a:rPr>
+              <a:rPr lang="en-US" sz="1600" b="1" dirty="0"/>
               <a:t>(</a:t>
             </a:r>
             <a:r>
-              <a:rPr lang="en-US" sz="1600" b="1" dirty="0" smtClean="0">
-                <a:solidFill>
-                  <a:srgbClr val="00B0F0"/>
-                </a:solidFill>
-              </a:rPr>
+              <a:rPr lang="en-US" sz="1600" b="1" dirty="0" smtClean="0"/>
               <a:t>cars*, car) </a:t>
             </a:r>
             <a:r>
-              <a:rPr lang="en-US" sz="1600" b="1" dirty="0">
-                <a:solidFill>
-                  <a:srgbClr val="00B0F0"/>
-                </a:solidFill>
-              </a:rPr>
+              <a:rPr lang="en-US" sz="1600" b="1" dirty="0"/>
               <a:t>= </a:t>
             </a:r>
             <a:r>
-              <a:rPr lang="en-US" sz="1600" b="1" dirty="0" err="1" smtClean="0">
-                <a:solidFill>
-                  <a:srgbClr val="00B0F0"/>
-                </a:solidFill>
-              </a:rPr>
+              <a:rPr lang="en-US" sz="1600" b="1" dirty="0" err="1" smtClean="0"/>
               <a:t>mytuple</a:t>
             </a:r>
-            <a:endParaRPr lang="en-US" sz="1600" b="1" dirty="0" smtClean="0">
-              <a:solidFill>
-                <a:srgbClr val="00B0F0"/>
-              </a:solidFill>
-            </a:endParaRPr>
+            <a:endParaRPr lang="en-US" sz="1600" b="1" dirty="0" smtClean="0"/>
           </a:p>
           <a:p>
             <a:pPr lvl="2"/>
@@ -5416,97 +4873,1753 @@
           <a:p>
             <a:pPr lvl="1"/>
             <a:r>
-              <a:rPr lang="en-IN" sz="1600" b="1" dirty="0">
-                <a:solidFill>
-                  <a:srgbClr val="00B0F0"/>
-                </a:solidFill>
-              </a:rPr>
+              <a:rPr lang="en-IN" sz="1600" b="1" dirty="0"/>
               <a:t>for x in </a:t>
             </a:r>
             <a:r>
-              <a:rPr lang="en-IN" sz="1600" b="1" dirty="0" err="1" smtClean="0">
-                <a:solidFill>
-                  <a:srgbClr val="00B0F0"/>
-                </a:solidFill>
-              </a:rPr>
+              <a:rPr lang="en-IN" sz="1600" b="1" dirty="0" err="1" smtClean="0"/>
               <a:t>thistuple</a:t>
             </a:r>
-            <a:endParaRPr lang="en-IN" sz="1600" b="1" dirty="0">
+            <a:endParaRPr lang="en-IN" sz="1600" b="1" dirty="0"/>
+          </a:p>
+          <a:p>
+            <a:pPr lvl="1"/>
+            <a:r>
+              <a:rPr lang="en-IN" sz="1600" b="1" dirty="0"/>
+              <a:t>for </a:t>
+            </a:r>
+            <a:r>
+              <a:rPr lang="en-IN" sz="1600" b="1" dirty="0" err="1"/>
+              <a:t>i</a:t>
+            </a:r>
+            <a:r>
+              <a:rPr lang="en-IN" sz="1600" b="1" dirty="0"/>
+              <a:t> in range(</a:t>
+            </a:r>
+            <a:r>
+              <a:rPr lang="en-IN" sz="1600" b="1" dirty="0" err="1"/>
+              <a:t>len</a:t>
+            </a:r>
+            <a:r>
+              <a:rPr lang="en-IN" sz="1600" b="1" dirty="0"/>
+              <a:t>(</a:t>
+            </a:r>
+            <a:r>
+              <a:rPr lang="en-IN" sz="1600" b="1" dirty="0" err="1"/>
+              <a:t>thistuple</a:t>
+            </a:r>
+            <a:r>
+              <a:rPr lang="en-IN" sz="1600" b="1" dirty="0" smtClean="0"/>
+              <a:t>))</a:t>
+            </a:r>
+            <a:endParaRPr lang="en-IN" sz="1600" b="1" dirty="0"/>
+          </a:p>
+        </p:txBody>
+      </p:sp>
+    </p:spTree>
+    <p:extLst>
+      <p:ext uri="{BB962C8B-B14F-4D97-AF65-F5344CB8AC3E}">
+        <p14:creationId xmlns:p14="http://schemas.microsoft.com/office/powerpoint/2010/main" val="3335166251"/>
+      </p:ext>
+    </p:extLst>
+  </p:cSld>
+  <p:clrMapOvr>
+    <a:masterClrMapping/>
+  </p:clrMapOvr>
+  <p:timing>
+    <p:tnLst>
+      <p:par>
+        <p:cTn id="1" dur="indefinite" restart="never" nodeType="tmRoot"/>
+      </p:par>
+    </p:tnLst>
+  </p:timing>
+</p:sld>
+</file>
+
+<file path=ppt/slides/slide14.xml><?xml version="1.0" encoding="utf-8"?>
+<p:sld xmlns:a="http://schemas.openxmlformats.org/drawingml/2006/main" xmlns:r="http://schemas.openxmlformats.org/officeDocument/2006/relationships" xmlns:p="http://schemas.openxmlformats.org/presentationml/2006/main">
+  <p:cSld>
+    <p:spTree>
+      <p:nvGrpSpPr>
+        <p:cNvPr id="1" name=""/>
+        <p:cNvGrpSpPr/>
+        <p:nvPr/>
+      </p:nvGrpSpPr>
+      <p:grpSpPr>
+        <a:xfrm>
+          <a:off x="0" y="0"/>
+          <a:ext cx="0" cy="0"/>
+          <a:chOff x="0" y="0"/>
+          <a:chExt cx="0" cy="0"/>
+        </a:xfrm>
+      </p:grpSpPr>
+      <p:sp>
+        <p:nvSpPr>
+          <p:cNvPr id="2" name="Title 1"/>
+          <p:cNvSpPr>
+            <a:spLocks noGrp="1"/>
+          </p:cNvSpPr>
+          <p:nvPr>
+            <p:ph type="title"/>
+          </p:nvPr>
+        </p:nvSpPr>
+        <p:spPr>
+          <a:xfrm>
+            <a:off x="457200" y="116632"/>
+            <a:ext cx="8435280" cy="648072"/>
+          </a:xfrm>
+        </p:spPr>
+        <p:txBody>
+          <a:bodyPr>
+            <a:normAutofit fontScale="90000"/>
+          </a:bodyPr>
+          <a:lstStyle/>
+          <a:p>
+            <a:pPr algn="ctr"/>
+            <a:r>
+              <a:rPr lang="en-US" dirty="0" smtClean="0"/>
+              <a:t>Set</a:t>
+            </a:r>
+            <a:endParaRPr lang="en-IN" dirty="0"/>
+          </a:p>
+        </p:txBody>
+      </p:sp>
+      <p:sp>
+        <p:nvSpPr>
+          <p:cNvPr id="3" name="Content Placeholder 2"/>
+          <p:cNvSpPr>
+            <a:spLocks noGrp="1"/>
+          </p:cNvSpPr>
+          <p:nvPr>
+            <p:ph idx="1"/>
+          </p:nvPr>
+        </p:nvSpPr>
+        <p:spPr>
+          <a:xfrm>
+            <a:off x="457200" y="836712"/>
+            <a:ext cx="8229600" cy="5904656"/>
+          </a:xfrm>
+        </p:spPr>
+        <p:txBody>
+          <a:bodyPr>
+            <a:noAutofit/>
+          </a:bodyPr>
+          <a:lstStyle/>
+          <a:p>
+            <a:r>
+              <a:rPr lang="en-US" sz="1800" dirty="0" smtClean="0"/>
+              <a:t>Syntax</a:t>
+            </a:r>
+            <a:r>
+              <a:rPr lang="en-US" sz="1800" dirty="0"/>
+              <a:t> </a:t>
+            </a:r>
+            <a:r>
+              <a:rPr lang="en-US" sz="1800" dirty="0" smtClean="0"/>
+              <a:t>: </a:t>
+            </a:r>
+            <a:r>
+              <a:rPr lang="en-US" sz="1800" b="1" dirty="0" err="1" smtClean="0"/>
+              <a:t>myset</a:t>
+            </a:r>
+            <a:r>
+              <a:rPr lang="en-US" sz="1800" b="1" dirty="0" smtClean="0"/>
+              <a:t>= </a:t>
+            </a:r>
+            <a:r>
+              <a:rPr lang="en-US" sz="1800" b="1" dirty="0"/>
+              <a:t>{</a:t>
+            </a:r>
+            <a:r>
+              <a:rPr lang="en-US" sz="1800" b="1" dirty="0" smtClean="0"/>
+              <a:t>1,2,3}</a:t>
+            </a:r>
+          </a:p>
+          <a:p>
+            <a:r>
+              <a:rPr lang="en-US" sz="1800" dirty="0"/>
+              <a:t>Set items are unordered, unchangeable, and do not allow duplicate values</a:t>
+            </a:r>
+            <a:endParaRPr lang="en-US" sz="1800" dirty="0" smtClean="0"/>
+          </a:p>
+          <a:p>
+            <a:r>
+              <a:rPr lang="en-US" sz="1800" dirty="0"/>
+              <a:t>Set items can appear in a different order every time you use them, and cannot be referred to by index or key</a:t>
+            </a:r>
+            <a:r>
+              <a:rPr lang="en-US" sz="1800" dirty="0" smtClean="0"/>
+              <a:t>.</a:t>
+            </a:r>
+          </a:p>
+          <a:p>
+            <a:r>
+              <a:rPr lang="en-US" sz="1800" dirty="0"/>
+              <a:t>Set </a:t>
+            </a:r>
+            <a:r>
+              <a:rPr lang="en-US" sz="1800" i="1" dirty="0"/>
+              <a:t>items</a:t>
+            </a:r>
+            <a:r>
+              <a:rPr lang="en-US" sz="1800" dirty="0"/>
+              <a:t> are unchangeable, but you can remove items and add new </a:t>
+            </a:r>
+            <a:r>
+              <a:rPr lang="en-US" sz="1800" dirty="0" smtClean="0"/>
+              <a:t>items.</a:t>
+            </a:r>
+          </a:p>
+          <a:p>
+            <a:r>
+              <a:rPr lang="en-US" sz="1800" dirty="0" smtClean="0"/>
+              <a:t>Length : </a:t>
+            </a:r>
+            <a:r>
+              <a:rPr lang="en-US" sz="1800" dirty="0" err="1" smtClean="0"/>
+              <a:t>len</a:t>
+            </a:r>
+            <a:r>
+              <a:rPr lang="en-US" sz="1800" dirty="0" smtClean="0"/>
+              <a:t>(</a:t>
+            </a:r>
+            <a:r>
+              <a:rPr lang="en-US" sz="1800" b="1" dirty="0" err="1"/>
+              <a:t>myset</a:t>
+            </a:r>
+            <a:r>
+              <a:rPr lang="en-US" sz="1800" dirty="0" smtClean="0"/>
+              <a:t>)</a:t>
+            </a:r>
+          </a:p>
+          <a:p>
+            <a:r>
+              <a:rPr lang="en-US" sz="1800" b="1" dirty="0" smtClean="0"/>
+              <a:t>Set creation using Set() constructor</a:t>
+            </a:r>
+          </a:p>
+          <a:p>
+            <a:pPr lvl="1"/>
+            <a:r>
+              <a:rPr lang="en-US" sz="1800" b="1" dirty="0" err="1"/>
+              <a:t>myset</a:t>
+            </a:r>
+            <a:r>
+              <a:rPr lang="en-US" sz="1800" b="1" dirty="0"/>
+              <a:t> = </a:t>
+            </a:r>
+            <a:r>
+              <a:rPr lang="en-US" sz="1800" b="1" dirty="0" smtClean="0"/>
+              <a:t>set((1,2,3))</a:t>
+            </a:r>
+          </a:p>
+        </p:txBody>
+      </p:sp>
+    </p:spTree>
+    <p:extLst>
+      <p:ext uri="{BB962C8B-B14F-4D97-AF65-F5344CB8AC3E}">
+        <p14:creationId xmlns:p14="http://schemas.microsoft.com/office/powerpoint/2010/main" val="2789248985"/>
+      </p:ext>
+    </p:extLst>
+  </p:cSld>
+  <p:clrMapOvr>
+    <a:masterClrMapping/>
+  </p:clrMapOvr>
+  <p:timing>
+    <p:tnLst>
+      <p:par>
+        <p:cTn id="1" dur="indefinite" restart="never" nodeType="tmRoot"/>
+      </p:par>
+    </p:tnLst>
+  </p:timing>
+</p:sld>
+</file>
+
+<file path=ppt/slides/slide15.xml><?xml version="1.0" encoding="utf-8"?>
+<p:sld xmlns:a="http://schemas.openxmlformats.org/drawingml/2006/main" xmlns:r="http://schemas.openxmlformats.org/officeDocument/2006/relationships" xmlns:p="http://schemas.openxmlformats.org/presentationml/2006/main">
+  <p:cSld>
+    <p:spTree>
+      <p:nvGrpSpPr>
+        <p:cNvPr id="1" name=""/>
+        <p:cNvGrpSpPr/>
+        <p:nvPr/>
+      </p:nvGrpSpPr>
+      <p:grpSpPr>
+        <a:xfrm>
+          <a:off x="0" y="0"/>
+          <a:ext cx="0" cy="0"/>
+          <a:chOff x="0" y="0"/>
+          <a:chExt cx="0" cy="0"/>
+        </a:xfrm>
+      </p:grpSpPr>
+      <p:sp>
+        <p:nvSpPr>
+          <p:cNvPr id="2" name="Title 1"/>
+          <p:cNvSpPr>
+            <a:spLocks noGrp="1"/>
+          </p:cNvSpPr>
+          <p:nvPr>
+            <p:ph type="title"/>
+          </p:nvPr>
+        </p:nvSpPr>
+        <p:spPr>
+          <a:xfrm>
+            <a:off x="457200" y="267494"/>
+            <a:ext cx="8229600" cy="713234"/>
+          </a:xfrm>
+        </p:spPr>
+        <p:txBody>
+          <a:bodyPr>
+            <a:normAutofit fontScale="90000"/>
+          </a:bodyPr>
+          <a:lstStyle/>
+          <a:p>
+            <a:pPr algn="ctr"/>
+            <a:r>
+              <a:rPr lang="en-US" dirty="0" smtClean="0"/>
+              <a:t>Set(access items, add items)</a:t>
+            </a:r>
+            <a:endParaRPr lang="en-IN" dirty="0"/>
+          </a:p>
+        </p:txBody>
+      </p:sp>
+      <p:sp>
+        <p:nvSpPr>
+          <p:cNvPr id="3" name="Content Placeholder 2"/>
+          <p:cNvSpPr>
+            <a:spLocks noGrp="1"/>
+          </p:cNvSpPr>
+          <p:nvPr>
+            <p:ph idx="1"/>
+          </p:nvPr>
+        </p:nvSpPr>
+        <p:spPr>
+          <a:xfrm>
+            <a:off x="457200" y="980728"/>
+            <a:ext cx="8229600" cy="5474080"/>
+          </a:xfrm>
+        </p:spPr>
+        <p:txBody>
+          <a:bodyPr>
+            <a:normAutofit lnSpcReduction="10000"/>
+          </a:bodyPr>
+          <a:lstStyle/>
+          <a:p>
+            <a:pPr marL="64008" indent="0">
+              <a:buNone/>
+            </a:pPr>
+            <a:r>
+              <a:rPr lang="en-US" sz="1600" b="1" u="sng" dirty="0" smtClean="0"/>
+              <a:t>Access Items</a:t>
+            </a:r>
+          </a:p>
+          <a:p>
+            <a:r>
+              <a:rPr lang="en-US" sz="1600" dirty="0" smtClean="0"/>
+              <a:t>You </a:t>
+            </a:r>
+            <a:r>
+              <a:rPr lang="en-US" sz="1600" dirty="0"/>
+              <a:t>cannot access items in a set by referring to an index or a key</a:t>
+            </a:r>
+            <a:endParaRPr lang="en-US" sz="1600" dirty="0" smtClean="0"/>
+          </a:p>
+          <a:p>
+            <a:r>
+              <a:rPr lang="en-US" sz="1600" dirty="0" smtClean="0"/>
+              <a:t>Looping through the set</a:t>
+            </a:r>
+          </a:p>
+          <a:p>
+            <a:pPr lvl="1"/>
+            <a:r>
+              <a:rPr lang="en-IN" sz="1600" b="1" dirty="0" smtClean="0"/>
+              <a:t>for item in </a:t>
+            </a:r>
+            <a:r>
+              <a:rPr lang="en-IN" sz="1600" b="1" dirty="0" err="1" smtClean="0"/>
+              <a:t>myset</a:t>
+            </a:r>
+            <a:r>
+              <a:rPr lang="en-IN" sz="1600" b="1" dirty="0" smtClean="0"/>
+              <a:t>:</a:t>
+            </a:r>
+            <a:endParaRPr lang="en-US" sz="1600" b="1" dirty="0"/>
+          </a:p>
+          <a:p>
+            <a:r>
+              <a:rPr lang="en-US" sz="1600" dirty="0" smtClean="0"/>
+              <a:t>‘in’ operator</a:t>
+            </a:r>
+          </a:p>
+          <a:p>
+            <a:pPr lvl="1"/>
+            <a:r>
+              <a:rPr lang="en-US" sz="1600" b="1" dirty="0" smtClean="0"/>
+              <a:t>Item in </a:t>
+            </a:r>
+            <a:r>
+              <a:rPr lang="en-IN" sz="1600" b="1" dirty="0" err="1"/>
+              <a:t>myset</a:t>
+            </a:r>
+            <a:r>
+              <a:rPr lang="en-IN" sz="1600" b="1" dirty="0"/>
+              <a:t> </a:t>
+            </a:r>
+          </a:p>
+          <a:p>
+            <a:pPr lvl="1"/>
+            <a:endParaRPr lang="en-IN" sz="1600" b="1" dirty="0" smtClean="0"/>
+          </a:p>
+          <a:p>
+            <a:pPr marL="64008" indent="0">
+              <a:buNone/>
+            </a:pPr>
+            <a:r>
+              <a:rPr lang="en-US" sz="1600" b="1" u="sng" dirty="0" smtClean="0"/>
+              <a:t>Add </a:t>
+            </a:r>
+            <a:r>
+              <a:rPr lang="en-US" sz="1600" b="1" u="sng" dirty="0"/>
+              <a:t>Items</a:t>
+            </a:r>
+          </a:p>
+          <a:p>
+            <a:r>
+              <a:rPr lang="en-US" sz="1600" dirty="0"/>
+              <a:t>Once a set is created, you cannot change its items, but you can add new items</a:t>
+            </a:r>
+            <a:r>
+              <a:rPr lang="en-US" sz="1600" dirty="0" smtClean="0"/>
+              <a:t>.</a:t>
+            </a:r>
+          </a:p>
+          <a:p>
+            <a:r>
+              <a:rPr lang="en-IN" sz="1600" b="1" dirty="0" err="1"/>
+              <a:t>m</a:t>
+            </a:r>
+            <a:r>
+              <a:rPr lang="en-IN" sz="1600" b="1" dirty="0" err="1" smtClean="0"/>
+              <a:t>yset.add</a:t>
+            </a:r>
+            <a:r>
+              <a:rPr lang="en-IN" sz="1600" b="1" dirty="0" smtClean="0"/>
+              <a:t>(4)</a:t>
+            </a:r>
+          </a:p>
+          <a:p>
+            <a:r>
+              <a:rPr lang="en-US" sz="1600" dirty="0" smtClean="0"/>
+              <a:t>Add set in set </a:t>
+            </a:r>
+          </a:p>
+          <a:p>
+            <a:pPr lvl="1"/>
+            <a:r>
+              <a:rPr lang="en-US" sz="1600" b="1" dirty="0"/>
+              <a:t>myset1 = {1,2,3}</a:t>
+            </a:r>
+          </a:p>
+          <a:p>
+            <a:pPr lvl="1"/>
+            <a:r>
+              <a:rPr lang="en-US" sz="1600" b="1" dirty="0"/>
+              <a:t>myset2 = {4,5}</a:t>
+            </a:r>
+          </a:p>
+          <a:p>
+            <a:pPr lvl="1"/>
+            <a:r>
+              <a:rPr lang="en-US" sz="1600" b="1" dirty="0"/>
+              <a:t>myset1.update(myset2)</a:t>
+            </a:r>
+          </a:p>
+          <a:p>
+            <a:r>
+              <a:rPr lang="en-US" sz="1600" dirty="0"/>
+              <a:t>Add </a:t>
+            </a:r>
+            <a:r>
+              <a:rPr lang="en-US" sz="1600" dirty="0" smtClean="0"/>
+              <a:t>any </a:t>
+            </a:r>
+            <a:r>
+              <a:rPr lang="en-US" sz="1600" dirty="0" err="1" smtClean="0"/>
+              <a:t>iterable</a:t>
+            </a:r>
+            <a:endParaRPr lang="en-US" sz="1600" dirty="0"/>
+          </a:p>
+          <a:p>
+            <a:pPr lvl="1"/>
+            <a:r>
+              <a:rPr lang="en-US" sz="1600" b="1" dirty="0"/>
+              <a:t>myset1 = {1,2,3}</a:t>
+            </a:r>
+          </a:p>
+          <a:p>
+            <a:pPr lvl="1"/>
+            <a:r>
+              <a:rPr lang="en-US" sz="1600" b="1" dirty="0"/>
+              <a:t>list1 = [4,5]</a:t>
+            </a:r>
+          </a:p>
+          <a:p>
+            <a:pPr lvl="1"/>
+            <a:r>
+              <a:rPr lang="en-US" sz="1600" b="1" dirty="0"/>
+              <a:t>myset1.update(list1)</a:t>
+            </a:r>
+          </a:p>
+          <a:p>
+            <a:pPr lvl="1"/>
+            <a:endParaRPr lang="en-US" sz="1600" b="1" dirty="0" smtClean="0"/>
+          </a:p>
+        </p:txBody>
+      </p:sp>
+    </p:spTree>
+    <p:extLst>
+      <p:ext uri="{BB962C8B-B14F-4D97-AF65-F5344CB8AC3E}">
+        <p14:creationId xmlns:p14="http://schemas.microsoft.com/office/powerpoint/2010/main" val="3963479758"/>
+      </p:ext>
+    </p:extLst>
+  </p:cSld>
+  <p:clrMapOvr>
+    <a:masterClrMapping/>
+  </p:clrMapOvr>
+  <p:timing>
+    <p:tnLst>
+      <p:par>
+        <p:cTn id="1" dur="indefinite" restart="never" nodeType="tmRoot"/>
+      </p:par>
+    </p:tnLst>
+  </p:timing>
+</p:sld>
+</file>
+
+<file path=ppt/slides/slide16.xml><?xml version="1.0" encoding="utf-8"?>
+<p:sld xmlns:a="http://schemas.openxmlformats.org/drawingml/2006/main" xmlns:r="http://schemas.openxmlformats.org/officeDocument/2006/relationships" xmlns:p="http://schemas.openxmlformats.org/presentationml/2006/main">
+  <p:cSld>
+    <p:spTree>
+      <p:nvGrpSpPr>
+        <p:cNvPr id="1" name=""/>
+        <p:cNvGrpSpPr/>
+        <p:nvPr/>
+      </p:nvGrpSpPr>
+      <p:grpSpPr>
+        <a:xfrm>
+          <a:off x="0" y="0"/>
+          <a:ext cx="0" cy="0"/>
+          <a:chOff x="0" y="0"/>
+          <a:chExt cx="0" cy="0"/>
+        </a:xfrm>
+      </p:grpSpPr>
+      <p:sp>
+        <p:nvSpPr>
+          <p:cNvPr id="2" name="Title 1"/>
+          <p:cNvSpPr>
+            <a:spLocks noGrp="1"/>
+          </p:cNvSpPr>
+          <p:nvPr>
+            <p:ph type="title"/>
+          </p:nvPr>
+        </p:nvSpPr>
+        <p:spPr>
+          <a:xfrm>
+            <a:off x="457200" y="267494"/>
+            <a:ext cx="8229600" cy="641226"/>
+          </a:xfrm>
+        </p:spPr>
+        <p:txBody>
+          <a:bodyPr>
+            <a:normAutofit fontScale="90000"/>
+          </a:bodyPr>
+          <a:lstStyle/>
+          <a:p>
+            <a:pPr algn="ctr"/>
+            <a:r>
+              <a:rPr lang="en-US" dirty="0" smtClean="0"/>
+              <a:t>Set(remove items)</a:t>
+            </a:r>
+            <a:endParaRPr lang="en-IN" dirty="0"/>
+          </a:p>
+        </p:txBody>
+      </p:sp>
+      <p:sp>
+        <p:nvSpPr>
+          <p:cNvPr id="3" name="Content Placeholder 2"/>
+          <p:cNvSpPr>
+            <a:spLocks noGrp="1"/>
+          </p:cNvSpPr>
+          <p:nvPr>
+            <p:ph idx="1"/>
+          </p:nvPr>
+        </p:nvSpPr>
+        <p:spPr>
+          <a:xfrm>
+            <a:off x="395536" y="1124744"/>
+            <a:ext cx="8229600" cy="5402072"/>
+          </a:xfrm>
+        </p:spPr>
+        <p:txBody>
+          <a:bodyPr>
+            <a:normAutofit/>
+          </a:bodyPr>
+          <a:lstStyle/>
+          <a:p>
+            <a:r>
+              <a:rPr lang="en-US" sz="1600" dirty="0" smtClean="0"/>
+              <a:t>To </a:t>
+            </a:r>
+            <a:r>
+              <a:rPr lang="en-US" sz="1600" dirty="0"/>
+              <a:t>remove an item in a set, use the remove(), or the discard() </a:t>
+            </a:r>
+            <a:r>
+              <a:rPr lang="en-US" sz="1600" dirty="0" smtClean="0"/>
+              <a:t>method</a:t>
+            </a:r>
+            <a:endParaRPr lang="en-US" sz="1600" b="1" dirty="0" smtClean="0"/>
+          </a:p>
+          <a:p>
+            <a:pPr marL="64008" indent="0">
+              <a:buNone/>
+            </a:pPr>
+            <a:r>
+              <a:rPr lang="es-ES" sz="1600" b="1" dirty="0" smtClean="0"/>
+              <a:t>	</a:t>
+            </a:r>
+            <a:r>
+              <a:rPr lang="es-ES" sz="1600" b="1" dirty="0" err="1" smtClean="0"/>
+              <a:t>myset.remove</a:t>
+            </a:r>
+            <a:r>
+              <a:rPr lang="es-ES" sz="1600" b="1" dirty="0" smtClean="0"/>
+              <a:t>(“</a:t>
+            </a:r>
+            <a:r>
+              <a:rPr lang="es-ES" sz="1600" b="1" dirty="0" err="1" smtClean="0"/>
+              <a:t>bmw</a:t>
+            </a:r>
+            <a:r>
+              <a:rPr lang="es-ES" sz="1600" b="1" dirty="0" smtClean="0"/>
+              <a:t>”)</a:t>
+            </a:r>
+            <a:r>
+              <a:rPr lang="en-IN" sz="1600" b="1" dirty="0" smtClean="0"/>
+              <a:t>	</a:t>
+            </a:r>
+          </a:p>
+          <a:p>
+            <a:pPr lvl="1"/>
+            <a:endParaRPr lang="en-US" sz="1600" b="1" dirty="0" smtClean="0"/>
+          </a:p>
+          <a:p>
+            <a:r>
+              <a:rPr lang="en-US" sz="1600" dirty="0"/>
+              <a:t>To remove an item in a set, use the remove(), or the discard() </a:t>
+            </a:r>
+            <a:r>
+              <a:rPr lang="en-US" sz="1600" dirty="0" smtClean="0"/>
+              <a:t>method</a:t>
+            </a:r>
+          </a:p>
+          <a:p>
+            <a:r>
+              <a:rPr lang="en-US" sz="1600" dirty="0"/>
+              <a:t>If the item to remove does not exist, discard() will </a:t>
+            </a:r>
+            <a:r>
+              <a:rPr lang="en-US" sz="1600" b="1" dirty="0"/>
+              <a:t>NOT</a:t>
+            </a:r>
+            <a:r>
+              <a:rPr lang="en-US" sz="1600" dirty="0"/>
+              <a:t> raise an error.</a:t>
+            </a:r>
+            <a:r>
+              <a:rPr lang="es-ES" sz="1600" b="1" dirty="0"/>
+              <a:t/>
+            </a:r>
+            <a:br>
+              <a:rPr lang="es-ES" sz="1600" b="1" dirty="0"/>
+            </a:br>
+            <a:r>
+              <a:rPr lang="es-ES" sz="1600" b="1" dirty="0" smtClean="0"/>
+              <a:t>	</a:t>
+            </a:r>
+            <a:r>
+              <a:rPr lang="es-ES" sz="1600" b="1" dirty="0" err="1" smtClean="0"/>
+              <a:t>myset.discard</a:t>
+            </a:r>
+            <a:r>
+              <a:rPr lang="es-ES" sz="1600" b="1" dirty="0" smtClean="0"/>
+              <a:t> </a:t>
+            </a:r>
+            <a:r>
+              <a:rPr lang="es-ES" sz="1600" b="1" dirty="0"/>
+              <a:t>(“</a:t>
+            </a:r>
+            <a:r>
+              <a:rPr lang="es-ES" sz="1600" b="1" dirty="0" err="1"/>
+              <a:t>bmw</a:t>
+            </a:r>
+            <a:r>
+              <a:rPr lang="es-ES" sz="1600" b="1" dirty="0"/>
+              <a:t>”)</a:t>
+            </a:r>
+            <a:endParaRPr lang="es-ES" sz="1600" b="1" dirty="0" smtClean="0"/>
+          </a:p>
+          <a:p>
+            <a:r>
+              <a:rPr lang="en-US" sz="1600" dirty="0"/>
+              <a:t>Sets are </a:t>
+            </a:r>
+            <a:r>
+              <a:rPr lang="en-US" sz="1600" i="1" dirty="0"/>
+              <a:t>unordered</a:t>
+            </a:r>
+            <a:r>
+              <a:rPr lang="en-US" sz="1600" dirty="0"/>
+              <a:t>, so when using the pop() method, you do not know which item that gets removed</a:t>
+            </a:r>
+            <a:r>
+              <a:rPr lang="en-US" sz="1600" dirty="0" smtClean="0"/>
+              <a:t>.</a:t>
+            </a:r>
+          </a:p>
+          <a:p>
+            <a:r>
+              <a:rPr lang="en-US" sz="1600" dirty="0"/>
+              <a:t>The return value of the pop() method is the removed item</a:t>
+            </a:r>
+            <a:r>
+              <a:rPr lang="en-US" sz="1600" dirty="0" smtClean="0"/>
+              <a:t>.</a:t>
+            </a:r>
+          </a:p>
+          <a:p>
+            <a:pPr marL="64008" indent="0">
+              <a:buNone/>
+            </a:pPr>
+            <a:r>
+              <a:rPr lang="es-ES" sz="1600" b="1" dirty="0" smtClean="0"/>
+              <a:t>	</a:t>
+            </a:r>
+            <a:r>
+              <a:rPr lang="es-ES" sz="1600" b="1" dirty="0" err="1" smtClean="0"/>
+              <a:t>myset.pop</a:t>
+            </a:r>
+            <a:r>
+              <a:rPr lang="es-ES" sz="1600" b="1" dirty="0"/>
+              <a:t> </a:t>
+            </a:r>
+            <a:r>
+              <a:rPr lang="es-ES" sz="1600" b="1" dirty="0" smtClean="0"/>
+              <a:t>()</a:t>
+            </a:r>
+            <a:endParaRPr lang="es-ES" sz="1600" b="1" dirty="0"/>
+          </a:p>
+          <a:p>
+            <a:endParaRPr lang="en-US" sz="1600" dirty="0" smtClean="0"/>
+          </a:p>
+          <a:p>
+            <a:r>
+              <a:rPr lang="en-US" sz="1600" dirty="0"/>
+              <a:t>The clear() method empties the </a:t>
+            </a:r>
+            <a:r>
+              <a:rPr lang="en-US" sz="1600" dirty="0" smtClean="0"/>
+              <a:t>set</a:t>
+            </a:r>
+          </a:p>
+          <a:p>
+            <a:pPr marL="64008" indent="0">
+              <a:buNone/>
+            </a:pPr>
+            <a:r>
+              <a:rPr lang="en-US" sz="1600" dirty="0" smtClean="0"/>
+              <a:t>	</a:t>
+            </a:r>
+            <a:r>
+              <a:rPr lang="en-US" sz="1600" b="1" dirty="0" err="1"/>
+              <a:t>m</a:t>
+            </a:r>
+            <a:r>
+              <a:rPr lang="en-US" sz="1600" b="1" dirty="0" err="1" smtClean="0"/>
+              <a:t>yset.clear</a:t>
+            </a:r>
+            <a:r>
+              <a:rPr lang="en-US" sz="1600" b="1" dirty="0" smtClean="0"/>
+              <a:t>()</a:t>
+            </a:r>
+            <a:endParaRPr lang="en-US" sz="1200" b="1" dirty="0" smtClean="0"/>
+          </a:p>
+          <a:p>
+            <a:r>
+              <a:rPr lang="en-US" sz="1600" dirty="0" smtClean="0"/>
+              <a:t>The</a:t>
+            </a:r>
+            <a:r>
+              <a:rPr lang="en-US" sz="1600" dirty="0"/>
+              <a:t> del keyword will delete the set </a:t>
+            </a:r>
+            <a:r>
+              <a:rPr lang="en-US" sz="1600" dirty="0" smtClean="0"/>
+              <a:t>completely</a:t>
+            </a:r>
+          </a:p>
+          <a:p>
+            <a:pPr marL="64008" indent="0">
+              <a:buNone/>
+            </a:pPr>
+            <a:r>
+              <a:rPr lang="en-US" sz="1600" dirty="0"/>
+              <a:t>	</a:t>
+            </a:r>
+            <a:r>
+              <a:rPr lang="en-US" sz="1600" b="1" dirty="0" smtClean="0"/>
+              <a:t>del </a:t>
+            </a:r>
+            <a:r>
+              <a:rPr lang="en-US" sz="1600" b="1" dirty="0" err="1" smtClean="0"/>
+              <a:t>myset</a:t>
+            </a:r>
+            <a:endParaRPr lang="en-US" b="1" dirty="0" smtClean="0"/>
+          </a:p>
+          <a:p>
+            <a:pPr lvl="1"/>
+            <a:endParaRPr lang="en-IN" dirty="0"/>
+          </a:p>
+        </p:txBody>
+      </p:sp>
+    </p:spTree>
+    <p:extLst>
+      <p:ext uri="{BB962C8B-B14F-4D97-AF65-F5344CB8AC3E}">
+        <p14:creationId xmlns:p14="http://schemas.microsoft.com/office/powerpoint/2010/main" val="2171297909"/>
+      </p:ext>
+    </p:extLst>
+  </p:cSld>
+  <p:clrMapOvr>
+    <a:masterClrMapping/>
+  </p:clrMapOvr>
+  <p:timing>
+    <p:tnLst>
+      <p:par>
+        <p:cTn id="1" dur="indefinite" restart="never" nodeType="tmRoot"/>
+      </p:par>
+    </p:tnLst>
+  </p:timing>
+</p:sld>
+</file>
+
+<file path=ppt/slides/slide17.xml><?xml version="1.0" encoding="utf-8"?>
+<p:sld xmlns:a="http://schemas.openxmlformats.org/drawingml/2006/main" xmlns:r="http://schemas.openxmlformats.org/officeDocument/2006/relationships" xmlns:p="http://schemas.openxmlformats.org/presentationml/2006/main">
+  <p:cSld>
+    <p:spTree>
+      <p:nvGrpSpPr>
+        <p:cNvPr id="1" name=""/>
+        <p:cNvGrpSpPr/>
+        <p:nvPr/>
+      </p:nvGrpSpPr>
+      <p:grpSpPr>
+        <a:xfrm>
+          <a:off x="0" y="0"/>
+          <a:ext cx="0" cy="0"/>
+          <a:chOff x="0" y="0"/>
+          <a:chExt cx="0" cy="0"/>
+        </a:xfrm>
+      </p:grpSpPr>
+      <p:sp>
+        <p:nvSpPr>
+          <p:cNvPr id="2" name="Title 1"/>
+          <p:cNvSpPr>
+            <a:spLocks noGrp="1"/>
+          </p:cNvSpPr>
+          <p:nvPr>
+            <p:ph type="title"/>
+          </p:nvPr>
+        </p:nvSpPr>
+        <p:spPr>
+          <a:xfrm>
+            <a:off x="457200" y="44624"/>
+            <a:ext cx="8229600" cy="648072"/>
+          </a:xfrm>
+        </p:spPr>
+        <p:txBody>
+          <a:bodyPr>
+            <a:normAutofit fontScale="90000"/>
+          </a:bodyPr>
+          <a:lstStyle/>
+          <a:p>
+            <a:pPr algn="ctr"/>
+            <a:r>
+              <a:rPr lang="en-US" dirty="0" smtClean="0"/>
+              <a:t>Set(</a:t>
+            </a:r>
+            <a:r>
+              <a:rPr lang="en-US" dirty="0" err="1" smtClean="0"/>
+              <a:t>loops,join</a:t>
+            </a:r>
+            <a:r>
+              <a:rPr lang="en-US" dirty="0" smtClean="0"/>
+              <a:t>)</a:t>
+            </a:r>
+            <a:endParaRPr lang="en-IN" dirty="0"/>
+          </a:p>
+        </p:txBody>
+      </p:sp>
+      <p:sp>
+        <p:nvSpPr>
+          <p:cNvPr id="3" name="Content Placeholder 2"/>
+          <p:cNvSpPr>
+            <a:spLocks noGrp="1"/>
+          </p:cNvSpPr>
+          <p:nvPr>
+            <p:ph idx="1"/>
+          </p:nvPr>
+        </p:nvSpPr>
+        <p:spPr>
+          <a:xfrm>
+            <a:off x="179512" y="764704"/>
+            <a:ext cx="8784976" cy="5976664"/>
+          </a:xfrm>
+        </p:spPr>
+        <p:txBody>
+          <a:bodyPr>
+            <a:noAutofit/>
+          </a:bodyPr>
+          <a:lstStyle/>
+          <a:p>
+            <a:r>
+              <a:rPr lang="en-US" sz="1600" b="1" dirty="0" smtClean="0"/>
+              <a:t>Loop</a:t>
+            </a:r>
+          </a:p>
+          <a:p>
+            <a:pPr lvl="1"/>
+            <a:r>
+              <a:rPr lang="en-US" sz="1600" b="1" dirty="0" smtClean="0"/>
+              <a:t>for </a:t>
+            </a:r>
+            <a:r>
+              <a:rPr lang="en-US" sz="1600" b="1" dirty="0" err="1"/>
+              <a:t>i</a:t>
+            </a:r>
+            <a:r>
+              <a:rPr lang="en-US" sz="1600" b="1" dirty="0" smtClean="0"/>
+              <a:t> in </a:t>
+            </a:r>
+            <a:r>
+              <a:rPr lang="en-US" sz="1600" b="1" dirty="0" err="1" smtClean="0"/>
+              <a:t>myset</a:t>
+            </a:r>
+            <a:r>
+              <a:rPr lang="en-US" sz="1600" b="1" dirty="0" smtClean="0"/>
+              <a:t>:</a:t>
+            </a:r>
+            <a:r>
+              <a:rPr lang="en-US" sz="1600" b="1" dirty="0"/>
+              <a:t/>
+            </a:r>
+            <a:br>
+              <a:rPr lang="en-US" sz="1600" b="1" dirty="0"/>
+            </a:br>
+            <a:r>
+              <a:rPr lang="en-US" sz="1600" b="1" dirty="0" smtClean="0"/>
+              <a:t>	print </a:t>
+            </a:r>
+            <a:r>
+              <a:rPr lang="en-US" sz="1600" b="1" dirty="0" err="1" smtClean="0"/>
+              <a:t>i</a:t>
+            </a:r>
+            <a:r>
+              <a:rPr lang="es-ES" sz="1600" dirty="0"/>
+              <a:t/>
+            </a:r>
+            <a:br>
+              <a:rPr lang="es-ES" sz="1600" dirty="0"/>
+            </a:br>
+            <a:endParaRPr lang="en-US" sz="1600" b="1" dirty="0" smtClean="0"/>
+          </a:p>
+          <a:p>
+            <a:r>
+              <a:rPr lang="en-US" sz="1600" b="1" dirty="0" smtClean="0"/>
+              <a:t>Join</a:t>
+            </a:r>
+          </a:p>
+          <a:p>
+            <a:pPr lvl="1"/>
+            <a:r>
+              <a:rPr lang="en-US" sz="1600" dirty="0"/>
+              <a:t>union() method that returns a new set containing all items from both </a:t>
+            </a:r>
+            <a:r>
+              <a:rPr lang="en-US" sz="1600" dirty="0" smtClean="0"/>
+              <a:t>sets</a:t>
+            </a:r>
+          </a:p>
+          <a:p>
+            <a:pPr lvl="1"/>
+            <a:r>
+              <a:rPr lang="en-US" sz="1600" b="1" dirty="0"/>
+              <a:t>s</a:t>
+            </a:r>
+            <a:r>
+              <a:rPr lang="en-US" sz="1600" b="1" dirty="0" smtClean="0"/>
+              <a:t>et3 = set1.union(set2)</a:t>
+            </a:r>
+            <a:endParaRPr lang="en-US" sz="1600" b="1" dirty="0" smtClean="0">
               <a:solidFill>
                 <a:srgbClr val="00B0F0"/>
               </a:solidFill>
             </a:endParaRPr>
           </a:p>
           <a:p>
-            <a:pPr lvl="1"/>
-            <a:r>
-              <a:rPr lang="en-IN" sz="1600" b="1" dirty="0">
-                <a:solidFill>
-                  <a:srgbClr val="00B0F0"/>
-                </a:solidFill>
-              </a:rPr>
-              <a:t>for </a:t>
-            </a:r>
-            <a:r>
-              <a:rPr lang="en-IN" sz="1600" b="1" dirty="0" err="1">
-                <a:solidFill>
-                  <a:srgbClr val="00B0F0"/>
-                </a:solidFill>
-              </a:rPr>
-              <a:t>i</a:t>
-            </a:r>
-            <a:r>
-              <a:rPr lang="en-IN" sz="1600" b="1" dirty="0">
-                <a:solidFill>
-                  <a:srgbClr val="00B0F0"/>
-                </a:solidFill>
-              </a:rPr>
-              <a:t> in range(</a:t>
-            </a:r>
-            <a:r>
-              <a:rPr lang="en-IN" sz="1600" b="1" dirty="0" err="1">
-                <a:solidFill>
-                  <a:srgbClr val="00B0F0"/>
-                </a:solidFill>
-              </a:rPr>
-              <a:t>len</a:t>
-            </a:r>
-            <a:r>
-              <a:rPr lang="en-IN" sz="1600" b="1" dirty="0">
-                <a:solidFill>
-                  <a:srgbClr val="00B0F0"/>
-                </a:solidFill>
-              </a:rPr>
-              <a:t>(</a:t>
-            </a:r>
-            <a:r>
-              <a:rPr lang="en-IN" sz="1600" b="1" dirty="0" err="1">
-                <a:solidFill>
-                  <a:srgbClr val="00B0F0"/>
-                </a:solidFill>
-              </a:rPr>
-              <a:t>thistuple</a:t>
-            </a:r>
-            <a:r>
-              <a:rPr lang="en-IN" sz="1600" b="1" dirty="0" smtClean="0">
-                <a:solidFill>
-                  <a:srgbClr val="00B0F0"/>
-                </a:solidFill>
-              </a:rPr>
-              <a:t>))</a:t>
-            </a:r>
-            <a:endParaRPr lang="en-IN" sz="1600" b="1" dirty="0">
-              <a:solidFill>
-                <a:srgbClr val="00B0F0"/>
-              </a:solidFill>
-            </a:endParaRPr>
+            <a:r>
+              <a:rPr lang="en-US" sz="1600" dirty="0"/>
+              <a:t>The intersection() method will return a </a:t>
+            </a:r>
+            <a:r>
+              <a:rPr lang="en-US" sz="1600" i="1" dirty="0"/>
+              <a:t>new</a:t>
+            </a:r>
+            <a:r>
+              <a:rPr lang="en-US" sz="1600" dirty="0"/>
+              <a:t> set, that only contains the items that are present in both </a:t>
+            </a:r>
+            <a:r>
+              <a:rPr lang="en-US" sz="1600" dirty="0" smtClean="0"/>
+              <a:t>sets</a:t>
+            </a:r>
+          </a:p>
+          <a:p>
+            <a:pPr marL="64008" indent="0">
+              <a:buNone/>
+            </a:pPr>
+            <a:r>
+              <a:rPr lang="en-US" sz="1600" dirty="0"/>
+              <a:t>	</a:t>
+            </a:r>
+            <a:r>
+              <a:rPr lang="en-US" sz="1600" b="1" dirty="0" smtClean="0"/>
+              <a:t>set3 = </a:t>
+            </a:r>
+            <a:r>
+              <a:rPr lang="en-IN" sz="1600" b="1" dirty="0" smtClean="0"/>
+              <a:t>set1.intersection(set2)</a:t>
+            </a:r>
+            <a:endParaRPr lang="en-US" sz="1600" b="1" dirty="0" smtClean="0"/>
+          </a:p>
+          <a:p>
+            <a:r>
+              <a:rPr lang="en-US" sz="1600" dirty="0"/>
+              <a:t>The </a:t>
+            </a:r>
+            <a:r>
+              <a:rPr lang="en-US" sz="1600" dirty="0" err="1"/>
+              <a:t>intersection_update</a:t>
+            </a:r>
+            <a:r>
+              <a:rPr lang="en-US" sz="1600" dirty="0"/>
+              <a:t>() method will keep only the items that are present in both </a:t>
+            </a:r>
+            <a:r>
+              <a:rPr lang="en-US" sz="1600" dirty="0" smtClean="0"/>
+              <a:t>sets</a:t>
+            </a:r>
+          </a:p>
+          <a:p>
+            <a:pPr marL="64008" indent="0">
+              <a:buNone/>
+            </a:pPr>
+            <a:r>
+              <a:rPr lang="en-IN" sz="1600" dirty="0" smtClean="0"/>
+              <a:t>	</a:t>
+            </a:r>
+            <a:r>
+              <a:rPr lang="en-IN" sz="1600" b="1" dirty="0"/>
+              <a:t>set1.intersection_update(set2</a:t>
+            </a:r>
+            <a:r>
+              <a:rPr lang="en-IN" sz="1600" b="1" dirty="0" smtClean="0"/>
+              <a:t>)</a:t>
+            </a:r>
+          </a:p>
+          <a:p>
+            <a:r>
+              <a:rPr lang="en-US" sz="1600" dirty="0"/>
+              <a:t>The </a:t>
+            </a:r>
+            <a:r>
+              <a:rPr lang="en-US" sz="1600" dirty="0" err="1"/>
+              <a:t>symmetric_difference</a:t>
+            </a:r>
+            <a:r>
+              <a:rPr lang="en-US" sz="1600" dirty="0"/>
+              <a:t>() method will return a new set, that contains only the elements that are NOT present in both </a:t>
+            </a:r>
+            <a:r>
+              <a:rPr lang="en-US" sz="1600" dirty="0" smtClean="0"/>
+              <a:t>sets</a:t>
+            </a:r>
+          </a:p>
+          <a:p>
+            <a:pPr marL="64008" indent="0">
+              <a:buNone/>
+            </a:pPr>
+            <a:r>
+              <a:rPr lang="en-US" sz="1600" dirty="0"/>
+              <a:t>	</a:t>
+            </a:r>
+            <a:r>
+              <a:rPr lang="en-IN" sz="1600" b="1" dirty="0" smtClean="0"/>
+              <a:t>set3 </a:t>
+            </a:r>
+            <a:r>
+              <a:rPr lang="en-IN" sz="1600" b="1" dirty="0"/>
+              <a:t>= </a:t>
+            </a:r>
+            <a:r>
+              <a:rPr lang="en-IN" sz="1600" b="1" dirty="0" smtClean="0"/>
+              <a:t>set1.symmetric_difference(set2)</a:t>
+            </a:r>
+          </a:p>
+          <a:p>
+            <a:r>
+              <a:rPr lang="en-US" sz="1600" dirty="0"/>
+              <a:t>The </a:t>
+            </a:r>
+            <a:r>
+              <a:rPr lang="en-US" sz="1600" dirty="0" err="1"/>
+              <a:t>symmetric_difference_update</a:t>
+            </a:r>
+            <a:r>
+              <a:rPr lang="en-US" sz="1600" dirty="0"/>
+              <a:t>() method will keep only the elements that are NOT present in both </a:t>
+            </a:r>
+            <a:r>
+              <a:rPr lang="en-US" sz="1600" dirty="0" smtClean="0"/>
+              <a:t>sets</a:t>
+            </a:r>
+          </a:p>
+          <a:p>
+            <a:pPr marL="64008" indent="0">
+              <a:buNone/>
+            </a:pPr>
+            <a:r>
+              <a:rPr lang="en-US" sz="1600" dirty="0"/>
+              <a:t>	</a:t>
+            </a:r>
+            <a:r>
+              <a:rPr lang="en-IN" sz="1600" b="1" dirty="0" smtClean="0"/>
+              <a:t>set1.symmetric_difference_update(set2)</a:t>
+            </a:r>
+            <a:endParaRPr lang="en-IN" sz="1600" b="1" dirty="0"/>
+          </a:p>
+          <a:p>
+            <a:r>
+              <a:rPr lang="en-IN" sz="1600" dirty="0" smtClean="0"/>
+              <a:t>https</a:t>
+            </a:r>
+            <a:r>
+              <a:rPr lang="en-IN" sz="1600" dirty="0"/>
+              <a:t>://www.w3schools.com/python/python_sets_methods.asp</a:t>
+            </a:r>
+            <a:endParaRPr lang="en-IN" sz="1600" b="1" dirty="0"/>
           </a:p>
         </p:txBody>
       </p:sp>
     </p:spTree>
     <p:extLst>
       <p:ext uri="{BB962C8B-B14F-4D97-AF65-F5344CB8AC3E}">
-        <p14:creationId xmlns:p14="http://schemas.microsoft.com/office/powerpoint/2010/main" val="3335166251"/>
+        <p14:creationId xmlns:p14="http://schemas.microsoft.com/office/powerpoint/2010/main" val="2693157985"/>
+      </p:ext>
+    </p:extLst>
+  </p:cSld>
+  <p:clrMapOvr>
+    <a:masterClrMapping/>
+  </p:clrMapOvr>
+  <p:timing>
+    <p:tnLst>
+      <p:par>
+        <p:cTn id="1" dur="indefinite" restart="never" nodeType="tmRoot"/>
+      </p:par>
+    </p:tnLst>
+  </p:timing>
+</p:sld>
+</file>
+
+<file path=ppt/slides/slide18.xml><?xml version="1.0" encoding="utf-8"?>
+<p:sld xmlns:a="http://schemas.openxmlformats.org/drawingml/2006/main" xmlns:r="http://schemas.openxmlformats.org/officeDocument/2006/relationships" xmlns:p="http://schemas.openxmlformats.org/presentationml/2006/main">
+  <p:cSld>
+    <p:spTree>
+      <p:nvGrpSpPr>
+        <p:cNvPr id="1" name=""/>
+        <p:cNvGrpSpPr/>
+        <p:nvPr/>
+      </p:nvGrpSpPr>
+      <p:grpSpPr>
+        <a:xfrm>
+          <a:off x="0" y="0"/>
+          <a:ext cx="0" cy="0"/>
+          <a:chOff x="0" y="0"/>
+          <a:chExt cx="0" cy="0"/>
+        </a:xfrm>
+      </p:grpSpPr>
+      <p:sp>
+        <p:nvSpPr>
+          <p:cNvPr id="2" name="Title 1"/>
+          <p:cNvSpPr>
+            <a:spLocks noGrp="1"/>
+          </p:cNvSpPr>
+          <p:nvPr>
+            <p:ph type="title"/>
+          </p:nvPr>
+        </p:nvSpPr>
+        <p:spPr>
+          <a:xfrm>
+            <a:off x="457200" y="116632"/>
+            <a:ext cx="8435280" cy="648072"/>
+          </a:xfrm>
+        </p:spPr>
+        <p:txBody>
+          <a:bodyPr>
+            <a:normAutofit fontScale="90000"/>
+          </a:bodyPr>
+          <a:lstStyle/>
+          <a:p>
+            <a:pPr algn="ctr"/>
+            <a:r>
+              <a:rPr lang="en-US" dirty="0" smtClean="0"/>
+              <a:t>Dictionary</a:t>
+            </a:r>
+            <a:endParaRPr lang="en-IN" dirty="0"/>
+          </a:p>
+        </p:txBody>
+      </p:sp>
+      <p:sp>
+        <p:nvSpPr>
+          <p:cNvPr id="3" name="Content Placeholder 2"/>
+          <p:cNvSpPr>
+            <a:spLocks noGrp="1"/>
+          </p:cNvSpPr>
+          <p:nvPr>
+            <p:ph idx="1"/>
+          </p:nvPr>
+        </p:nvSpPr>
+        <p:spPr>
+          <a:xfrm>
+            <a:off x="457200" y="836712"/>
+            <a:ext cx="8229600" cy="5904656"/>
+          </a:xfrm>
+        </p:spPr>
+        <p:txBody>
+          <a:bodyPr>
+            <a:noAutofit/>
+          </a:bodyPr>
+          <a:lstStyle/>
+          <a:p>
+            <a:r>
+              <a:rPr lang="en-US" sz="1800" dirty="0"/>
+              <a:t>Dictionaries are used to store data values in </a:t>
+            </a:r>
+            <a:r>
+              <a:rPr lang="en-US" sz="1800" dirty="0" err="1"/>
+              <a:t>key:value</a:t>
+            </a:r>
+            <a:r>
+              <a:rPr lang="en-US" sz="1800" dirty="0"/>
+              <a:t> pairs</a:t>
+            </a:r>
+            <a:r>
+              <a:rPr lang="en-US" sz="1800" dirty="0" smtClean="0"/>
+              <a:t>.</a:t>
+            </a:r>
+          </a:p>
+          <a:p>
+            <a:pPr marL="64008" indent="0">
+              <a:buNone/>
+            </a:pPr>
+            <a:r>
+              <a:rPr lang="en-US" sz="1800" dirty="0"/>
+              <a:t>	</a:t>
+            </a:r>
+            <a:r>
+              <a:rPr lang="en-US" sz="1800" b="1" dirty="0" err="1" smtClean="0"/>
+              <a:t>mydict</a:t>
+            </a:r>
+            <a:r>
+              <a:rPr lang="en-US" sz="1800" b="1" dirty="0" smtClean="0"/>
+              <a:t> </a:t>
+            </a:r>
+            <a:r>
+              <a:rPr lang="en-US" sz="1800" b="1" dirty="0"/>
+              <a:t>= {</a:t>
+            </a:r>
+            <a:br>
+              <a:rPr lang="en-US" sz="1800" b="1" dirty="0"/>
+            </a:br>
+            <a:r>
+              <a:rPr lang="en-US" sz="1800" b="1" dirty="0"/>
+              <a:t>  </a:t>
+            </a:r>
+            <a:r>
+              <a:rPr lang="en-US" sz="1800" b="1" dirty="0" smtClean="0"/>
+              <a:t>		"</a:t>
+            </a:r>
+            <a:r>
+              <a:rPr lang="en-US" sz="1800" b="1" dirty="0"/>
+              <a:t>brand": "Ford",</a:t>
+            </a:r>
+            <a:br>
+              <a:rPr lang="en-US" sz="1800" b="1" dirty="0"/>
+            </a:br>
+            <a:r>
+              <a:rPr lang="en-US" sz="1800" b="1" dirty="0"/>
+              <a:t>  </a:t>
+            </a:r>
+            <a:r>
+              <a:rPr lang="en-US" sz="1800" b="1" dirty="0" smtClean="0"/>
+              <a:t>		"</a:t>
+            </a:r>
+            <a:r>
+              <a:rPr lang="en-US" sz="1800" b="1" dirty="0"/>
+              <a:t>model": "Mustang",</a:t>
+            </a:r>
+            <a:br>
+              <a:rPr lang="en-US" sz="1800" b="1" dirty="0"/>
+            </a:br>
+            <a:r>
+              <a:rPr lang="en-US" sz="1800" b="1" dirty="0"/>
+              <a:t>  </a:t>
+            </a:r>
+            <a:r>
+              <a:rPr lang="en-US" sz="1800" b="1" dirty="0" smtClean="0"/>
+              <a:t>		"</a:t>
+            </a:r>
+            <a:r>
+              <a:rPr lang="en-US" sz="1800" b="1" dirty="0"/>
+              <a:t>year": 1964</a:t>
+            </a:r>
+            <a:br>
+              <a:rPr lang="en-US" sz="1800" b="1" dirty="0"/>
+            </a:br>
+            <a:r>
+              <a:rPr lang="en-US" sz="1800" b="1" dirty="0" smtClean="0"/>
+              <a:t>		}</a:t>
+            </a:r>
+          </a:p>
+          <a:p>
+            <a:r>
+              <a:rPr lang="en-US" sz="1800" dirty="0"/>
+              <a:t>A dictionary is a collection which is ordered*, changeable and do not allow duplicates</a:t>
+            </a:r>
+            <a:r>
+              <a:rPr lang="en-US" sz="1800" dirty="0" smtClean="0"/>
+              <a:t>.</a:t>
+            </a:r>
+          </a:p>
+          <a:p>
+            <a:r>
+              <a:rPr lang="en-US" sz="1800" dirty="0"/>
+              <a:t>As of Python version 3.7, dictionaries are </a:t>
+            </a:r>
+            <a:r>
+              <a:rPr lang="en-US" sz="1800" i="1" dirty="0"/>
+              <a:t>ordered</a:t>
+            </a:r>
+            <a:r>
+              <a:rPr lang="en-US" sz="1800" dirty="0"/>
+              <a:t>. In Python 3.6 and earlier, dictionaries are </a:t>
+            </a:r>
+            <a:r>
+              <a:rPr lang="en-US" sz="1800" i="1" dirty="0" smtClean="0"/>
+              <a:t>unordered</a:t>
+            </a:r>
+            <a:r>
+              <a:rPr lang="en-US" sz="1800" dirty="0" smtClean="0"/>
+              <a:t>.</a:t>
+            </a:r>
+          </a:p>
+          <a:p>
+            <a:r>
+              <a:rPr lang="en-US" sz="1800" dirty="0"/>
+              <a:t>Dictionary items are ordered, changeable, and does not allow </a:t>
+            </a:r>
+            <a:r>
+              <a:rPr lang="en-US" sz="1800" dirty="0" smtClean="0"/>
+              <a:t>duplicates.</a:t>
+            </a:r>
+          </a:p>
+          <a:p>
+            <a:r>
+              <a:rPr lang="en-US" sz="1800" dirty="0" smtClean="0"/>
+              <a:t>Dictionary items can be accessed by key</a:t>
+            </a:r>
+          </a:p>
+          <a:p>
+            <a:r>
+              <a:rPr lang="en-US" sz="1800" dirty="0" smtClean="0"/>
+              <a:t>Length : </a:t>
+            </a:r>
+            <a:r>
+              <a:rPr lang="en-US" sz="1800" dirty="0" err="1" smtClean="0"/>
+              <a:t>len</a:t>
+            </a:r>
+            <a:r>
+              <a:rPr lang="en-US" sz="1800" dirty="0" smtClean="0"/>
+              <a:t>(</a:t>
+            </a:r>
+            <a:r>
+              <a:rPr lang="en-US" sz="1800" b="1" dirty="0" err="1" smtClean="0"/>
+              <a:t>mydict</a:t>
+            </a:r>
+            <a:r>
+              <a:rPr lang="en-US" sz="1800" dirty="0" smtClean="0"/>
+              <a:t>)</a:t>
+            </a:r>
+            <a:endParaRPr lang="en-US" sz="1800" b="1" dirty="0" smtClean="0"/>
+          </a:p>
+          <a:p>
+            <a:r>
+              <a:rPr lang="en-US" sz="1800" b="1" dirty="0" smtClean="0"/>
+              <a:t>Dictionary creation using </a:t>
+            </a:r>
+            <a:r>
+              <a:rPr lang="en-US" sz="1800" b="1" dirty="0" err="1" smtClean="0"/>
+              <a:t>dic</a:t>
+            </a:r>
+            <a:r>
+              <a:rPr lang="en-US" sz="1800" b="1" dirty="0" smtClean="0"/>
+              <a:t>() constructor</a:t>
+            </a:r>
+          </a:p>
+          <a:p>
+            <a:pPr lvl="1"/>
+            <a:r>
+              <a:rPr lang="en-US" sz="1800" b="1" dirty="0" err="1"/>
+              <a:t>mydict</a:t>
+            </a:r>
+            <a:r>
+              <a:rPr lang="en-US" sz="1800" b="1" dirty="0"/>
+              <a:t> = </a:t>
+            </a:r>
+            <a:r>
+              <a:rPr lang="en-US" sz="1800" b="1" dirty="0" err="1" smtClean="0"/>
+              <a:t>dic</a:t>
+            </a:r>
+            <a:r>
+              <a:rPr lang="en-US" sz="1800" b="1" dirty="0" smtClean="0"/>
+              <a:t>((1,2,3))</a:t>
+            </a:r>
+          </a:p>
+        </p:txBody>
+      </p:sp>
+    </p:spTree>
+    <p:extLst>
+      <p:ext uri="{BB962C8B-B14F-4D97-AF65-F5344CB8AC3E}">
+        <p14:creationId xmlns:p14="http://schemas.microsoft.com/office/powerpoint/2010/main" val="3840604870"/>
+      </p:ext>
+    </p:extLst>
+  </p:cSld>
+  <p:clrMapOvr>
+    <a:masterClrMapping/>
+  </p:clrMapOvr>
+  <p:timing>
+    <p:tnLst>
+      <p:par>
+        <p:cTn id="1" dur="indefinite" restart="never" nodeType="tmRoot"/>
+      </p:par>
+    </p:tnLst>
+  </p:timing>
+</p:sld>
+</file>
+
+<file path=ppt/slides/slide19.xml><?xml version="1.0" encoding="utf-8"?>
+<p:sld xmlns:a="http://schemas.openxmlformats.org/drawingml/2006/main" xmlns:r="http://schemas.openxmlformats.org/officeDocument/2006/relationships" xmlns:p="http://schemas.openxmlformats.org/presentationml/2006/main">
+  <p:cSld>
+    <p:spTree>
+      <p:nvGrpSpPr>
+        <p:cNvPr id="1" name=""/>
+        <p:cNvGrpSpPr/>
+        <p:nvPr/>
+      </p:nvGrpSpPr>
+      <p:grpSpPr>
+        <a:xfrm>
+          <a:off x="0" y="0"/>
+          <a:ext cx="0" cy="0"/>
+          <a:chOff x="0" y="0"/>
+          <a:chExt cx="0" cy="0"/>
+        </a:xfrm>
+      </p:grpSpPr>
+      <p:sp>
+        <p:nvSpPr>
+          <p:cNvPr id="2" name="Title 1"/>
+          <p:cNvSpPr>
+            <a:spLocks noGrp="1"/>
+          </p:cNvSpPr>
+          <p:nvPr>
+            <p:ph type="title"/>
+          </p:nvPr>
+        </p:nvSpPr>
+        <p:spPr>
+          <a:xfrm>
+            <a:off x="457200" y="267494"/>
+            <a:ext cx="8229600" cy="713234"/>
+          </a:xfrm>
+        </p:spPr>
+        <p:txBody>
+          <a:bodyPr>
+            <a:normAutofit fontScale="90000"/>
+          </a:bodyPr>
+          <a:lstStyle/>
+          <a:p>
+            <a:pPr algn="ctr"/>
+            <a:r>
+              <a:rPr lang="en-US" dirty="0" smtClean="0"/>
+              <a:t>Dictionary(access items)</a:t>
+            </a:r>
+            <a:endParaRPr lang="en-IN" dirty="0"/>
+          </a:p>
+        </p:txBody>
+      </p:sp>
+      <p:sp>
+        <p:nvSpPr>
+          <p:cNvPr id="3" name="Content Placeholder 2"/>
+          <p:cNvSpPr>
+            <a:spLocks noGrp="1"/>
+          </p:cNvSpPr>
+          <p:nvPr>
+            <p:ph idx="1"/>
+          </p:nvPr>
+        </p:nvSpPr>
+        <p:spPr>
+          <a:xfrm>
+            <a:off x="457200" y="980728"/>
+            <a:ext cx="8229600" cy="5474080"/>
+          </a:xfrm>
+        </p:spPr>
+        <p:txBody>
+          <a:bodyPr/>
+          <a:lstStyle/>
+          <a:p>
+            <a:r>
+              <a:rPr lang="en-US" sz="1600" dirty="0"/>
+              <a:t>You can access the items of a dictionary by referring to its key name, inside square </a:t>
+            </a:r>
+            <a:r>
+              <a:rPr lang="en-US" sz="1600" dirty="0" smtClean="0"/>
+              <a:t>brackets</a:t>
+            </a:r>
+          </a:p>
+          <a:p>
+            <a:pPr marL="64008" indent="0">
+              <a:buNone/>
+            </a:pPr>
+            <a:r>
+              <a:rPr lang="en-US" sz="1600" b="1" dirty="0"/>
+              <a:t>	</a:t>
+            </a:r>
+            <a:r>
+              <a:rPr lang="en-IN" sz="1600" b="1" dirty="0" err="1" smtClean="0"/>
+              <a:t>mydict</a:t>
+            </a:r>
+            <a:r>
+              <a:rPr lang="en-IN" sz="1600" b="1" dirty="0" smtClean="0"/>
+              <a:t>[“name”]</a:t>
+            </a:r>
+            <a:endParaRPr lang="en-US" sz="1600" b="1" dirty="0" smtClean="0"/>
+          </a:p>
+          <a:p>
+            <a:r>
+              <a:rPr lang="en-US" sz="1600" dirty="0" smtClean="0"/>
+              <a:t>There is also a method called get() that will give you the same result.</a:t>
+            </a:r>
+          </a:p>
+          <a:p>
+            <a:pPr marL="64008" indent="0">
+              <a:buNone/>
+            </a:pPr>
+            <a:r>
+              <a:rPr lang="en-US" sz="1600" b="1" dirty="0"/>
+              <a:t>	</a:t>
+            </a:r>
+            <a:r>
+              <a:rPr lang="en-US" sz="1600" b="1" dirty="0" err="1" smtClean="0"/>
+              <a:t>mydict.get</a:t>
+            </a:r>
+            <a:r>
+              <a:rPr lang="en-US" sz="1600" b="1" dirty="0" smtClean="0"/>
+              <a:t>(“name”)</a:t>
+            </a:r>
+          </a:p>
+          <a:p>
+            <a:r>
+              <a:rPr lang="en-US" sz="1600" dirty="0"/>
+              <a:t>The keys() method will return a list of all the keys in the </a:t>
+            </a:r>
+            <a:r>
+              <a:rPr lang="en-US" sz="1600" dirty="0" smtClean="0"/>
+              <a:t>dictionary.</a:t>
+            </a:r>
+          </a:p>
+          <a:p>
+            <a:pPr marL="64008" indent="0">
+              <a:buNone/>
+            </a:pPr>
+            <a:r>
+              <a:rPr lang="en-IN" sz="1600" b="1" dirty="0" smtClean="0"/>
+              <a:t>	keys = </a:t>
+            </a:r>
+            <a:r>
+              <a:rPr lang="en-IN" sz="1600" b="1" dirty="0" err="1" smtClean="0"/>
+              <a:t>mydict.keys</a:t>
+            </a:r>
+            <a:r>
+              <a:rPr lang="en-IN" sz="1600" b="1" dirty="0" smtClean="0"/>
+              <a:t>()</a:t>
+            </a:r>
+            <a:endParaRPr lang="en-US" sz="1600" b="1" dirty="0"/>
+          </a:p>
+          <a:p>
+            <a:r>
+              <a:rPr lang="en-US" sz="1600" dirty="0"/>
+              <a:t>The values() method will return a list of all the values in the dictionary</a:t>
+            </a:r>
+            <a:r>
+              <a:rPr lang="en-US" sz="1600" dirty="0" smtClean="0"/>
+              <a:t>.</a:t>
+            </a:r>
+            <a:endParaRPr lang="en-US" sz="1600" dirty="0"/>
+          </a:p>
+          <a:p>
+            <a:pPr marL="64008" indent="0">
+              <a:buNone/>
+            </a:pPr>
+            <a:r>
+              <a:rPr lang="en-US" sz="1600" b="1" dirty="0" smtClean="0"/>
+              <a:t>	values = </a:t>
+            </a:r>
+            <a:r>
+              <a:rPr lang="en-US" sz="1600" b="1" dirty="0" err="1" smtClean="0"/>
+              <a:t>mydict.values</a:t>
+            </a:r>
+            <a:r>
+              <a:rPr lang="en-US" sz="1600" b="1" dirty="0" smtClean="0"/>
+              <a:t>()</a:t>
+            </a:r>
+            <a:endParaRPr lang="en-US" sz="1600" b="1" dirty="0"/>
+          </a:p>
+          <a:p>
+            <a:r>
+              <a:rPr lang="en-US" sz="1600" dirty="0"/>
+              <a:t>The items() method will return each item in a dictionary, as tuples in a </a:t>
+            </a:r>
+            <a:r>
+              <a:rPr lang="en-US" sz="1600" dirty="0" smtClean="0"/>
+              <a:t>list.</a:t>
+            </a:r>
+            <a:endParaRPr lang="en-US" sz="1600" dirty="0"/>
+          </a:p>
+          <a:p>
+            <a:pPr marL="64008" indent="0">
+              <a:buNone/>
+            </a:pPr>
+            <a:r>
+              <a:rPr lang="en-US" sz="1600" b="1" dirty="0" smtClean="0"/>
+              <a:t>	items = </a:t>
+            </a:r>
+            <a:r>
+              <a:rPr lang="en-IN" sz="1600" b="1" dirty="0" err="1" smtClean="0"/>
+              <a:t>mydict.items</a:t>
+            </a:r>
+            <a:r>
+              <a:rPr lang="en-IN" sz="1600" b="1" dirty="0" smtClean="0"/>
+              <a:t>()</a:t>
+            </a:r>
+            <a:endParaRPr lang="en-US" sz="1600" b="1" dirty="0"/>
+          </a:p>
+          <a:p>
+            <a:r>
+              <a:rPr lang="en-IN" sz="1600" dirty="0"/>
+              <a:t>Check if Key </a:t>
+            </a:r>
+            <a:r>
+              <a:rPr lang="en-IN" sz="1600" dirty="0" smtClean="0"/>
+              <a:t>Exists using ‘in’ operator</a:t>
+            </a:r>
+            <a:r>
+              <a:rPr lang="en-US" sz="1600" dirty="0" smtClean="0"/>
+              <a:t>.</a:t>
+            </a:r>
+            <a:endParaRPr lang="en-US" sz="1600" dirty="0"/>
+          </a:p>
+          <a:p>
+            <a:pPr marL="64008" indent="0">
+              <a:buNone/>
+            </a:pPr>
+            <a:r>
+              <a:rPr lang="en-US" sz="1600" dirty="0" smtClean="0"/>
+              <a:t>	</a:t>
+            </a:r>
+            <a:r>
+              <a:rPr lang="en-IN" sz="1600" b="1" dirty="0"/>
+              <a:t>if </a:t>
+            </a:r>
+            <a:r>
+              <a:rPr lang="en-IN" sz="1600" b="1" dirty="0" smtClean="0"/>
+              <a:t>“name"</a:t>
+            </a:r>
+            <a:r>
+              <a:rPr lang="en-IN" sz="1600" b="1" dirty="0"/>
+              <a:t> in </a:t>
+            </a:r>
+            <a:r>
+              <a:rPr lang="en-IN" sz="1600" b="1" dirty="0" err="1" smtClean="0"/>
+              <a:t>mydict</a:t>
+            </a:r>
+            <a:endParaRPr lang="en-US" sz="1600" b="1" dirty="0" smtClean="0"/>
+          </a:p>
+          <a:p>
+            <a:r>
+              <a:rPr lang="en-US" sz="1600" dirty="0" smtClean="0"/>
+              <a:t>To </a:t>
+            </a:r>
+            <a:r>
+              <a:rPr lang="en-US" sz="1600" dirty="0"/>
+              <a:t>determine if a specified item is present in a tuple use the in keyword</a:t>
+            </a:r>
+            <a:endParaRPr lang="en-US" sz="1600" dirty="0" smtClean="0"/>
+          </a:p>
+          <a:p>
+            <a:pPr lvl="1"/>
+            <a:r>
+              <a:rPr lang="en-US" sz="1600" b="1" dirty="0" smtClean="0"/>
+              <a:t>Item in </a:t>
+            </a:r>
+            <a:r>
+              <a:rPr lang="en-IN" sz="1600" b="1" dirty="0" err="1"/>
+              <a:t>mytuple</a:t>
+            </a:r>
+            <a:endParaRPr lang="en-US" sz="1600" b="1" dirty="0" smtClean="0"/>
+          </a:p>
+          <a:p>
+            <a:pPr lvl="1"/>
+            <a:endParaRPr lang="en-US" sz="1600" b="1" dirty="0" smtClean="0"/>
+          </a:p>
+          <a:p>
+            <a:pPr marL="537210" lvl="1" indent="0">
+              <a:buNone/>
+            </a:pPr>
+            <a:endParaRPr lang="en-US" sz="1600" b="1" dirty="0" smtClean="0"/>
+          </a:p>
+        </p:txBody>
+      </p:sp>
+    </p:spTree>
+    <p:extLst>
+      <p:ext uri="{BB962C8B-B14F-4D97-AF65-F5344CB8AC3E}">
+        <p14:creationId xmlns:p14="http://schemas.microsoft.com/office/powerpoint/2010/main" val="3152697583"/>
       </p:ext>
     </p:extLst>
   </p:cSld>
@@ -5741,6 +6854,1192 @@
     <p:extLst>
       <p:ext uri="{BB962C8B-B14F-4D97-AF65-F5344CB8AC3E}">
         <p14:creationId xmlns:p14="http://schemas.microsoft.com/office/powerpoint/2010/main" val="664421804"/>
+      </p:ext>
+    </p:extLst>
+  </p:cSld>
+  <p:clrMapOvr>
+    <a:masterClrMapping/>
+  </p:clrMapOvr>
+  <p:timing>
+    <p:tnLst>
+      <p:par>
+        <p:cTn id="1" dur="indefinite" restart="never" nodeType="tmRoot"/>
+      </p:par>
+    </p:tnLst>
+  </p:timing>
+</p:sld>
+</file>
+
+<file path=ppt/slides/slide20.xml><?xml version="1.0" encoding="utf-8"?>
+<p:sld xmlns:a="http://schemas.openxmlformats.org/drawingml/2006/main" xmlns:r="http://schemas.openxmlformats.org/officeDocument/2006/relationships" xmlns:p="http://schemas.openxmlformats.org/presentationml/2006/main">
+  <p:cSld>
+    <p:spTree>
+      <p:nvGrpSpPr>
+        <p:cNvPr id="1" name=""/>
+        <p:cNvGrpSpPr/>
+        <p:nvPr/>
+      </p:nvGrpSpPr>
+      <p:grpSpPr>
+        <a:xfrm>
+          <a:off x="0" y="0"/>
+          <a:ext cx="0" cy="0"/>
+          <a:chOff x="0" y="0"/>
+          <a:chExt cx="0" cy="0"/>
+        </a:xfrm>
+      </p:grpSpPr>
+      <p:sp>
+        <p:nvSpPr>
+          <p:cNvPr id="2" name="Title 1"/>
+          <p:cNvSpPr>
+            <a:spLocks noGrp="1"/>
+          </p:cNvSpPr>
+          <p:nvPr>
+            <p:ph type="title"/>
+          </p:nvPr>
+        </p:nvSpPr>
+        <p:spPr>
+          <a:xfrm>
+            <a:off x="457200" y="267494"/>
+            <a:ext cx="8229600" cy="641226"/>
+          </a:xfrm>
+        </p:spPr>
+        <p:txBody>
+          <a:bodyPr>
+            <a:normAutofit fontScale="90000"/>
+          </a:bodyPr>
+          <a:lstStyle/>
+          <a:p>
+            <a:pPr algn="ctr"/>
+            <a:r>
+              <a:rPr lang="en-US" dirty="0" smtClean="0"/>
+              <a:t>Dictionary(</a:t>
+            </a:r>
+            <a:r>
+              <a:rPr lang="en-US" dirty="0" err="1" smtClean="0"/>
+              <a:t>add,update,remove</a:t>
+            </a:r>
+            <a:r>
+              <a:rPr lang="en-US" dirty="0" smtClean="0"/>
+              <a:t>)</a:t>
+            </a:r>
+            <a:endParaRPr lang="en-IN" dirty="0"/>
+          </a:p>
+        </p:txBody>
+      </p:sp>
+      <p:sp>
+        <p:nvSpPr>
+          <p:cNvPr id="3" name="Content Placeholder 2"/>
+          <p:cNvSpPr>
+            <a:spLocks noGrp="1"/>
+          </p:cNvSpPr>
+          <p:nvPr>
+            <p:ph idx="1"/>
+          </p:nvPr>
+        </p:nvSpPr>
+        <p:spPr>
+          <a:xfrm>
+            <a:off x="467544" y="1124744"/>
+            <a:ext cx="8229600" cy="5402072"/>
+          </a:xfrm>
+        </p:spPr>
+        <p:txBody>
+          <a:bodyPr>
+            <a:normAutofit lnSpcReduction="10000"/>
+          </a:bodyPr>
+          <a:lstStyle/>
+          <a:p>
+            <a:r>
+              <a:rPr lang="en-US" sz="1600" dirty="0" smtClean="0"/>
+              <a:t>Change </a:t>
+            </a:r>
+            <a:r>
+              <a:rPr lang="en-US" sz="1600" dirty="0"/>
+              <a:t>the value of a specific item by referring to its key </a:t>
+            </a:r>
+            <a:r>
+              <a:rPr lang="en-US" sz="1600" dirty="0" smtClean="0"/>
+              <a:t>name.</a:t>
+            </a:r>
+          </a:p>
+          <a:p>
+            <a:pPr marL="64008" indent="0">
+              <a:buNone/>
+            </a:pPr>
+            <a:r>
+              <a:rPr lang="es-ES" sz="1600" b="1" dirty="0" smtClean="0"/>
+              <a:t>	</a:t>
+            </a:r>
+            <a:r>
+              <a:rPr lang="es-ES" sz="1600" b="1" dirty="0" err="1" smtClean="0"/>
+              <a:t>mydict</a:t>
+            </a:r>
+            <a:r>
+              <a:rPr lang="es-ES" sz="1600" b="1" dirty="0" smtClean="0"/>
+              <a:t>[“</a:t>
+            </a:r>
+            <a:r>
+              <a:rPr lang="es-ES" sz="1600" b="1" dirty="0" err="1" smtClean="0"/>
+              <a:t>name</a:t>
+            </a:r>
+            <a:r>
+              <a:rPr lang="es-ES" sz="1600" b="1" dirty="0" smtClean="0"/>
+              <a:t>”] = “tesla”</a:t>
+            </a:r>
+            <a:r>
+              <a:rPr lang="es-ES" sz="1600" b="1" dirty="0"/>
+              <a:t/>
+            </a:r>
+            <a:br>
+              <a:rPr lang="es-ES" sz="1600" b="1" dirty="0"/>
+            </a:br>
+            <a:endParaRPr lang="en-US" sz="1600" b="1" dirty="0" smtClean="0"/>
+          </a:p>
+          <a:p>
+            <a:r>
+              <a:rPr lang="en-US" sz="1600" dirty="0"/>
+              <a:t>The update() method will update the dictionary with the items from the given </a:t>
+            </a:r>
+            <a:r>
+              <a:rPr lang="en-US" sz="1600" dirty="0" smtClean="0"/>
+              <a:t>argument.</a:t>
+            </a:r>
+          </a:p>
+          <a:p>
+            <a:r>
+              <a:rPr lang="en-US" sz="1600" dirty="0"/>
+              <a:t>The argument must be a dictionary, or an </a:t>
+            </a:r>
+            <a:r>
+              <a:rPr lang="en-US" sz="1600" dirty="0" err="1"/>
+              <a:t>iterable</a:t>
+            </a:r>
+            <a:r>
+              <a:rPr lang="en-US" sz="1600" dirty="0"/>
+              <a:t> object with </a:t>
+            </a:r>
+            <a:r>
+              <a:rPr lang="en-US" sz="1600" dirty="0" err="1"/>
+              <a:t>key:value</a:t>
+            </a:r>
+            <a:r>
+              <a:rPr lang="en-US" sz="1600" dirty="0"/>
+              <a:t> </a:t>
+            </a:r>
+            <a:r>
+              <a:rPr lang="en-US" sz="1600" dirty="0" smtClean="0"/>
+              <a:t>pairs.</a:t>
+            </a:r>
+          </a:p>
+          <a:p>
+            <a:pPr marL="64008" indent="0">
+              <a:buNone/>
+            </a:pPr>
+            <a:r>
+              <a:rPr lang="en-IN" sz="1600" b="1" dirty="0" smtClean="0"/>
+              <a:t>	</a:t>
+            </a:r>
+            <a:r>
+              <a:rPr lang="en-IN" sz="1600" b="1" dirty="0" err="1" smtClean="0"/>
+              <a:t>mydict.update</a:t>
+            </a:r>
+            <a:r>
+              <a:rPr lang="en-IN" sz="1600" b="1" dirty="0"/>
+              <a:t>({"year": 2020})</a:t>
+            </a:r>
+            <a:endParaRPr lang="en-IN" sz="1600" b="1" dirty="0" smtClean="0"/>
+          </a:p>
+          <a:p>
+            <a:r>
+              <a:rPr lang="en-US" sz="1600" dirty="0"/>
+              <a:t>Adding an item to the dictionary is done by using a new index key and assigning a value to </a:t>
+            </a:r>
+            <a:r>
+              <a:rPr lang="en-US" sz="1600" dirty="0" smtClean="0"/>
+              <a:t>it.</a:t>
+            </a:r>
+          </a:p>
+          <a:p>
+            <a:pPr marL="64008" indent="0">
+              <a:buNone/>
+            </a:pPr>
+            <a:r>
+              <a:rPr lang="en-US" sz="1600" dirty="0"/>
+              <a:t>	</a:t>
+            </a:r>
+            <a:r>
+              <a:rPr lang="en-US" sz="1600" b="1" dirty="0" err="1" smtClean="0"/>
+              <a:t>mydict</a:t>
+            </a:r>
+            <a:r>
+              <a:rPr lang="en-US" sz="1600" b="1" dirty="0" smtClean="0"/>
+              <a:t>[“color”] = “red”</a:t>
+            </a:r>
+          </a:p>
+          <a:p>
+            <a:r>
+              <a:rPr lang="en-US" sz="1600" dirty="0"/>
+              <a:t>The pop() method removes the item with the specified key </a:t>
+            </a:r>
+            <a:r>
+              <a:rPr lang="en-US" sz="1600" dirty="0" smtClean="0"/>
+              <a:t>name.</a:t>
+            </a:r>
+          </a:p>
+          <a:p>
+            <a:pPr marL="64008" indent="0">
+              <a:buNone/>
+            </a:pPr>
+            <a:r>
+              <a:rPr lang="en-US" sz="1600" b="1" dirty="0"/>
+              <a:t>	</a:t>
+            </a:r>
+            <a:r>
+              <a:rPr lang="en-IN" sz="1600" b="1" dirty="0" err="1" smtClean="0"/>
+              <a:t>mydict.pop</a:t>
+            </a:r>
+            <a:r>
+              <a:rPr lang="en-IN" sz="1600" b="1" dirty="0" smtClean="0"/>
+              <a:t>(“name")</a:t>
+            </a:r>
+          </a:p>
+          <a:p>
+            <a:r>
+              <a:rPr lang="en-US" sz="1600" dirty="0"/>
+              <a:t>The </a:t>
+            </a:r>
+            <a:r>
+              <a:rPr lang="en-US" sz="1600" dirty="0" err="1"/>
+              <a:t>popitem</a:t>
+            </a:r>
+            <a:r>
+              <a:rPr lang="en-US" sz="1600" dirty="0"/>
+              <a:t>() method removes the last inserted item (in versions before 3.7, a random item is removed instead</a:t>
+            </a:r>
+            <a:r>
+              <a:rPr lang="en-US" sz="1600" dirty="0" smtClean="0"/>
+              <a:t>).</a:t>
+            </a:r>
+          </a:p>
+          <a:p>
+            <a:pPr marL="64008" indent="0">
+              <a:buNone/>
+            </a:pPr>
+            <a:r>
+              <a:rPr lang="en-US" sz="1600" b="1" dirty="0"/>
+              <a:t>	</a:t>
+            </a:r>
+            <a:r>
+              <a:rPr lang="en-IN" sz="1600" b="1" dirty="0" err="1" smtClean="0"/>
+              <a:t>mydict.popitem</a:t>
+            </a:r>
+            <a:r>
+              <a:rPr lang="en-IN" sz="1600" b="1" dirty="0" smtClean="0"/>
+              <a:t>()</a:t>
+            </a:r>
+          </a:p>
+          <a:p>
+            <a:r>
+              <a:rPr lang="en-US" sz="1600" dirty="0"/>
+              <a:t>The del keyword removes the item with the specified key </a:t>
+            </a:r>
+            <a:r>
+              <a:rPr lang="en-US" sz="1600" dirty="0" smtClean="0"/>
+              <a:t>name.</a:t>
+            </a:r>
+          </a:p>
+          <a:p>
+            <a:pPr marL="64008" indent="0">
+              <a:buNone/>
+            </a:pPr>
+            <a:r>
+              <a:rPr lang="en-US" sz="1600" b="1" dirty="0"/>
+              <a:t>	</a:t>
+            </a:r>
+            <a:r>
+              <a:rPr lang="en-US" sz="1600" b="1" dirty="0" smtClean="0"/>
+              <a:t>del </a:t>
+            </a:r>
+            <a:r>
+              <a:rPr lang="en-US" sz="1600" b="1" dirty="0" err="1" smtClean="0"/>
+              <a:t>mydict</a:t>
+            </a:r>
+            <a:r>
+              <a:rPr lang="en-US" sz="1600" b="1" dirty="0" smtClean="0"/>
+              <a:t>[“name”]</a:t>
+            </a:r>
+            <a:endParaRPr lang="en-IN" sz="1600" b="1" dirty="0" smtClean="0"/>
+          </a:p>
+          <a:p>
+            <a:r>
+              <a:rPr lang="en-US" sz="1600" dirty="0"/>
+              <a:t>The del keyword can also delete the dictionary completely</a:t>
+            </a:r>
+            <a:endParaRPr lang="en-IN" sz="1600" b="1" dirty="0" smtClean="0"/>
+          </a:p>
+          <a:p>
+            <a:pPr marL="64008" indent="0">
+              <a:buNone/>
+            </a:pPr>
+            <a:r>
+              <a:rPr lang="en-IN" sz="1600" b="1" dirty="0" smtClean="0"/>
+              <a:t>	del </a:t>
+            </a:r>
+            <a:r>
+              <a:rPr lang="en-IN" sz="1600" b="1" dirty="0" err="1" smtClean="0"/>
+              <a:t>mydict</a:t>
+            </a:r>
+            <a:endParaRPr lang="en-IN" sz="1600" b="1" dirty="0" smtClean="0"/>
+          </a:p>
+          <a:p>
+            <a:pPr lvl="1"/>
+            <a:endParaRPr lang="en-US" dirty="0" smtClean="0"/>
+          </a:p>
+          <a:p>
+            <a:pPr lvl="1"/>
+            <a:endParaRPr lang="en-IN" dirty="0"/>
+          </a:p>
+        </p:txBody>
+      </p:sp>
+    </p:spTree>
+    <p:extLst>
+      <p:ext uri="{BB962C8B-B14F-4D97-AF65-F5344CB8AC3E}">
+        <p14:creationId xmlns:p14="http://schemas.microsoft.com/office/powerpoint/2010/main" val="1249593837"/>
+      </p:ext>
+    </p:extLst>
+  </p:cSld>
+  <p:clrMapOvr>
+    <a:masterClrMapping/>
+  </p:clrMapOvr>
+  <p:timing>
+    <p:tnLst>
+      <p:par>
+        <p:cTn id="1" dur="indefinite" restart="never" nodeType="tmRoot"/>
+      </p:par>
+    </p:tnLst>
+  </p:timing>
+</p:sld>
+</file>
+
+<file path=ppt/slides/slide21.xml><?xml version="1.0" encoding="utf-8"?>
+<p:sld xmlns:a="http://schemas.openxmlformats.org/drawingml/2006/main" xmlns:r="http://schemas.openxmlformats.org/officeDocument/2006/relationships" xmlns:p="http://schemas.openxmlformats.org/presentationml/2006/main">
+  <p:cSld>
+    <p:spTree>
+      <p:nvGrpSpPr>
+        <p:cNvPr id="1" name=""/>
+        <p:cNvGrpSpPr/>
+        <p:nvPr/>
+      </p:nvGrpSpPr>
+      <p:grpSpPr>
+        <a:xfrm>
+          <a:off x="0" y="0"/>
+          <a:ext cx="0" cy="0"/>
+          <a:chOff x="0" y="0"/>
+          <a:chExt cx="0" cy="0"/>
+        </a:xfrm>
+      </p:grpSpPr>
+      <p:sp>
+        <p:nvSpPr>
+          <p:cNvPr id="2" name="Title 1"/>
+          <p:cNvSpPr>
+            <a:spLocks noGrp="1"/>
+          </p:cNvSpPr>
+          <p:nvPr>
+            <p:ph type="title"/>
+          </p:nvPr>
+        </p:nvSpPr>
+        <p:spPr>
+          <a:xfrm>
+            <a:off x="457200" y="44624"/>
+            <a:ext cx="8229600" cy="648072"/>
+          </a:xfrm>
+        </p:spPr>
+        <p:txBody>
+          <a:bodyPr>
+            <a:normAutofit fontScale="90000"/>
+          </a:bodyPr>
+          <a:lstStyle/>
+          <a:p>
+            <a:pPr algn="ctr"/>
+            <a:r>
+              <a:rPr lang="en-US" dirty="0" smtClean="0"/>
+              <a:t>Dictionary(</a:t>
+            </a:r>
+            <a:r>
+              <a:rPr lang="en-US" dirty="0" err="1" smtClean="0"/>
+              <a:t>loops,copy</a:t>
+            </a:r>
+            <a:r>
+              <a:rPr lang="en-US" dirty="0" smtClean="0"/>
+              <a:t>)</a:t>
+            </a:r>
+            <a:endParaRPr lang="en-IN" dirty="0"/>
+          </a:p>
+        </p:txBody>
+      </p:sp>
+      <p:sp>
+        <p:nvSpPr>
+          <p:cNvPr id="3" name="Content Placeholder 2"/>
+          <p:cNvSpPr>
+            <a:spLocks noGrp="1"/>
+          </p:cNvSpPr>
+          <p:nvPr>
+            <p:ph idx="1"/>
+          </p:nvPr>
+        </p:nvSpPr>
+        <p:spPr>
+          <a:xfrm>
+            <a:off x="179512" y="764704"/>
+            <a:ext cx="8784976" cy="5976664"/>
+          </a:xfrm>
+        </p:spPr>
+        <p:txBody>
+          <a:bodyPr>
+            <a:noAutofit/>
+          </a:bodyPr>
+          <a:lstStyle/>
+          <a:p>
+            <a:r>
+              <a:rPr lang="en-US" sz="1600" dirty="0"/>
+              <a:t>When looping through a dictionary, the return value are the </a:t>
+            </a:r>
+            <a:r>
+              <a:rPr lang="en-US" sz="1600" i="1" dirty="0"/>
+              <a:t>keys</a:t>
+            </a:r>
+            <a:r>
+              <a:rPr lang="en-US" sz="1600" dirty="0"/>
+              <a:t> of the dictionary</a:t>
+            </a:r>
+            <a:r>
+              <a:rPr lang="en-US" sz="1600" dirty="0" smtClean="0"/>
+              <a:t>.</a:t>
+            </a:r>
+            <a:r>
+              <a:rPr lang="en-US" sz="1600" dirty="0"/>
+              <a:t>	</a:t>
+            </a:r>
+            <a:r>
+              <a:rPr lang="en-US" sz="1600" b="1" dirty="0" smtClean="0"/>
+              <a:t>for </a:t>
+            </a:r>
+            <a:r>
+              <a:rPr lang="en-US" sz="1600" b="1" dirty="0" err="1" smtClean="0"/>
+              <a:t>i</a:t>
+            </a:r>
+            <a:r>
+              <a:rPr lang="en-US" sz="1600" b="1" dirty="0" smtClean="0"/>
+              <a:t> in </a:t>
+            </a:r>
+            <a:r>
+              <a:rPr lang="en-US" sz="1600" b="1" dirty="0" err="1" smtClean="0"/>
+              <a:t>mydict</a:t>
+            </a:r>
+            <a:r>
+              <a:rPr lang="en-US" sz="1600" b="1" dirty="0" smtClean="0"/>
+              <a:t>: print(</a:t>
+            </a:r>
+            <a:r>
+              <a:rPr lang="en-US" sz="1600" b="1" dirty="0" err="1" smtClean="0"/>
+              <a:t>i</a:t>
+            </a:r>
+            <a:r>
+              <a:rPr lang="en-US" sz="1600" b="1" dirty="0" smtClean="0"/>
+              <a:t>)</a:t>
+            </a:r>
+            <a:r>
+              <a:rPr lang="es-ES" sz="1600" b="1" dirty="0"/>
+              <a:t/>
+            </a:r>
+            <a:br>
+              <a:rPr lang="es-ES" sz="1600" b="1" dirty="0"/>
+            </a:br>
+            <a:endParaRPr lang="en-US" sz="1600" b="1" dirty="0" smtClean="0"/>
+          </a:p>
+          <a:p>
+            <a:r>
+              <a:rPr lang="en-US" sz="1600" dirty="0"/>
+              <a:t>Print all </a:t>
+            </a:r>
+            <a:r>
+              <a:rPr lang="en-US" sz="1600" i="1" dirty="0"/>
+              <a:t>values</a:t>
+            </a:r>
+            <a:r>
+              <a:rPr lang="en-US" sz="1600" dirty="0"/>
+              <a:t> in the dictionary, one by </a:t>
+            </a:r>
+            <a:r>
+              <a:rPr lang="en-US" sz="1600" dirty="0" smtClean="0"/>
+              <a:t>one.</a:t>
+            </a:r>
+          </a:p>
+          <a:p>
+            <a:pPr marL="64008" indent="0">
+              <a:buNone/>
+            </a:pPr>
+            <a:r>
+              <a:rPr lang="en-US" sz="1600" dirty="0" smtClean="0"/>
+              <a:t>	</a:t>
+            </a:r>
+            <a:r>
+              <a:rPr lang="en-US" sz="1600" b="1" dirty="0"/>
+              <a:t>for </a:t>
+            </a:r>
+            <a:r>
+              <a:rPr lang="en-US" sz="1600" b="1" dirty="0" err="1"/>
+              <a:t>i</a:t>
+            </a:r>
+            <a:r>
+              <a:rPr lang="en-US" sz="1600" b="1" dirty="0"/>
+              <a:t> in </a:t>
+            </a:r>
+            <a:r>
+              <a:rPr lang="en-US" sz="1600" b="1" dirty="0" err="1"/>
+              <a:t>mydict</a:t>
+            </a:r>
+            <a:r>
+              <a:rPr lang="en-US" sz="1600" b="1" dirty="0"/>
+              <a:t>: </a:t>
+            </a:r>
+            <a:r>
+              <a:rPr lang="en-US" sz="1600" b="1" dirty="0" smtClean="0"/>
+              <a:t>print(</a:t>
+            </a:r>
+            <a:r>
+              <a:rPr lang="en-US" sz="1600" b="1" dirty="0" err="1" smtClean="0"/>
+              <a:t>mydict</a:t>
+            </a:r>
+            <a:r>
+              <a:rPr lang="en-US" sz="1600" b="1" dirty="0" smtClean="0"/>
+              <a:t>[</a:t>
+            </a:r>
+            <a:r>
+              <a:rPr lang="en-US" sz="1600" b="1" dirty="0" err="1" smtClean="0"/>
+              <a:t>i</a:t>
+            </a:r>
+            <a:r>
+              <a:rPr lang="en-US" sz="1600" b="1" dirty="0" smtClean="0"/>
+              <a:t>])</a:t>
+            </a:r>
+            <a:r>
+              <a:rPr lang="es-ES" sz="1600" b="1" dirty="0"/>
+              <a:t/>
+            </a:r>
+            <a:br>
+              <a:rPr lang="es-ES" sz="1600" b="1" dirty="0"/>
+            </a:br>
+            <a:endParaRPr lang="en-US" sz="1600" dirty="0" smtClean="0"/>
+          </a:p>
+          <a:p>
+            <a:r>
+              <a:rPr lang="en-US" sz="1600" dirty="0"/>
+              <a:t>You can also use the </a:t>
+            </a:r>
+            <a:r>
+              <a:rPr lang="en-US" sz="1600" dirty="0"/>
+              <a:t>values()</a:t>
+            </a:r>
+            <a:r>
+              <a:rPr lang="en-US" sz="1600" dirty="0"/>
+              <a:t> method to return values of a dictionary</a:t>
+            </a:r>
+            <a:r>
+              <a:rPr lang="en-US" sz="1600" dirty="0" smtClean="0"/>
+              <a:t>.</a:t>
+            </a:r>
+            <a:endParaRPr lang="en-US" sz="1600" dirty="0"/>
+          </a:p>
+          <a:p>
+            <a:pPr marL="64008" indent="0">
+              <a:buNone/>
+            </a:pPr>
+            <a:r>
+              <a:rPr lang="en-US" sz="1600" b="1" dirty="0"/>
+              <a:t>	for </a:t>
+            </a:r>
+            <a:r>
+              <a:rPr lang="en-US" sz="1600" b="1" dirty="0" err="1"/>
+              <a:t>i</a:t>
+            </a:r>
+            <a:r>
+              <a:rPr lang="en-US" sz="1600" b="1" dirty="0"/>
+              <a:t> in </a:t>
+            </a:r>
+            <a:r>
+              <a:rPr lang="en-US" sz="1600" b="1" dirty="0" err="1" smtClean="0"/>
+              <a:t>mydict.values</a:t>
+            </a:r>
+            <a:r>
+              <a:rPr lang="en-US" sz="1600" b="1" dirty="0" smtClean="0"/>
+              <a:t>(): print(</a:t>
+            </a:r>
+            <a:r>
+              <a:rPr lang="en-US" sz="1600" b="1" dirty="0" err="1" smtClean="0"/>
+              <a:t>i</a:t>
+            </a:r>
+            <a:r>
+              <a:rPr lang="en-US" sz="1600" b="1" dirty="0" smtClean="0"/>
+              <a:t>)</a:t>
+            </a:r>
+          </a:p>
+          <a:p>
+            <a:pPr marL="64008" indent="0">
+              <a:buNone/>
+            </a:pPr>
+            <a:endParaRPr lang="es-ES" sz="1600" b="1" dirty="0" smtClean="0"/>
+          </a:p>
+          <a:p>
+            <a:r>
+              <a:rPr lang="en-US" sz="1600" dirty="0"/>
+              <a:t>You can use the </a:t>
+            </a:r>
+            <a:r>
+              <a:rPr lang="en-US" sz="1600" dirty="0"/>
+              <a:t>keys()</a:t>
+            </a:r>
+            <a:r>
+              <a:rPr lang="en-US" sz="1600" dirty="0"/>
+              <a:t> method to return the keys of a dictionary</a:t>
+            </a:r>
+            <a:r>
+              <a:rPr lang="en-US" sz="1600" dirty="0" smtClean="0"/>
+              <a:t>.</a:t>
+            </a:r>
+            <a:endParaRPr lang="en-US" sz="1600" dirty="0"/>
+          </a:p>
+          <a:p>
+            <a:pPr marL="64008" indent="0">
+              <a:buNone/>
+            </a:pPr>
+            <a:r>
+              <a:rPr lang="en-US" sz="1600" b="1" dirty="0"/>
+              <a:t>	for </a:t>
+            </a:r>
+            <a:r>
+              <a:rPr lang="en-US" sz="1600" b="1" dirty="0" err="1"/>
+              <a:t>i</a:t>
+            </a:r>
+            <a:r>
+              <a:rPr lang="en-US" sz="1600" b="1" dirty="0"/>
+              <a:t> in </a:t>
+            </a:r>
+            <a:r>
+              <a:rPr lang="en-US" sz="1600" b="1" dirty="0" err="1" smtClean="0"/>
+              <a:t>mydict.keys</a:t>
+            </a:r>
+            <a:r>
+              <a:rPr lang="en-US" sz="1600" b="1" dirty="0" smtClean="0"/>
+              <a:t>(): </a:t>
+            </a:r>
+            <a:r>
+              <a:rPr lang="en-US" sz="1600" b="1" dirty="0"/>
+              <a:t>print(</a:t>
+            </a:r>
+            <a:r>
+              <a:rPr lang="en-US" sz="1600" b="1" dirty="0" err="1"/>
+              <a:t>i</a:t>
+            </a:r>
+            <a:r>
+              <a:rPr lang="en-US" sz="1600" b="1" dirty="0" smtClean="0"/>
+              <a:t>)</a:t>
+            </a:r>
+            <a:endParaRPr lang="en-US" sz="1600" b="1" dirty="0" smtClean="0">
+              <a:solidFill>
+                <a:srgbClr val="00B0F0"/>
+              </a:solidFill>
+            </a:endParaRPr>
+          </a:p>
+          <a:p>
+            <a:r>
+              <a:rPr lang="en-US" sz="1600" dirty="0"/>
+              <a:t>Loop through both </a:t>
+            </a:r>
+            <a:r>
+              <a:rPr lang="en-US" sz="1600" i="1" dirty="0"/>
+              <a:t>keys</a:t>
+            </a:r>
+            <a:r>
+              <a:rPr lang="en-US" sz="1600" dirty="0"/>
+              <a:t> and </a:t>
+            </a:r>
+            <a:r>
+              <a:rPr lang="en-US" sz="1600" i="1" dirty="0"/>
+              <a:t>values</a:t>
+            </a:r>
+            <a:r>
+              <a:rPr lang="en-US" sz="1600" dirty="0"/>
+              <a:t>, by using the </a:t>
+            </a:r>
+            <a:r>
+              <a:rPr lang="en-US" sz="1600" dirty="0"/>
+              <a:t>items()</a:t>
+            </a:r>
+            <a:r>
+              <a:rPr lang="en-US" sz="1600" dirty="0"/>
+              <a:t> method</a:t>
+            </a:r>
+            <a:r>
+              <a:rPr lang="en-US" sz="1600" dirty="0" smtClean="0"/>
+              <a:t>.</a:t>
+            </a:r>
+            <a:endParaRPr lang="en-US" sz="1600" dirty="0"/>
+          </a:p>
+          <a:p>
+            <a:pPr marL="64008" indent="0">
+              <a:buNone/>
+            </a:pPr>
+            <a:r>
+              <a:rPr lang="en-US" sz="1600" b="1" dirty="0"/>
+              <a:t>	for </a:t>
+            </a:r>
+            <a:r>
+              <a:rPr lang="en-US" sz="1600" b="1" dirty="0" err="1" smtClean="0"/>
+              <a:t>I,j</a:t>
+            </a:r>
+            <a:r>
+              <a:rPr lang="en-US" sz="1600" b="1" dirty="0" smtClean="0"/>
+              <a:t> </a:t>
+            </a:r>
+            <a:r>
+              <a:rPr lang="en-US" sz="1600" b="1" dirty="0"/>
+              <a:t>in </a:t>
+            </a:r>
+            <a:r>
+              <a:rPr lang="en-US" sz="1600" b="1" dirty="0" err="1" smtClean="0"/>
+              <a:t>mydict.items</a:t>
+            </a:r>
+            <a:r>
+              <a:rPr lang="en-US" sz="1600" b="1" dirty="0" smtClean="0"/>
+              <a:t>(): print(</a:t>
+            </a:r>
+            <a:r>
+              <a:rPr lang="en-US" sz="1600" b="1" dirty="0" err="1" smtClean="0"/>
+              <a:t>x,y</a:t>
+            </a:r>
+            <a:r>
+              <a:rPr lang="en-US" sz="1600" b="1" dirty="0" smtClean="0"/>
+              <a:t>)</a:t>
+            </a:r>
+          </a:p>
+          <a:p>
+            <a:pPr marL="64008" indent="0">
+              <a:buNone/>
+            </a:pPr>
+            <a:r>
+              <a:rPr lang="en-US" sz="1600" b="1" u="sng" dirty="0" smtClean="0"/>
+              <a:t>Copy</a:t>
+            </a:r>
+          </a:p>
+          <a:p>
+            <a:r>
+              <a:rPr lang="en-US" sz="1600" dirty="0"/>
+              <a:t>You cannot copy a dictionary simply by typing </a:t>
+            </a:r>
+            <a:r>
+              <a:rPr lang="en-US" sz="1600" dirty="0"/>
+              <a:t>dict2 = dict1</a:t>
+            </a:r>
+            <a:r>
+              <a:rPr lang="en-US" sz="1600" dirty="0"/>
+              <a:t>, because: </a:t>
+            </a:r>
+            <a:r>
+              <a:rPr lang="en-US" sz="1600" dirty="0"/>
+              <a:t>dict2</a:t>
+            </a:r>
+            <a:r>
+              <a:rPr lang="en-US" sz="1600" dirty="0"/>
+              <a:t> will only be a </a:t>
+            </a:r>
+            <a:r>
+              <a:rPr lang="en-US" sz="1600" i="1" dirty="0"/>
+              <a:t>reference</a:t>
+            </a:r>
+            <a:r>
+              <a:rPr lang="en-US" sz="1600" dirty="0"/>
+              <a:t> to </a:t>
+            </a:r>
+            <a:r>
+              <a:rPr lang="en-US" sz="1600" dirty="0"/>
+              <a:t>dict1</a:t>
+            </a:r>
+            <a:r>
+              <a:rPr lang="en-US" sz="1600" dirty="0"/>
+              <a:t>, and changes made in </a:t>
+            </a:r>
+            <a:r>
+              <a:rPr lang="en-US" sz="1600" dirty="0"/>
+              <a:t>dict1</a:t>
+            </a:r>
+            <a:r>
+              <a:rPr lang="en-US" sz="1600" dirty="0"/>
+              <a:t> will automatically also be made in </a:t>
+            </a:r>
+            <a:r>
+              <a:rPr lang="en-US" sz="1600" dirty="0" smtClean="0"/>
+              <a:t>dict2.</a:t>
+            </a:r>
+            <a:r>
+              <a:rPr lang="en-US" sz="1600" dirty="0"/>
+              <a:t>	</a:t>
+            </a:r>
+            <a:endParaRPr lang="en-US" sz="1600" dirty="0" smtClean="0"/>
+          </a:p>
+          <a:p>
+            <a:pPr marL="64008" indent="0">
+              <a:buNone/>
+            </a:pPr>
+            <a:r>
+              <a:rPr lang="en-US" sz="1600" b="1" dirty="0"/>
+              <a:t>	</a:t>
+            </a:r>
+            <a:r>
+              <a:rPr lang="en-US" sz="1600" b="1" dirty="0" smtClean="0"/>
+              <a:t>dict2 = dict1.copy()</a:t>
+            </a:r>
+            <a:r>
+              <a:rPr lang="es-ES" sz="1600" b="1" dirty="0"/>
+              <a:t/>
+            </a:r>
+            <a:br>
+              <a:rPr lang="es-ES" sz="1600" b="1" dirty="0"/>
+            </a:br>
+            <a:endParaRPr lang="en-US" sz="1600" b="1" dirty="0"/>
+          </a:p>
+          <a:p>
+            <a:r>
+              <a:rPr lang="en-US" sz="1600" dirty="0"/>
+              <a:t>Another way to make a copy is to use the built-in function </a:t>
+            </a:r>
+            <a:r>
+              <a:rPr lang="en-US" sz="1600" dirty="0" err="1"/>
+              <a:t>dict</a:t>
+            </a:r>
+            <a:r>
+              <a:rPr lang="en-US" sz="1600" dirty="0"/>
+              <a:t>().</a:t>
+            </a:r>
+          </a:p>
+          <a:p>
+            <a:pPr marL="64008" indent="0">
+              <a:buNone/>
+            </a:pPr>
+            <a:r>
+              <a:rPr lang="en-US" sz="1600" dirty="0"/>
+              <a:t>	</a:t>
+            </a:r>
+            <a:r>
+              <a:rPr lang="en-US" sz="1600" b="1" dirty="0"/>
+              <a:t> dict2 = </a:t>
+            </a:r>
+            <a:r>
+              <a:rPr lang="en-US" sz="1600" b="1" dirty="0" err="1" smtClean="0"/>
+              <a:t>dict</a:t>
+            </a:r>
+            <a:r>
+              <a:rPr lang="en-US" sz="1600" b="1" dirty="0" smtClean="0"/>
+              <a:t>(dict1)</a:t>
+            </a:r>
+            <a:endParaRPr lang="es-ES" sz="1600" b="1" u="sng" dirty="0"/>
+          </a:p>
+        </p:txBody>
+      </p:sp>
+    </p:spTree>
+    <p:extLst>
+      <p:ext uri="{BB962C8B-B14F-4D97-AF65-F5344CB8AC3E}">
+        <p14:creationId xmlns:p14="http://schemas.microsoft.com/office/powerpoint/2010/main" val="3274974374"/>
+      </p:ext>
+    </p:extLst>
+  </p:cSld>
+  <p:clrMapOvr>
+    <a:masterClrMapping/>
+  </p:clrMapOvr>
+  <p:timing>
+    <p:tnLst>
+      <p:par>
+        <p:cTn id="1" dur="indefinite" restart="never" nodeType="tmRoot"/>
+      </p:par>
+    </p:tnLst>
+  </p:timing>
+</p:sld>
+</file>
+
+<file path=ppt/slides/slide22.xml><?xml version="1.0" encoding="utf-8"?>
+<p:sld xmlns:a="http://schemas.openxmlformats.org/drawingml/2006/main" xmlns:r="http://schemas.openxmlformats.org/officeDocument/2006/relationships" xmlns:p="http://schemas.openxmlformats.org/presentationml/2006/main">
+  <p:cSld>
+    <p:spTree>
+      <p:nvGrpSpPr>
+        <p:cNvPr id="1" name=""/>
+        <p:cNvGrpSpPr/>
+        <p:nvPr/>
+      </p:nvGrpSpPr>
+      <p:grpSpPr>
+        <a:xfrm>
+          <a:off x="0" y="0"/>
+          <a:ext cx="0" cy="0"/>
+          <a:chOff x="0" y="0"/>
+          <a:chExt cx="0" cy="0"/>
+        </a:xfrm>
+      </p:grpSpPr>
+      <p:sp>
+        <p:nvSpPr>
+          <p:cNvPr id="2" name="Title 1"/>
+          <p:cNvSpPr>
+            <a:spLocks noGrp="1"/>
+          </p:cNvSpPr>
+          <p:nvPr>
+            <p:ph type="title"/>
+          </p:nvPr>
+        </p:nvSpPr>
+        <p:spPr>
+          <a:xfrm>
+            <a:off x="457200" y="44624"/>
+            <a:ext cx="8229600" cy="648072"/>
+          </a:xfrm>
+        </p:spPr>
+        <p:txBody>
+          <a:bodyPr>
+            <a:normAutofit fontScale="90000"/>
+          </a:bodyPr>
+          <a:lstStyle/>
+          <a:p>
+            <a:pPr algn="ctr"/>
+            <a:r>
+              <a:rPr lang="en-US" dirty="0" smtClean="0"/>
+              <a:t>Dictionary(nested dictionaries)</a:t>
+            </a:r>
+            <a:endParaRPr lang="en-IN" dirty="0"/>
+          </a:p>
+        </p:txBody>
+      </p:sp>
+      <p:sp>
+        <p:nvSpPr>
+          <p:cNvPr id="3" name="Content Placeholder 2"/>
+          <p:cNvSpPr>
+            <a:spLocks noGrp="1"/>
+          </p:cNvSpPr>
+          <p:nvPr>
+            <p:ph idx="1"/>
+          </p:nvPr>
+        </p:nvSpPr>
+        <p:spPr>
+          <a:xfrm>
+            <a:off x="179512" y="764704"/>
+            <a:ext cx="8784976" cy="5976664"/>
+          </a:xfrm>
+        </p:spPr>
+        <p:txBody>
+          <a:bodyPr>
+            <a:noAutofit/>
+          </a:bodyPr>
+          <a:lstStyle/>
+          <a:p>
+            <a:r>
+              <a:rPr lang="en-US" sz="1600" dirty="0"/>
+              <a:t>A dictionary can contain dictionaries, this is called nested dictionaries</a:t>
+            </a:r>
+            <a:r>
+              <a:rPr lang="en-US" sz="1600" dirty="0" smtClean="0"/>
+              <a:t>.</a:t>
+            </a:r>
+          </a:p>
+          <a:p>
+            <a:pPr marL="64008" indent="0">
+              <a:buNone/>
+            </a:pPr>
+            <a:r>
+              <a:rPr lang="en-US" sz="1600" dirty="0"/>
+              <a:t>	</a:t>
+            </a:r>
+            <a:r>
+              <a:rPr lang="en-US" sz="1600" b="1" dirty="0" err="1" smtClean="0"/>
+              <a:t>mydict</a:t>
+            </a:r>
+            <a:r>
+              <a:rPr lang="en-US" sz="1600" b="1" dirty="0"/>
+              <a:t> </a:t>
+            </a:r>
+            <a:r>
+              <a:rPr lang="en-US" sz="1600" b="1" dirty="0" smtClean="0"/>
+              <a:t>= {</a:t>
+            </a:r>
+          </a:p>
+          <a:p>
+            <a:pPr marL="64008" indent="0">
+              <a:buNone/>
+            </a:pPr>
+            <a:r>
+              <a:rPr lang="en-US" sz="1600" b="1" dirty="0"/>
+              <a:t>	</a:t>
+            </a:r>
+            <a:r>
+              <a:rPr lang="en-US" sz="1600" b="1" dirty="0" smtClean="0"/>
+              <a:t>	“dic1”:{“name”:”ravi”,”age”:10},</a:t>
+            </a:r>
+          </a:p>
+          <a:p>
+            <a:pPr marL="64008" indent="0">
+              <a:buNone/>
+            </a:pPr>
+            <a:r>
+              <a:rPr lang="en-US" sz="1600" b="1" dirty="0" smtClean="0"/>
+              <a:t>		“dic2”:{“</a:t>
+            </a:r>
+            <a:r>
+              <a:rPr lang="en-US" sz="1600" b="1" dirty="0"/>
+              <a:t>name</a:t>
+            </a:r>
+            <a:r>
+              <a:rPr lang="en-US" sz="1600" b="1" dirty="0" smtClean="0"/>
+              <a:t>”:”krishna”,”</a:t>
+            </a:r>
+            <a:r>
+              <a:rPr lang="en-US" sz="1600" b="1" dirty="0"/>
+              <a:t>age”:</a:t>
+            </a:r>
+            <a:r>
+              <a:rPr lang="en-US" sz="1600" b="1" dirty="0" smtClean="0"/>
+              <a:t>12}</a:t>
+            </a:r>
+          </a:p>
+          <a:p>
+            <a:pPr marL="64008" indent="0">
+              <a:buNone/>
+            </a:pPr>
+            <a:r>
+              <a:rPr lang="en-US" sz="1600" b="1" dirty="0"/>
+              <a:t>	</a:t>
+            </a:r>
+            <a:r>
+              <a:rPr lang="en-US" sz="1600" b="1" dirty="0" smtClean="0"/>
+              <a:t>	}</a:t>
+            </a:r>
+            <a:r>
+              <a:rPr lang="es-ES" sz="1600" b="1" dirty="0"/>
+              <a:t/>
+            </a:r>
+            <a:br>
+              <a:rPr lang="es-ES" sz="1600" b="1" dirty="0"/>
+            </a:br>
+            <a:endParaRPr lang="en-US" sz="1600" b="1" dirty="0" smtClean="0"/>
+          </a:p>
+          <a:p>
+            <a:r>
+              <a:rPr lang="en-US" sz="1600" dirty="0"/>
+              <a:t>if you want to add three dictionaries into a new dictionary</a:t>
+            </a:r>
+            <a:r>
+              <a:rPr lang="en-US" sz="1600" dirty="0" smtClean="0"/>
+              <a:t>.</a:t>
+            </a:r>
+          </a:p>
+          <a:p>
+            <a:pPr marL="64008" indent="0">
+              <a:buNone/>
+            </a:pPr>
+            <a:r>
+              <a:rPr lang="en-US" sz="1600" dirty="0" smtClean="0"/>
+              <a:t>	</a:t>
+            </a:r>
+            <a:r>
+              <a:rPr lang="en-US" sz="1600" b="1" dirty="0"/>
+              <a:t>dic1:{“name”:”ravi”,”age”:10</a:t>
+            </a:r>
+            <a:r>
+              <a:rPr lang="en-US" sz="1600" b="1" dirty="0" smtClean="0"/>
+              <a:t>}</a:t>
+            </a:r>
+          </a:p>
+          <a:p>
+            <a:pPr marL="64008" indent="0">
+              <a:buNone/>
+            </a:pPr>
+            <a:r>
+              <a:rPr lang="en-US" sz="1600" b="1" dirty="0"/>
+              <a:t>	dic2:{“name”:”krishna”,”age”:12}</a:t>
+            </a:r>
+          </a:p>
+          <a:p>
+            <a:pPr marL="64008" indent="0">
+              <a:buNone/>
+            </a:pPr>
+            <a:r>
+              <a:rPr lang="es-ES" sz="1600" b="1" dirty="0" smtClean="0"/>
+              <a:t>	</a:t>
+            </a:r>
+            <a:r>
+              <a:rPr lang="en-US" sz="1600" b="1" dirty="0" err="1"/>
+              <a:t>mydict</a:t>
+            </a:r>
+            <a:r>
+              <a:rPr lang="en-US" sz="1600" b="1" dirty="0"/>
+              <a:t> = {</a:t>
+            </a:r>
+          </a:p>
+          <a:p>
+            <a:pPr marL="64008" indent="0">
+              <a:buNone/>
+            </a:pPr>
+            <a:r>
+              <a:rPr lang="en-US" sz="1600" b="1" dirty="0"/>
+              <a:t>		</a:t>
+            </a:r>
+            <a:r>
+              <a:rPr lang="en-US" sz="1600" b="1" dirty="0" smtClean="0"/>
+              <a:t>“dic1”:dict1</a:t>
+            </a:r>
+            <a:endParaRPr lang="en-US" sz="1600" b="1" dirty="0"/>
+          </a:p>
+          <a:p>
+            <a:pPr marL="64008" indent="0">
+              <a:buNone/>
+            </a:pPr>
+            <a:r>
+              <a:rPr lang="en-US" sz="1600" b="1" dirty="0"/>
+              <a:t>		</a:t>
+            </a:r>
+            <a:r>
+              <a:rPr lang="en-US" sz="1600" b="1" dirty="0" smtClean="0"/>
+              <a:t>“dic2”:dict2</a:t>
+            </a:r>
+            <a:endParaRPr lang="en-US" sz="1600" b="1" dirty="0"/>
+          </a:p>
+          <a:p>
+            <a:pPr marL="64008" indent="0">
+              <a:buNone/>
+            </a:pPr>
+            <a:r>
+              <a:rPr lang="en-US" sz="1600" b="1" dirty="0"/>
+              <a:t>		}</a:t>
+            </a:r>
+            <a:r>
+              <a:rPr lang="es-ES" sz="1600" b="1" dirty="0"/>
+              <a:t/>
+            </a:r>
+            <a:br>
+              <a:rPr lang="es-ES" sz="1600" b="1" dirty="0"/>
+            </a:br>
+            <a:endParaRPr lang="en-US" sz="1600" b="1" dirty="0"/>
+          </a:p>
+          <a:p>
+            <a:pPr marL="64008" indent="0">
+              <a:buNone/>
+            </a:pPr>
+            <a:r>
+              <a:rPr lang="es-ES" sz="1600" b="1" dirty="0"/>
+              <a:t/>
+            </a:r>
+            <a:br>
+              <a:rPr lang="es-ES" sz="1600" b="1" dirty="0"/>
+            </a:br>
+            <a:endParaRPr lang="en-US" sz="1600" dirty="0" smtClean="0"/>
+          </a:p>
+        </p:txBody>
+      </p:sp>
+    </p:spTree>
+    <p:extLst>
+      <p:ext uri="{BB962C8B-B14F-4D97-AF65-F5344CB8AC3E}">
+        <p14:creationId xmlns:p14="http://schemas.microsoft.com/office/powerpoint/2010/main" val="2989325300"/>
       </p:ext>
     </p:extLst>
   </p:cSld>
@@ -6198,21 +8497,8 @@
                   <a:srgbClr val="00B0F0"/>
                 </a:solidFill>
               </a:rPr>
-              <a:t>“</a:t>
-            </a:r>
-            <a:r>
-              <a:rPr lang="en-IN" sz="1800" b="1" dirty="0" smtClean="0">
-                <a:solidFill>
-                  <a:srgbClr val="00B0F0"/>
-                </a:solidFill>
-              </a:rPr>
-              <a:t>HONDA“]</a:t>
-            </a:r>
-            <a:endParaRPr lang="en-IN" sz="1800" b="1" dirty="0" smtClean="0">
-              <a:solidFill>
-                <a:srgbClr val="00B0F0"/>
-              </a:solidFill>
-            </a:endParaRPr>
+              <a:t>“HONDA“]</a:t>
+            </a:r>
           </a:p>
           <a:p>
             <a:pPr lvl="1"/>
@@ -7164,15 +9450,7 @@
                   <a:srgbClr val="00B0F0"/>
                 </a:solidFill>
               </a:rPr>
-              <a:t>= </a:t>
-            </a:r>
-            <a:r>
-              <a:rPr lang="en-US" sz="1800" b="1" dirty="0" smtClean="0">
-                <a:solidFill>
-                  <a:srgbClr val="00B0F0"/>
-                </a:solidFill>
-              </a:rPr>
-              <a:t>[ ]</a:t>
+              <a:t>= [ ]</a:t>
             </a:r>
             <a:r>
               <a:rPr lang="en-US" sz="1800" b="1" dirty="0">
@@ -7354,15 +9632,7 @@
                   <a:srgbClr val="00B0F0"/>
                 </a:solidFill>
               </a:rPr>
-              <a:t>= </a:t>
-            </a:r>
-            <a:r>
-              <a:rPr lang="en-US" sz="1800" b="1" dirty="0" smtClean="0">
-                <a:solidFill>
-                  <a:srgbClr val="00B0F0"/>
-                </a:solidFill>
-              </a:rPr>
-              <a:t>[car</a:t>
+              <a:t>= [car</a:t>
             </a:r>
             <a:r>
               <a:rPr lang="en-US" sz="1800" b="1" dirty="0">

</xml_diff>